<commit_message>
Tweaking presentation stubs, adding support for the two chunk tests
</commit_message>
<xml_diff>
--- a/presentation/GPGPU_in_data_minig.pptx
+++ b/presentation/GPGPU_in_data_minig.pptx
@@ -20,9 +20,9 @@
     <p:sldId id="264" r:id="rId11"/>
     <p:sldId id="268" r:id="rId12"/>
     <p:sldId id="269" r:id="rId13"/>
-    <p:sldId id="261" r:id="rId14"/>
-    <p:sldId id="270" r:id="rId15"/>
-    <p:sldId id="267" r:id="rId16"/>
+    <p:sldId id="267" r:id="rId14"/>
+    <p:sldId id="261" r:id="rId15"/>
+    <p:sldId id="270" r:id="rId16"/>
   </p:sldIdLst>
   <p:sldSz cx="9144000" cy="6858000" type="screen4x3"/>
   <p:notesSz cx="6858000" cy="9144000"/>
@@ -764,11 +764,7 @@
             </a:r>
             <a:r>
               <a:rPr lang="pl-PL" baseline="0" dirty="0" smtClean="0"/>
-              <a:t> </a:t>
-            </a:r>
-            <a:r>
-              <a:rPr lang="pl-PL" baseline="0" dirty="0" smtClean="0"/>
-              <a:t>Dodać jakieś ładne </a:t>
+              <a:t> Dodać jakieś ładne </a:t>
             </a:r>
             <a:r>
               <a:rPr lang="pl-PL" baseline="0" dirty="0" err="1" smtClean="0"/>
@@ -864,11 +860,7 @@
           <a:p>
             <a:r>
               <a:rPr lang="pl-PL" dirty="0" smtClean="0"/>
-              <a:t>Tutaj schemat blokowy algorytmu opartego na </a:t>
-            </a:r>
-            <a:r>
-              <a:rPr lang="pl-PL" dirty="0" smtClean="0"/>
-              <a:t>wykładzie. </a:t>
+              <a:t>Tutaj schemat blokowy algorytmu opartego na wykładzie. </a:t>
             </a:r>
             <a:endParaRPr lang="pl-PL" dirty="0"/>
           </a:p>
@@ -6142,7 +6134,7 @@
           <a:p>
             <a:r>
               <a:rPr lang="pl-PL" dirty="0" smtClean="0"/>
-              <a:t>Referencje</a:t>
+              <a:t>Kod</a:t>
             </a:r>
             <a:endParaRPr lang="pl-PL" dirty="0"/>
           </a:p>
@@ -6158,16 +6150,9 @@
             <p:ph idx="1"/>
           </p:nvPr>
         </p:nvSpPr>
-        <p:spPr>
-          <a:xfrm>
-            <a:off x="2438400" y="2286000"/>
-            <a:ext cx="6598096" cy="3840163"/>
-          </a:xfrm>
-        </p:spPr>
-        <p:txBody>
-          <a:bodyPr>
-            <a:normAutofit/>
-          </a:bodyPr>
+        <p:spPr/>
+        <p:txBody>
+          <a:bodyPr/>
           <a:lstStyle/>
           <a:p>
             <a:pPr marL="0" indent="0">
@@ -6175,80 +6160,24 @@
             </a:pPr>
             <a:r>
               <a:rPr lang="pl-PL" dirty="0" smtClean="0"/>
-              <a:t>GPGPU</a:t>
-            </a:r>
-            <a:endParaRPr lang="pl-PL" dirty="0" smtClean="0">
-              <a:hlinkClick r:id="rId2"/>
-            </a:endParaRPr>
-          </a:p>
-          <a:p>
-            <a:r>
-              <a:rPr lang="pl-PL" dirty="0"/>
-              <a:t>http://</a:t>
+              <a:t>Tutaj dać </a:t>
+            </a:r>
+            <a:r>
+              <a:rPr lang="pl-PL" dirty="0" err="1" smtClean="0"/>
+              <a:t>kodzik</a:t>
             </a:r>
             <a:r>
               <a:rPr lang="pl-PL" dirty="0" smtClean="0"/>
-              <a:t>www.gpucomputing.net</a:t>
-            </a:r>
-            <a:endParaRPr lang="pl-PL" dirty="0" smtClean="0">
-              <a:hlinkClick r:id="rId2"/>
-            </a:endParaRPr>
-          </a:p>
-          <a:p>
-            <a:r>
-              <a:rPr lang="pl-PL" dirty="0" smtClean="0">
-                <a:hlinkClick r:id="rId2"/>
-              </a:rPr>
-              <a:t>http</a:t>
-            </a:r>
-            <a:r>
-              <a:rPr lang="pl-PL" dirty="0" smtClean="0">
-                <a:hlinkClick r:id="rId2"/>
-              </a:rPr>
-              <a:t>://www.nvidia.com</a:t>
-            </a:r>
-            <a:endParaRPr lang="pl-PL" dirty="0" smtClean="0"/>
-          </a:p>
-          <a:p>
-            <a:r>
-              <a:rPr lang="pl-PL" dirty="0">
-                <a:hlinkClick r:id="rId3"/>
-              </a:rPr>
-              <a:t>http://www.khronos.org/opencl</a:t>
-            </a:r>
-            <a:r>
-              <a:rPr lang="pl-PL" dirty="0" smtClean="0">
-                <a:hlinkClick r:id="rId3"/>
-              </a:rPr>
-              <a:t>/</a:t>
-            </a:r>
-            <a:endParaRPr lang="pl-PL" dirty="0" smtClean="0"/>
-          </a:p>
-          <a:p>
-            <a:r>
-              <a:rPr lang="pl-PL" dirty="0">
-                <a:hlinkClick r:id="rId4"/>
-              </a:rPr>
-              <a:t>http://software.intel.com/en-us/articles/opencl-sdk</a:t>
-            </a:r>
-            <a:r>
-              <a:rPr lang="pl-PL" dirty="0" smtClean="0">
-                <a:hlinkClick r:id="rId4"/>
-              </a:rPr>
-              <a:t>/</a:t>
-            </a:r>
-            <a:endParaRPr lang="pl-PL" dirty="0" smtClean="0"/>
-          </a:p>
-          <a:p>
-            <a:r>
-              <a:rPr lang="pl-PL" dirty="0">
-                <a:hlinkClick r:id="rId5"/>
-              </a:rPr>
-              <a:t>http://www.jocl.org/</a:t>
-            </a:r>
-            <a:endParaRPr lang="pl-PL" dirty="0" smtClean="0"/>
-          </a:p>
-          <a:p>
+              <a:t> na </a:t>
+            </a:r>
+            <a:r>
+              <a:rPr lang="pl-PL" dirty="0" err="1" smtClean="0"/>
+              <a:t>gitHuba</a:t>
+            </a:r>
+            <a:r>
+              <a:rPr lang="pl-PL" dirty="0" smtClean="0"/>
+              <a:t>.</a:t>
+            </a:r>
             <a:endParaRPr lang="pl-PL" dirty="0"/>
           </a:p>
         </p:txBody>
@@ -6256,7 +6185,7 @@
     </p:spTree>
     <p:extLst>
       <p:ext uri="{BB962C8B-B14F-4D97-AF65-F5344CB8AC3E}">
-        <p14:creationId xmlns:p14="http://schemas.microsoft.com/office/powerpoint/2010/main" val="1708677104"/>
+        <p14:creationId xmlns:p14="http://schemas.microsoft.com/office/powerpoint/2010/main" val="3558109262"/>
       </p:ext>
     </p:extLst>
   </p:cSld>
@@ -6318,13 +6247,13 @@
         </p:nvSpPr>
         <p:spPr>
           <a:xfrm>
-            <a:off x="2438400" y="2204864"/>
+            <a:off x="2438400" y="2286000"/>
             <a:ext cx="6598096" cy="3840163"/>
           </a:xfrm>
         </p:spPr>
         <p:txBody>
           <a:bodyPr>
-            <a:normAutofit lnSpcReduction="10000"/>
+            <a:normAutofit fontScale="92500" lnSpcReduction="10000"/>
           </a:bodyPr>
           <a:lstStyle/>
           <a:p>
@@ -6332,18 +6261,12 @@
               <a:buNone/>
             </a:pPr>
             <a:r>
-              <a:rPr lang="en-US" dirty="0"/>
-              <a:t>Data Mining</a:t>
-            </a:r>
-          </a:p>
-          <a:p>
-            <a:r>
-              <a:rPr lang="pl-PL" dirty="0">
-                <a:hlinkClick r:id="rId2"/>
-              </a:rPr>
-              <a:t>http://code.google.com/p/gpuminer/</a:t>
-            </a:r>
-            <a:endParaRPr lang="pl-PL" dirty="0"/>
+              <a:rPr lang="pl-PL" dirty="0" smtClean="0"/>
+              <a:t>GPGPU</a:t>
+            </a:r>
+            <a:endParaRPr lang="pl-PL" dirty="0" smtClean="0">
+              <a:hlinkClick r:id="rId2"/>
+            </a:endParaRPr>
           </a:p>
           <a:p>
             <a:r>
@@ -6356,52 +6279,88 @@
               <a:rPr lang="pl-PL" dirty="0" smtClean="0">
                 <a:hlinkClick r:id="rId3"/>
               </a:rPr>
-              <a:t>www.nvidia.com/object/data_mining_analytics_database.html</a:t>
+              <a:t>www.gpucomputing.net</a:t>
             </a:r>
             <a:endParaRPr lang="pl-PL" dirty="0" smtClean="0"/>
-          </a:p>
-          <a:p>
-            <a:pPr marL="0" indent="0">
-              <a:buNone/>
-            </a:pPr>
-            <a:r>
-              <a:rPr lang="pl-PL" dirty="0" smtClean="0"/>
-              <a:t>Publikacje</a:t>
-            </a:r>
-            <a:endParaRPr lang="en-US" dirty="0" smtClean="0"/>
           </a:p>
           <a:p>
             <a:r>
               <a:rPr lang="pl-PL" dirty="0">
                 <a:hlinkClick r:id="rId4"/>
               </a:rPr>
-              <a:t>http://</a:t>
+              <a:t>http://www.khronos.org/opencl</a:t>
             </a:r>
             <a:r>
               <a:rPr lang="pl-PL" dirty="0" smtClean="0">
                 <a:hlinkClick r:id="rId4"/>
               </a:rPr>
-              <a:t>ieeexplore.ieee.org/xpl/freeabs_all.jsp?arnumber=5641778</a:t>
+              <a:t>/</a:t>
+            </a:r>
+            <a:endParaRPr lang="pl-PL" dirty="0" smtClean="0">
+              <a:hlinkClick r:id="rId2"/>
+            </a:endParaRPr>
+          </a:p>
+          <a:p>
+            <a:r>
+              <a:rPr lang="pl-PL" dirty="0" smtClean="0">
+                <a:hlinkClick r:id="rId2"/>
+              </a:rPr>
+              <a:t>http://</a:t>
+            </a:r>
+            <a:r>
+              <a:rPr lang="pl-PL" dirty="0" smtClean="0">
+                <a:hlinkClick r:id="rId2"/>
+              </a:rPr>
+              <a:t>www.nvidia.com</a:t>
             </a:r>
             <a:endParaRPr lang="pl-PL" dirty="0" smtClean="0"/>
           </a:p>
           <a:p>
             <a:r>
-              <a:rPr lang="pl-PL" smtClean="0"/>
-              <a:t>TODO: Ta </a:t>
-            </a:r>
-            <a:r>
-              <a:rPr lang="pl-PL" dirty="0" smtClean="0"/>
-              <a:t>publikacja z ACM z </a:t>
-            </a:r>
-            <a:r>
-              <a:rPr lang="pl-PL" dirty="0" err="1" smtClean="0"/>
-              <a:t>gpu</a:t>
-            </a:r>
-            <a:r>
-              <a:rPr lang="pl-PL" dirty="0" smtClean="0"/>
-              <a:t> minera chińczyków</a:t>
-            </a:r>
+              <a:rPr lang="pl-PL" dirty="0" smtClean="0">
+                <a:hlinkClick r:id="rId5"/>
+              </a:rPr>
+              <a:t>http</a:t>
+            </a:r>
+            <a:r>
+              <a:rPr lang="pl-PL" dirty="0">
+                <a:hlinkClick r:id="rId5"/>
+              </a:rPr>
+              <a:t>://</a:t>
+            </a:r>
+            <a:r>
+              <a:rPr lang="pl-PL" dirty="0" smtClean="0">
+                <a:hlinkClick r:id="rId5"/>
+              </a:rPr>
+              <a:t>developer.amd.com/gpu/AMDAPPSDK/Pages/default.aspx</a:t>
+            </a:r>
+            <a:endParaRPr lang="pl-PL" dirty="0" smtClean="0"/>
+          </a:p>
+          <a:p>
+            <a:r>
+              <a:rPr lang="pl-PL" dirty="0">
+                <a:hlinkClick r:id="rId6"/>
+              </a:rPr>
+              <a:t>http://software.intel.com/en-us/articles/opencl-sdk</a:t>
+            </a:r>
+            <a:r>
+              <a:rPr lang="pl-PL" dirty="0" smtClean="0">
+                <a:hlinkClick r:id="rId6"/>
+              </a:rPr>
+              <a:t>/</a:t>
+            </a:r>
+            <a:endParaRPr lang="pl-PL" dirty="0" smtClean="0"/>
+          </a:p>
+          <a:p>
+            <a:r>
+              <a:rPr lang="pl-PL" dirty="0">
+                <a:hlinkClick r:id="rId7"/>
+              </a:rPr>
+              <a:t>http://www.jocl.org/</a:t>
+            </a:r>
+            <a:endParaRPr lang="pl-PL" dirty="0" smtClean="0"/>
+          </a:p>
+          <a:p>
             <a:endParaRPr lang="pl-PL" dirty="0"/>
           </a:p>
         </p:txBody>
@@ -6409,7 +6368,7 @@
     </p:spTree>
     <p:extLst>
       <p:ext uri="{BB962C8B-B14F-4D97-AF65-F5344CB8AC3E}">
-        <p14:creationId xmlns:p14="http://schemas.microsoft.com/office/powerpoint/2010/main" val="3607063138"/>
+        <p14:creationId xmlns:p14="http://schemas.microsoft.com/office/powerpoint/2010/main" val="1708677104"/>
       </p:ext>
     </p:extLst>
   </p:cSld>
@@ -6453,7 +6412,7 @@
           <a:p>
             <a:r>
               <a:rPr lang="pl-PL" dirty="0" smtClean="0"/>
-              <a:t>Kod</a:t>
+              <a:t>Referencje</a:t>
             </a:r>
             <a:endParaRPr lang="pl-PL" dirty="0"/>
           </a:p>
@@ -6469,33 +6428,91 @@
             <p:ph idx="1"/>
           </p:nvPr>
         </p:nvSpPr>
-        <p:spPr/>
-        <p:txBody>
-          <a:bodyPr/>
+        <p:spPr>
+          <a:xfrm>
+            <a:off x="2438400" y="2204864"/>
+            <a:ext cx="6598096" cy="3840163"/>
+          </a:xfrm>
+        </p:spPr>
+        <p:txBody>
+          <a:bodyPr>
+            <a:normAutofit lnSpcReduction="10000"/>
+          </a:bodyPr>
           <a:lstStyle/>
           <a:p>
             <a:pPr marL="0" indent="0">
               <a:buNone/>
             </a:pPr>
             <a:r>
+              <a:rPr lang="en-US" dirty="0"/>
+              <a:t>Data Mining</a:t>
+            </a:r>
+          </a:p>
+          <a:p>
+            <a:r>
+              <a:rPr lang="pl-PL" dirty="0">
+                <a:hlinkClick r:id="rId2"/>
+              </a:rPr>
+              <a:t>http://code.google.com/p/gpuminer/</a:t>
+            </a:r>
+            <a:endParaRPr lang="pl-PL" dirty="0"/>
+          </a:p>
+          <a:p>
+            <a:r>
+              <a:rPr lang="pl-PL" dirty="0">
+                <a:hlinkClick r:id="rId3"/>
+              </a:rPr>
+              <a:t>http://</a:t>
+            </a:r>
+            <a:r>
+              <a:rPr lang="pl-PL" dirty="0" smtClean="0">
+                <a:hlinkClick r:id="rId3"/>
+              </a:rPr>
+              <a:t>www.nvidia.com/object/data_mining_analytics_database.html</a:t>
+            </a:r>
+            <a:endParaRPr lang="pl-PL" dirty="0" smtClean="0"/>
+          </a:p>
+          <a:p>
+            <a:pPr marL="0" indent="0">
+              <a:buNone/>
+            </a:pPr>
+            <a:r>
               <a:rPr lang="pl-PL" dirty="0" smtClean="0"/>
-              <a:t>Tutaj dać </a:t>
+              <a:t>Publikacje</a:t>
+            </a:r>
+            <a:endParaRPr lang="en-US" dirty="0" smtClean="0"/>
+          </a:p>
+          <a:p>
+            <a:r>
+              <a:rPr lang="pl-PL" dirty="0">
+                <a:hlinkClick r:id="rId4"/>
+              </a:rPr>
+              <a:t>http://</a:t>
+            </a:r>
+            <a:r>
+              <a:rPr lang="pl-PL" dirty="0" smtClean="0">
+                <a:hlinkClick r:id="rId4"/>
+              </a:rPr>
+              <a:t>ieeexplore.ieee.org/xpl/freeabs_all.jsp?arnumber=5641778</a:t>
+            </a:r>
+            <a:endParaRPr lang="pl-PL" dirty="0" smtClean="0"/>
+          </a:p>
+          <a:p>
+            <a:r>
+              <a:rPr lang="pl-PL" smtClean="0"/>
+              <a:t>TODO: Ta </a:t>
+            </a:r>
+            <a:r>
+              <a:rPr lang="pl-PL" dirty="0" smtClean="0"/>
+              <a:t>publikacja z ACM z </a:t>
             </a:r>
             <a:r>
               <a:rPr lang="pl-PL" dirty="0" err="1" smtClean="0"/>
-              <a:t>kodzik</a:t>
+              <a:t>gpu</a:t>
             </a:r>
             <a:r>
               <a:rPr lang="pl-PL" dirty="0" smtClean="0"/>
-              <a:t> na </a:t>
-            </a:r>
-            <a:r>
-              <a:rPr lang="pl-PL" dirty="0" err="1" smtClean="0"/>
-              <a:t>gitHuba</a:t>
-            </a:r>
-            <a:r>
-              <a:rPr lang="pl-PL" dirty="0" smtClean="0"/>
-              <a:t>.</a:t>
+              <a:t> minera chińczyków</a:t>
             </a:r>
             <a:endParaRPr lang="pl-PL" dirty="0"/>
           </a:p>
@@ -6504,7 +6521,7 @@
     </p:spTree>
     <p:extLst>
       <p:ext uri="{BB962C8B-B14F-4D97-AF65-F5344CB8AC3E}">
-        <p14:creationId xmlns:p14="http://schemas.microsoft.com/office/powerpoint/2010/main" val="3558109262"/>
+        <p14:creationId xmlns:p14="http://schemas.microsoft.com/office/powerpoint/2010/main" val="3607063138"/>
       </p:ext>
     </p:extLst>
   </p:cSld>

</xml_diff>

<commit_message>
Adding dividing the binary item sets
</commit_message>
<xml_diff>
--- a/presentation/GPGPU_in_data_minig.pptx
+++ b/presentation/GPGPU_in_data_minig.pptx
@@ -6253,7 +6253,7 @@
         </p:spPr>
         <p:txBody>
           <a:bodyPr>
-            <a:normAutofit fontScale="92500" lnSpcReduction="10000"/>
+            <a:normAutofit fontScale="85000" lnSpcReduction="20000"/>
           </a:bodyPr>
           <a:lstStyle/>
           <a:p>
@@ -6305,13 +6305,7 @@
               <a:rPr lang="pl-PL" dirty="0" smtClean="0">
                 <a:hlinkClick r:id="rId2"/>
               </a:rPr>
-              <a:t>http://</a:t>
-            </a:r>
-            <a:r>
-              <a:rPr lang="pl-PL" dirty="0" smtClean="0">
-                <a:hlinkClick r:id="rId2"/>
-              </a:rPr>
-              <a:t>www.nvidia.com</a:t>
+              <a:t>http://www.nvidia.com</a:t>
             </a:r>
             <a:endParaRPr lang="pl-PL" dirty="0" smtClean="0"/>
           </a:p>
@@ -6356,7 +6350,22 @@
               <a:rPr lang="pl-PL" dirty="0">
                 <a:hlinkClick r:id="rId7"/>
               </a:rPr>
-              <a:t>http://www.jocl.org/</a:t>
+              <a:t>http://www.jocl.org</a:t>
+            </a:r>
+            <a:r>
+              <a:rPr lang="pl-PL" dirty="0" smtClean="0">
+                <a:hlinkClick r:id="rId7"/>
+              </a:rPr>
+              <a:t>/</a:t>
+            </a:r>
+            <a:endParaRPr lang="pl-PL" dirty="0" smtClean="0"/>
+          </a:p>
+          <a:p>
+            <a:r>
+              <a:rPr lang="pl-PL" dirty="0">
+                <a:hlinkClick r:id="rId8"/>
+              </a:rPr>
+              <a:t>http://www.mimuw.edu.pl/~krzadca/opencl.html</a:t>
             </a:r>
             <a:endParaRPr lang="pl-PL" dirty="0" smtClean="0"/>
           </a:p>

</xml_diff>

<commit_message>
Added table with bits
</commit_message>
<xml_diff>
--- a/presentation/GPGPU_in_data_minig.pptx
+++ b/presentation/GPGPU_in_data_minig.pptx
@@ -5,7 +5,7 @@
     <p:sldMasterId id="2147483660" r:id="rId1"/>
   </p:sldMasterIdLst>
   <p:notesMasterIdLst>
-    <p:notesMasterId r:id="rId26"/>
+    <p:notesMasterId r:id="rId24"/>
   </p:notesMasterIdLst>
   <p:sldIdLst>
     <p:sldId id="256" r:id="rId2"/>
@@ -19,19 +19,17 @@
     <p:sldId id="274" r:id="rId10"/>
     <p:sldId id="281" r:id="rId11"/>
     <p:sldId id="275" r:id="rId12"/>
-    <p:sldId id="265" r:id="rId13"/>
-    <p:sldId id="266" r:id="rId14"/>
-    <p:sldId id="259" r:id="rId15"/>
-    <p:sldId id="262" r:id="rId16"/>
-    <p:sldId id="272" r:id="rId17"/>
-    <p:sldId id="263" r:id="rId18"/>
-    <p:sldId id="264" r:id="rId19"/>
-    <p:sldId id="273" r:id="rId20"/>
-    <p:sldId id="268" r:id="rId21"/>
-    <p:sldId id="269" r:id="rId22"/>
-    <p:sldId id="267" r:id="rId23"/>
-    <p:sldId id="261" r:id="rId24"/>
-    <p:sldId id="270" r:id="rId25"/>
+    <p:sldId id="259" r:id="rId13"/>
+    <p:sldId id="262" r:id="rId14"/>
+    <p:sldId id="272" r:id="rId15"/>
+    <p:sldId id="263" r:id="rId16"/>
+    <p:sldId id="264" r:id="rId17"/>
+    <p:sldId id="273" r:id="rId18"/>
+    <p:sldId id="268" r:id="rId19"/>
+    <p:sldId id="269" r:id="rId20"/>
+    <p:sldId id="267" r:id="rId21"/>
+    <p:sldId id="261" r:id="rId22"/>
+    <p:sldId id="270" r:id="rId23"/>
   </p:sldIdLst>
   <p:sldSz cx="9144000" cy="6858000" type="screen4x3"/>
   <p:notesSz cx="6858000" cy="9144000"/>
@@ -135,13 +133,25 @@
 
 <file path=ppt/charts/chart1.xml><?xml version="1.0" encoding="utf-8"?>
 <c:chartSpace xmlns:c="http://schemas.openxmlformats.org/drawingml/2006/chart" xmlns:a="http://schemas.openxmlformats.org/drawingml/2006/main" xmlns:r="http://schemas.openxmlformats.org/officeDocument/2006/relationships">
+  <c:date1904 val="0"/>
   <c:lang val="pl-PL"/>
+  <c:roundedCorners val="0"/>
+  <mc:AlternateContent xmlns:mc="http://schemas.openxmlformats.org/markup-compatibility/2006">
+    <mc:Choice xmlns:c14="http://schemas.microsoft.com/office/drawing/2007/8/2/chart" Requires="c14">
+      <c14:style val="102"/>
+    </mc:Choice>
+    <mc:Fallback>
+      <c:style val="2"/>
+    </mc:Fallback>
+  </mc:AlternateContent>
   <c:chart>
+    <c:autoTitleDeleted val="0"/>
     <c:plotArea>
       <c:layout/>
       <c:barChart>
         <c:barDir val="col"/>
         <c:grouping val="clustered"/>
+        <c:varyColors val="0"/>
         <c:ser>
           <c:idx val="0"/>
           <c:order val="0"/>
@@ -156,6 +166,7 @@
               </c:strCache>
             </c:strRef>
           </c:tx>
+          <c:invertIfNegative val="0"/>
           <c:cat>
             <c:strRef>
               <c:f>Arkusz1!$A$2:$A$4</c:f>
@@ -177,7 +188,7 @@
             <c:numRef>
               <c:f>Arkusz1!$B$2:$B$4</c:f>
               <c:numCache>
-                <c:formatCode>General</c:formatCode>
+                <c:formatCode>Standardowy</c:formatCode>
                 <c:ptCount val="3"/>
                 <c:pt idx="0">
                   <c:v>0.4</c:v>
@@ -206,6 +217,7 @@
               </c:strCache>
             </c:strRef>
           </c:tx>
+          <c:invertIfNegative val="0"/>
           <c:cat>
             <c:strRef>
               <c:f>Arkusz1!$A$2:$A$4</c:f>
@@ -227,7 +239,7 @@
             <c:numRef>
               <c:f>Arkusz1!$C$2:$C$4</c:f>
               <c:numCache>
-                <c:formatCode>General</c:formatCode>
+                <c:formatCode>Standardowy</c:formatCode>
                 <c:ptCount val="3"/>
                 <c:pt idx="0">
                   <c:v>0.2</c:v>
@@ -256,6 +268,7 @@
               </c:strCache>
             </c:strRef>
           </c:tx>
+          <c:invertIfNegative val="0"/>
           <c:cat>
             <c:strRef>
               <c:f>Arkusz1!$A$2:$A$4</c:f>
@@ -277,7 +290,7 @@
             <c:numRef>
               <c:f>Arkusz1!$D$2:$D$4</c:f>
               <c:numCache>
-                <c:formatCode>General</c:formatCode>
+                <c:formatCode>Standardowy</c:formatCode>
                 <c:ptCount val="3"/>
                 <c:pt idx="0">
                   <c:v>0.2</c:v>
@@ -292,15 +305,24 @@
             </c:numRef>
           </c:val>
         </c:ser>
-        <c:dLbls/>
-        <c:axId val="80921728"/>
-        <c:axId val="80923648"/>
+        <c:dLbls>
+          <c:showLegendKey val="0"/>
+          <c:showVal val="0"/>
+          <c:showCatName val="0"/>
+          <c:showSerName val="0"/>
+          <c:showPercent val="0"/>
+          <c:showBubbleSize val="0"/>
+        </c:dLbls>
+        <c:gapWidth val="150"/>
+        <c:axId val="42383616"/>
+        <c:axId val="44606208"/>
       </c:barChart>
       <c:catAx>
-        <c:axId val="80921728"/>
+        <c:axId val="42383616"/>
         <c:scaling>
           <c:orientation val="minMax"/>
         </c:scaling>
+        <c:delete val="0"/>
         <c:axPos val="b"/>
         <c:title>
           <c:tx>
@@ -324,19 +346,24 @@
             </c:rich>
           </c:tx>
           <c:layout/>
+          <c:overlay val="0"/>
         </c:title>
+        <c:majorTickMark val="out"/>
+        <c:minorTickMark val="none"/>
         <c:tickLblPos val="nextTo"/>
-        <c:crossAx val="80923648"/>
+        <c:crossAx val="44606208"/>
         <c:crosses val="autoZero"/>
         <c:auto val="1"/>
         <c:lblAlgn val="ctr"/>
         <c:lblOffset val="100"/>
+        <c:noMultiLvlLbl val="0"/>
       </c:catAx>
       <c:valAx>
-        <c:axId val="80923648"/>
+        <c:axId val="44606208"/>
         <c:scaling>
           <c:orientation val="minMax"/>
         </c:scaling>
+        <c:delete val="0"/>
         <c:axPos val="l"/>
         <c:title>
           <c:tx>
@@ -355,10 +382,13 @@
             </c:rich>
           </c:tx>
           <c:layout/>
+          <c:overlay val="0"/>
         </c:title>
-        <c:numFmt formatCode="General" sourceLinked="1"/>
+        <c:numFmt formatCode="Standardowy" sourceLinked="1"/>
+        <c:majorTickMark val="out"/>
+        <c:minorTickMark val="none"/>
         <c:tickLblPos val="nextTo"/>
-        <c:crossAx val="80921728"/>
+        <c:crossAx val="42383616"/>
         <c:crosses val="autoZero"/>
         <c:crossBetween val="between"/>
       </c:valAx>
@@ -366,11 +396,15 @@
     <c:legend>
       <c:legendPos val="r"/>
       <c:layout/>
+      <c:overlay val="0"/>
     </c:legend>
     <c:plotVisOnly val="1"/>
     <c:dispBlanksAs val="gap"/>
+    <c:showDLblsOverMax val="0"/>
   </c:chart>
-  <c:externalData r:id="rId1"/>
+  <c:externalData r:id="rId1">
+    <c:autoUpdate val="0"/>
+  </c:externalData>
 </c:chartSpace>
 </file>
 
@@ -457,7 +491,7 @@
             <a:fld id="{55FB535A-685B-45D4-83C2-0699426FA084}" type="datetimeFigureOut">
               <a:rPr lang="pl-PL" smtClean="0"/>
               <a:pPr/>
-              <a:t>2011-05-18</a:t>
+              <a:t>2011-05-19</a:t>
             </a:fld>
             <a:endParaRPr lang="pl-PL"/>
           </a:p>
@@ -626,7 +660,7 @@
     </p:spTree>
     <p:extLst>
       <p:ext uri="{BB962C8B-B14F-4D97-AF65-F5344CB8AC3E}">
-        <p14:creationId xmlns:p14="http://schemas.microsoft.com/office/powerpoint/2010/main" xmlns="" val="1920552042"/>
+        <p14:creationId xmlns:p14="http://schemas.microsoft.com/office/powerpoint/2010/main" val="1920552042"/>
       </p:ext>
     </p:extLst>
   </p:cSld>
@@ -861,7 +895,7 @@
     </p:spTree>
     <p:extLst>
       <p:ext uri="{BB962C8B-B14F-4D97-AF65-F5344CB8AC3E}">
-        <p14:creationId xmlns:p14="http://schemas.microsoft.com/office/powerpoint/2010/main" xmlns="" val="2338691016"/>
+        <p14:creationId xmlns:p14="http://schemas.microsoft.com/office/powerpoint/2010/main" val="2338691016"/>
       </p:ext>
     </p:extLst>
   </p:cSld>
@@ -950,7 +984,7 @@
     </p:spTree>
     <p:extLst>
       <p:ext uri="{BB962C8B-B14F-4D97-AF65-F5344CB8AC3E}">
-        <p14:creationId xmlns:p14="http://schemas.microsoft.com/office/powerpoint/2010/main" xmlns="" val="1799718020"/>
+        <p14:creationId xmlns:p14="http://schemas.microsoft.com/office/powerpoint/2010/main" val="1799718020"/>
       </p:ext>
     </p:extLst>
   </p:cSld>
@@ -1059,7 +1093,7 @@
     </p:spTree>
     <p:extLst>
       <p:ext uri="{BB962C8B-B14F-4D97-AF65-F5344CB8AC3E}">
-        <p14:creationId xmlns:p14="http://schemas.microsoft.com/office/powerpoint/2010/main" xmlns="" val="44818540"/>
+        <p14:creationId xmlns:p14="http://schemas.microsoft.com/office/powerpoint/2010/main" val="44818540"/>
       </p:ext>
     </p:extLst>
   </p:cSld>
@@ -1139,7 +1173,7 @@
             <a:fld id="{645E967B-6AFF-4995-A810-89F62F1580F4}" type="slidenum">
               <a:rPr lang="pl-PL" smtClean="0"/>
               <a:pPr/>
-              <a:t>14</a:t>
+              <a:t>12</a:t>
             </a:fld>
             <a:endParaRPr lang="pl-PL"/>
           </a:p>
@@ -1148,7 +1182,7 @@
     </p:spTree>
     <p:extLst>
       <p:ext uri="{BB962C8B-B14F-4D97-AF65-F5344CB8AC3E}">
-        <p14:creationId xmlns:p14="http://schemas.microsoft.com/office/powerpoint/2010/main" xmlns="" val="1702268611"/>
+        <p14:creationId xmlns:p14="http://schemas.microsoft.com/office/powerpoint/2010/main" val="1702268611"/>
       </p:ext>
     </p:extLst>
   </p:cSld>
@@ -1232,7 +1266,7 @@
             <a:fld id="{645E967B-6AFF-4995-A810-89F62F1580F4}" type="slidenum">
               <a:rPr lang="pl-PL" smtClean="0"/>
               <a:pPr/>
-              <a:t>15</a:t>
+              <a:t>13</a:t>
             </a:fld>
             <a:endParaRPr lang="pl-PL"/>
           </a:p>
@@ -1241,7 +1275,7 @@
     </p:spTree>
     <p:extLst>
       <p:ext uri="{BB962C8B-B14F-4D97-AF65-F5344CB8AC3E}">
-        <p14:creationId xmlns:p14="http://schemas.microsoft.com/office/powerpoint/2010/main" xmlns="" val="676225731"/>
+        <p14:creationId xmlns:p14="http://schemas.microsoft.com/office/powerpoint/2010/main" val="676225731"/>
       </p:ext>
     </p:extLst>
   </p:cSld>
@@ -1321,7 +1355,7 @@
             <a:fld id="{645E967B-6AFF-4995-A810-89F62F1580F4}" type="slidenum">
               <a:rPr lang="pl-PL" smtClean="0"/>
               <a:pPr/>
-              <a:t>17</a:t>
+              <a:t>15</a:t>
             </a:fld>
             <a:endParaRPr lang="pl-PL"/>
           </a:p>
@@ -1330,7 +1364,7 @@
     </p:spTree>
     <p:extLst>
       <p:ext uri="{BB962C8B-B14F-4D97-AF65-F5344CB8AC3E}">
-        <p14:creationId xmlns:p14="http://schemas.microsoft.com/office/powerpoint/2010/main" xmlns="" val="924685857"/>
+        <p14:creationId xmlns:p14="http://schemas.microsoft.com/office/powerpoint/2010/main" val="924685857"/>
       </p:ext>
     </p:extLst>
   </p:cSld>
@@ -1430,7 +1464,7 @@
             <a:fld id="{645E967B-6AFF-4995-A810-89F62F1580F4}" type="slidenum">
               <a:rPr lang="pl-PL" smtClean="0"/>
               <a:pPr/>
-              <a:t>18</a:t>
+              <a:t>16</a:t>
             </a:fld>
             <a:endParaRPr lang="pl-PL"/>
           </a:p>
@@ -1439,7 +1473,7 @@
     </p:spTree>
     <p:extLst>
       <p:ext uri="{BB962C8B-B14F-4D97-AF65-F5344CB8AC3E}">
-        <p14:creationId xmlns:p14="http://schemas.microsoft.com/office/powerpoint/2010/main" xmlns="" val="3579725393"/>
+        <p14:creationId xmlns:p14="http://schemas.microsoft.com/office/powerpoint/2010/main" val="3579725393"/>
       </p:ext>
     </p:extLst>
   </p:cSld>
@@ -1523,7 +1557,7 @@
             <a:fld id="{645E967B-6AFF-4995-A810-89F62F1580F4}" type="slidenum">
               <a:rPr lang="pl-PL" smtClean="0"/>
               <a:pPr/>
-              <a:t>20</a:t>
+              <a:t>18</a:t>
             </a:fld>
             <a:endParaRPr lang="pl-PL"/>
           </a:p>
@@ -1532,7 +1566,7 @@
     </p:spTree>
     <p:extLst>
       <p:ext uri="{BB962C8B-B14F-4D97-AF65-F5344CB8AC3E}">
-        <p14:creationId xmlns:p14="http://schemas.microsoft.com/office/powerpoint/2010/main" xmlns="" val="644825522"/>
+        <p14:creationId xmlns:p14="http://schemas.microsoft.com/office/powerpoint/2010/main" val="644825522"/>
       </p:ext>
     </p:extLst>
   </p:cSld>
@@ -1616,7 +1650,7 @@
             <a:fld id="{645E967B-6AFF-4995-A810-89F62F1580F4}" type="slidenum">
               <a:rPr lang="pl-PL" smtClean="0"/>
               <a:pPr/>
-              <a:t>21</a:t>
+              <a:t>19</a:t>
             </a:fld>
             <a:endParaRPr lang="pl-PL"/>
           </a:p>
@@ -1625,7 +1659,7 @@
     </p:spTree>
     <p:extLst>
       <p:ext uri="{BB962C8B-B14F-4D97-AF65-F5344CB8AC3E}">
-        <p14:creationId xmlns:p14="http://schemas.microsoft.com/office/powerpoint/2010/main" xmlns="" val="2411960834"/>
+        <p14:creationId xmlns:p14="http://schemas.microsoft.com/office/powerpoint/2010/main" val="2411960834"/>
       </p:ext>
     </p:extLst>
   </p:cSld>
@@ -1905,7 +1939,7 @@
             <a:fld id="{FD17FA3B-C404-4317-B0BC-953931111309}" type="datetimeFigureOut">
               <a:rPr lang="pl-PL" smtClean="0"/>
               <a:pPr/>
-              <a:t>2011-05-18</a:t>
+              <a:t>2011-05-19</a:t>
             </a:fld>
             <a:endParaRPr lang="pl-PL"/>
           </a:p>
@@ -2275,7 +2309,7 @@
             <a:fld id="{FD17FA3B-C404-4317-B0BC-953931111309}" type="datetimeFigureOut">
               <a:rPr lang="pl-PL" smtClean="0"/>
               <a:pPr/>
-              <a:t>2011-05-18</a:t>
+              <a:t>2011-05-19</a:t>
             </a:fld>
             <a:endParaRPr lang="pl-PL"/>
           </a:p>
@@ -2656,7 +2690,7 @@
             <a:fld id="{FD17FA3B-C404-4317-B0BC-953931111309}" type="datetimeFigureOut">
               <a:rPr lang="pl-PL" smtClean="0"/>
               <a:pPr/>
-              <a:t>2011-05-18</a:t>
+              <a:t>2011-05-19</a:t>
             </a:fld>
             <a:endParaRPr lang="pl-PL"/>
           </a:p>
@@ -2828,7 +2862,7 @@
             <a:fld id="{FD17FA3B-C404-4317-B0BC-953931111309}" type="datetimeFigureOut">
               <a:rPr lang="pl-PL" smtClean="0"/>
               <a:pPr/>
-              <a:t>2011-05-18</a:t>
+              <a:t>2011-05-19</a:t>
             </a:fld>
             <a:endParaRPr lang="pl-PL"/>
           </a:p>
@@ -3275,7 +3309,7 @@
             <a:fld id="{FD17FA3B-C404-4317-B0BC-953931111309}" type="datetimeFigureOut">
               <a:rPr lang="pl-PL" smtClean="0"/>
               <a:pPr/>
-              <a:t>2011-05-18</a:t>
+              <a:t>2011-05-19</a:t>
             </a:fld>
             <a:endParaRPr lang="pl-PL"/>
           </a:p>
@@ -3595,7 +3629,7 @@
             <a:fld id="{FD17FA3B-C404-4317-B0BC-953931111309}" type="datetimeFigureOut">
               <a:rPr lang="pl-PL" smtClean="0"/>
               <a:pPr/>
-              <a:t>2011-05-18</a:t>
+              <a:t>2011-05-19</a:t>
             </a:fld>
             <a:endParaRPr lang="pl-PL"/>
           </a:p>
@@ -4140,7 +4174,7 @@
             <a:fld id="{FD17FA3B-C404-4317-B0BC-953931111309}" type="datetimeFigureOut">
               <a:rPr lang="pl-PL" smtClean="0"/>
               <a:pPr/>
-              <a:t>2011-05-18</a:t>
+              <a:t>2011-05-19</a:t>
             </a:fld>
             <a:endParaRPr lang="pl-PL"/>
           </a:p>
@@ -4420,7 +4454,7 @@
             <a:fld id="{FD17FA3B-C404-4317-B0BC-953931111309}" type="datetimeFigureOut">
               <a:rPr lang="pl-PL" smtClean="0"/>
               <a:pPr/>
-              <a:t>2011-05-18</a:t>
+              <a:t>2011-05-19</a:t>
             </a:fld>
             <a:endParaRPr lang="pl-PL"/>
           </a:p>
@@ -4624,7 +4658,7 @@
             <a:fld id="{FD17FA3B-C404-4317-B0BC-953931111309}" type="datetimeFigureOut">
               <a:rPr lang="pl-PL" smtClean="0"/>
               <a:pPr/>
-              <a:t>2011-05-18</a:t>
+              <a:t>2011-05-19</a:t>
             </a:fld>
             <a:endParaRPr lang="pl-PL"/>
           </a:p>
@@ -4922,7 +4956,7 @@
             <a:fld id="{FD17FA3B-C404-4317-B0BC-953931111309}" type="datetimeFigureOut">
               <a:rPr lang="pl-PL" smtClean="0"/>
               <a:pPr/>
-              <a:t>2011-05-18</a:t>
+              <a:t>2011-05-19</a:t>
             </a:fld>
             <a:endParaRPr lang="pl-PL"/>
           </a:p>
@@ -5241,7 +5275,7 @@
             <a:fld id="{FD17FA3B-C404-4317-B0BC-953931111309}" type="datetimeFigureOut">
               <a:rPr lang="pl-PL" smtClean="0"/>
               <a:pPr/>
-              <a:t>2011-05-18</a:t>
+              <a:t>2011-05-19</a:t>
             </a:fld>
             <a:endParaRPr lang="pl-PL"/>
           </a:p>
@@ -5654,7 +5688,7 @@
             <a:fld id="{FD17FA3B-C404-4317-B0BC-953931111309}" type="datetimeFigureOut">
               <a:rPr lang="pl-PL" smtClean="0"/>
               <a:pPr/>
-              <a:t>2011-05-18</a:t>
+              <a:t>2011-05-19</a:t>
             </a:fld>
             <a:endParaRPr lang="pl-PL"/>
           </a:p>
@@ -6122,7 +6156,7 @@
     </p:spTree>
     <p:extLst>
       <p:ext uri="{BB962C8B-B14F-4D97-AF65-F5344CB8AC3E}">
-        <p14:creationId xmlns:p14="http://schemas.microsoft.com/office/powerpoint/2010/main" xmlns="" val="845528893"/>
+        <p14:creationId xmlns:p14="http://schemas.microsoft.com/office/powerpoint/2010/main" val="845528893"/>
       </p:ext>
     </p:extLst>
   </p:cSld>
@@ -6166,11 +6200,7 @@
           <a:p>
             <a:r>
               <a:rPr lang="pl-PL" dirty="0" smtClean="0"/>
-              <a:t>A</a:t>
-            </a:r>
-            <a:r>
-              <a:rPr lang="pl-PL" dirty="0" smtClean="0"/>
-              <a:t>lternatywnie</a:t>
+              <a:t>Alternatywnie</a:t>
             </a:r>
             <a:endParaRPr lang="pl-PL" dirty="0"/>
           </a:p>
@@ -6227,11 +6257,7 @@
             </a:pPr>
             <a:r>
               <a:rPr lang="pl-PL" sz="1600" dirty="0" smtClean="0"/>
-              <a:t>for </a:t>
-            </a:r>
-            <a:r>
-              <a:rPr lang="pl-PL" sz="1600" dirty="0" smtClean="0"/>
-              <a:t>(i=0; </a:t>
+              <a:t>for (i=0; </a:t>
             </a:r>
             <a:r>
               <a:rPr lang="pl-PL" sz="1600" dirty="0" err="1" smtClean="0"/>
@@ -6239,26 +6265,14 @@
             </a:r>
             <a:r>
               <a:rPr lang="pl-PL" sz="1600" dirty="0" smtClean="0"/>
-              <a:t>; </a:t>
-            </a:r>
-            <a:r>
-              <a:rPr lang="pl-PL" sz="1600" dirty="0" smtClean="0"/>
-              <a:t>i</a:t>
-            </a:r>
-            <a:r>
-              <a:rPr lang="pl-PL" sz="1600" dirty="0" smtClean="0"/>
-              <a:t>++)</a:t>
+              <a:t>; i++)</a:t>
             </a:r>
             <a:br>
               <a:rPr lang="pl-PL" sz="1600" dirty="0" smtClean="0"/>
             </a:br>
             <a:r>
               <a:rPr lang="pl-PL" sz="1600" dirty="0" smtClean="0"/>
-              <a:t>for (j=0</a:t>
-            </a:r>
-            <a:r>
-              <a:rPr lang="pl-PL" sz="1600" dirty="0" smtClean="0"/>
-              <a:t>; </a:t>
+              <a:t>for (j=0; </a:t>
             </a:r>
             <a:r>
               <a:rPr lang="pl-PL" sz="1600" dirty="0" err="1" smtClean="0"/>
@@ -6288,15 +6302,7 @@
             </a:r>
             <a:r>
               <a:rPr lang="pl-PL" sz="1600" dirty="0" smtClean="0"/>
-              <a:t>] </a:t>
-            </a:r>
-            <a:r>
-              <a:rPr lang="pl-PL" sz="1600" dirty="0" smtClean="0"/>
-              <a:t>= </a:t>
-            </a:r>
-            <a:r>
-              <a:rPr lang="pl-PL" sz="1600" dirty="0" smtClean="0"/>
-              <a:t>a[</a:t>
+              <a:t>] = a[</a:t>
             </a:r>
             <a:r>
               <a:rPr lang="pl-PL" sz="1600" dirty="0" err="1" smtClean="0"/>
@@ -6304,15 +6310,7 @@
             </a:r>
             <a:r>
               <a:rPr lang="pl-PL" sz="1600" dirty="0" smtClean="0"/>
-              <a:t>] </a:t>
-            </a:r>
-            <a:r>
-              <a:rPr lang="pl-PL" sz="1600" dirty="0" smtClean="0"/>
-              <a:t>* </a:t>
-            </a:r>
-            <a:r>
-              <a:rPr lang="pl-PL" sz="1600" dirty="0" smtClean="0"/>
-              <a:t>b[</a:t>
+              <a:t>] * b[</a:t>
             </a:r>
             <a:r>
               <a:rPr lang="pl-PL" sz="1600" dirty="0" err="1" smtClean="0"/>
@@ -6931,11 +6929,7 @@
             </a:r>
             <a:r>
               <a:rPr lang="pl-PL" dirty="0" smtClean="0"/>
-              <a:t> </a:t>
-            </a:r>
-            <a:r>
-              <a:rPr lang="pl-PL" dirty="0" smtClean="0"/>
-              <a:t>model pamięci</a:t>
+              <a:t> model pamięci</a:t>
             </a:r>
             <a:endParaRPr lang="pl-PL" dirty="0"/>
           </a:p>
@@ -7012,49 +7006,54 @@
         </p:nvSpPr>
         <p:spPr/>
         <p:txBody>
-          <a:bodyPr>
-            <a:normAutofit fontScale="90000"/>
-          </a:bodyPr>
-          <a:lstStyle/>
-          <a:p>
-            <a:r>
-              <a:rPr lang="pl-PL" dirty="0" smtClean="0"/>
-              <a:t>Problemy z programowaniem GPGPU</a:t>
-            </a:r>
-            <a:endParaRPr lang="pl-PL" dirty="0"/>
-          </a:p>
-        </p:txBody>
-      </p:sp>
-      <p:sp>
-        <p:nvSpPr>
-          <p:cNvPr id="3" name="Symbol zastępczy zawartości 2"/>
-          <p:cNvSpPr>
-            <a:spLocks noGrp="1"/>
-          </p:cNvSpPr>
-          <p:nvPr>
-            <p:ph idx="1"/>
-          </p:nvPr>
-        </p:nvSpPr>
-        <p:spPr/>
-        <p:txBody>
           <a:bodyPr/>
           <a:lstStyle/>
           <a:p>
-            <a:pPr marL="0" indent="0">
-              <a:buNone/>
-            </a:pPr>
             <a:r>
               <a:rPr lang="pl-PL" dirty="0" smtClean="0"/>
-              <a:t>Przykłady kodu pisanego  na GPU w różnych technologiach.</a:t>
-            </a:r>
-            <a:endParaRPr lang="pl-PL" dirty="0"/>
-          </a:p>
-        </p:txBody>
-      </p:sp>
+              <a:t>Klasyczny </a:t>
+            </a:r>
+            <a:r>
+              <a:rPr lang="pl-PL" i="1" dirty="0" err="1" smtClean="0"/>
+              <a:t>apriori</a:t>
+            </a:r>
+            <a:endParaRPr lang="pl-PL" i="1" dirty="0"/>
+          </a:p>
+        </p:txBody>
+      </p:sp>
+      <p:pic>
+        <p:nvPicPr>
+          <p:cNvPr id="4" name="Symbol zastępczy zawartości 3"/>
+          <p:cNvPicPr>
+            <a:picLocks noGrp="1" noChangeAspect="1"/>
+          </p:cNvPicPr>
+          <p:nvPr>
+            <p:ph idx="1"/>
+          </p:nvPr>
+        </p:nvPicPr>
+        <p:blipFill>
+          <a:blip r:embed="rId3">
+            <a:extLst>
+              <a:ext uri="{28A0092B-C50C-407E-A947-70E740481C1C}">
+                <a14:useLocalDpi xmlns:a14="http://schemas.microsoft.com/office/drawing/2010/main" val="0"/>
+              </a:ext>
+            </a:extLst>
+          </a:blip>
+          <a:stretch>
+            <a:fillRect/>
+          </a:stretch>
+        </p:blipFill>
+        <p:spPr>
+          <a:xfrm>
+            <a:off x="60011" y="2924944"/>
+            <a:ext cx="8626789" cy="2008527"/>
+          </a:xfrm>
+        </p:spPr>
+      </p:pic>
     </p:spTree>
     <p:extLst>
       <p:ext uri="{BB962C8B-B14F-4D97-AF65-F5344CB8AC3E}">
-        <p14:creationId xmlns:p14="http://schemas.microsoft.com/office/powerpoint/2010/main" xmlns="" val="3766306397"/>
+        <p14:creationId xmlns:p14="http://schemas.microsoft.com/office/powerpoint/2010/main" val="3391065152"/>
       </p:ext>
     </p:extLst>
   </p:cSld>
@@ -7094,60 +7093,55 @@
         <p:spPr/>
         <p:txBody>
           <a:bodyPr>
-            <a:normAutofit fontScale="90000"/>
+            <a:normAutofit/>
           </a:bodyPr>
           <a:lstStyle/>
           <a:p>
             <a:r>
-              <a:rPr lang="pl-PL" dirty="0" smtClean="0"/>
-              <a:t>Problemy z programowaniem GPGPU</a:t>
-            </a:r>
-            <a:endParaRPr lang="pl-PL" dirty="0"/>
-          </a:p>
-        </p:txBody>
-      </p:sp>
-      <p:sp>
-        <p:nvSpPr>
-          <p:cNvPr id="3" name="Symbol zastępczy zawartości 2"/>
-          <p:cNvSpPr>
-            <a:spLocks noGrp="1"/>
-          </p:cNvSpPr>
+              <a:rPr lang="en-US" i="1" dirty="0" err="1" smtClean="0"/>
+              <a:t>Apriori</a:t>
+            </a:r>
+            <a:r>
+              <a:rPr lang="en-US" dirty="0" smtClean="0"/>
+              <a:t> – bottlenecks</a:t>
+            </a:r>
+            <a:endParaRPr lang="en-US" dirty="0"/>
+          </a:p>
+        </p:txBody>
+      </p:sp>
+      <p:pic>
+        <p:nvPicPr>
+          <p:cNvPr id="4" name="Symbol zastępczy zawartości 3"/>
+          <p:cNvPicPr>
+            <a:picLocks noGrp="1" noChangeAspect="1"/>
+          </p:cNvPicPr>
           <p:nvPr>
             <p:ph idx="1"/>
           </p:nvPr>
-        </p:nvSpPr>
-        <p:spPr/>
-        <p:txBody>
-          <a:bodyPr/>
-          <a:lstStyle/>
-          <a:p>
-            <a:pPr marL="0" indent="0">
-              <a:buNone/>
-            </a:pPr>
-            <a:r>
-              <a:rPr lang="pl-PL" dirty="0" smtClean="0"/>
-              <a:t>Przykłady kodu pisanego  na GPU w różnych technologiach. Cześć dalsza tego elementu – ograniczenia na pamięć. Podać wyniki dla </a:t>
-            </a:r>
-            <a:r>
-              <a:rPr lang="pl-PL" dirty="0" err="1" smtClean="0"/>
-              <a:t>Kosaraka</a:t>
-            </a:r>
-            <a:r>
-              <a:rPr lang="pl-PL" dirty="0"/>
-              <a:t> </a:t>
-            </a:r>
-            <a:r>
-              <a:rPr lang="pl-PL" dirty="0" smtClean="0"/>
-              <a:t>że się na GPU nie wciska.</a:t>
-            </a:r>
-            <a:endParaRPr lang="pl-PL" dirty="0"/>
-          </a:p>
-        </p:txBody>
-      </p:sp>
+        </p:nvPicPr>
+        <p:blipFill>
+          <a:blip r:embed="rId3">
+            <a:extLst>
+              <a:ext uri="{28A0092B-C50C-407E-A947-70E740481C1C}">
+                <a14:useLocalDpi xmlns:a14="http://schemas.microsoft.com/office/drawing/2010/main" val="0"/>
+              </a:ext>
+            </a:extLst>
+          </a:blip>
+          <a:stretch>
+            <a:fillRect/>
+          </a:stretch>
+        </p:blipFill>
+        <p:spPr>
+          <a:xfrm>
+            <a:off x="60011" y="2924944"/>
+            <a:ext cx="8626789" cy="2008527"/>
+          </a:xfrm>
+        </p:spPr>
+      </p:pic>
     </p:spTree>
     <p:extLst>
       <p:ext uri="{BB962C8B-B14F-4D97-AF65-F5344CB8AC3E}">
-        <p14:creationId xmlns:p14="http://schemas.microsoft.com/office/powerpoint/2010/main" xmlns="" val="1256585767"/>
+        <p14:creationId xmlns:p14="http://schemas.microsoft.com/office/powerpoint/2010/main" val="4045055366"/>
       </p:ext>
     </p:extLst>
   </p:cSld>
@@ -7190,20 +7184,24 @@
           <a:lstStyle/>
           <a:p>
             <a:r>
+              <a:rPr lang="en-US" i="1" dirty="0" err="1"/>
+              <a:t>Apriori</a:t>
+            </a:r>
+            <a:r>
+              <a:rPr lang="en-US" dirty="0"/>
+              <a:t> – </a:t>
+            </a:r>
+            <a:r>
               <a:rPr lang="pl-PL" dirty="0" smtClean="0"/>
-              <a:t>Klasyczny </a:t>
-            </a:r>
-            <a:r>
-              <a:rPr lang="pl-PL" i="1" dirty="0" err="1" smtClean="0"/>
-              <a:t>apriori</a:t>
-            </a:r>
-            <a:endParaRPr lang="pl-PL" i="1" dirty="0"/>
+              <a:t>MT</a:t>
+            </a:r>
+            <a:endParaRPr lang="pl-PL" dirty="0"/>
           </a:p>
         </p:txBody>
       </p:sp>
       <p:pic>
         <p:nvPicPr>
-          <p:cNvPr id="6" name="Symbol zastępczy zawartości 5"/>
+          <p:cNvPr id="5" name="Symbol zastępczy zawartości 4"/>
           <p:cNvPicPr>
             <a:picLocks noGrp="1" noChangeAspect="1"/>
           </p:cNvPicPr>
@@ -7212,10 +7210,10 @@
           </p:nvPr>
         </p:nvPicPr>
         <p:blipFill>
-          <a:blip r:embed="rId3" cstate="print">
+          <a:blip r:embed="rId2">
             <a:extLst>
               <a:ext uri="{28A0092B-C50C-407E-A947-70E740481C1C}">
-                <a14:useLocalDpi xmlns:a14="http://schemas.microsoft.com/office/drawing/2010/main" xmlns="" val="0"/>
+                <a14:useLocalDpi xmlns:a14="http://schemas.microsoft.com/office/drawing/2010/main" val="0"/>
               </a:ext>
             </a:extLst>
           </a:blip>
@@ -7225,15 +7223,15 @@
         </p:blipFill>
         <p:spPr>
           <a:xfrm>
-            <a:off x="4470897" y="2286000"/>
-            <a:ext cx="2183406" cy="3840163"/>
+            <a:off x="60011" y="2924944"/>
+            <a:ext cx="8626789" cy="2008527"/>
           </a:xfrm>
         </p:spPr>
       </p:pic>
     </p:spTree>
     <p:extLst>
       <p:ext uri="{BB962C8B-B14F-4D97-AF65-F5344CB8AC3E}">
-        <p14:creationId xmlns:p14="http://schemas.microsoft.com/office/powerpoint/2010/main" xmlns="" val="3391065152"/>
+        <p14:creationId xmlns:p14="http://schemas.microsoft.com/office/powerpoint/2010/main" val="2860242439"/>
       </p:ext>
     </p:extLst>
   </p:cSld>
@@ -7272,56 +7270,84 @@
         </p:nvSpPr>
         <p:spPr/>
         <p:txBody>
-          <a:bodyPr>
-            <a:normAutofit/>
-          </a:bodyPr>
+          <a:bodyPr/>
           <a:lstStyle/>
           <a:p>
             <a:r>
-              <a:rPr lang="en-US" i="1" dirty="0" err="1" smtClean="0"/>
-              <a:t>Apriori</a:t>
-            </a:r>
-            <a:r>
-              <a:rPr lang="en-US" dirty="0" smtClean="0"/>
-              <a:t> – bottlenecks</a:t>
-            </a:r>
-            <a:endParaRPr lang="en-US" dirty="0"/>
-          </a:p>
-        </p:txBody>
-      </p:sp>
-      <p:pic>
-        <p:nvPicPr>
-          <p:cNvPr id="7" name="Symbol zastępczy zawartości 6"/>
-          <p:cNvPicPr>
-            <a:picLocks noGrp="1" noChangeAspect="1"/>
-          </p:cNvPicPr>
+              <a:rPr lang="pl-PL" dirty="0" smtClean="0"/>
+              <a:t>GPU MINER</a:t>
+            </a:r>
+            <a:endParaRPr lang="pl-PL" dirty="0"/>
+          </a:p>
+        </p:txBody>
+      </p:sp>
+      <p:sp>
+        <p:nvSpPr>
+          <p:cNvPr id="3" name="Symbol zastępczy zawartości 2"/>
+          <p:cNvSpPr>
+            <a:spLocks noGrp="1"/>
+          </p:cNvSpPr>
           <p:nvPr>
             <p:ph idx="1"/>
           </p:nvPr>
-        </p:nvPicPr>
-        <p:blipFill>
-          <a:blip r:embed="rId3" cstate="print">
-            <a:extLst>
-              <a:ext uri="{28A0092B-C50C-407E-A947-70E740481C1C}">
-                <a14:useLocalDpi xmlns:a14="http://schemas.microsoft.com/office/drawing/2010/main" xmlns="" val="0"/>
-              </a:ext>
-            </a:extLst>
-          </a:blip>
-          <a:stretch>
-            <a:fillRect/>
-          </a:stretch>
-        </p:blipFill>
+        </p:nvSpPr>
         <p:spPr>
           <a:xfrm>
-            <a:off x="4470897" y="2286000"/>
-            <a:ext cx="2183406" cy="3840163"/>
+            <a:off x="1979712" y="1916832"/>
+            <a:ext cx="6984776" cy="4209331"/>
           </a:xfrm>
         </p:spPr>
-      </p:pic>
+        <p:txBody>
+          <a:bodyPr/>
+          <a:lstStyle/>
+          <a:p>
+            <a:r>
+              <a:rPr lang="pl-PL" dirty="0" smtClean="0"/>
+              <a:t>Napisany w CUDA C</a:t>
+            </a:r>
+          </a:p>
+          <a:p>
+            <a:r>
+              <a:rPr lang="pl-PL" dirty="0" smtClean="0"/>
+              <a:t>Wymaga Berkeley DB</a:t>
+            </a:r>
+          </a:p>
+          <a:p>
+            <a:endParaRPr lang="pl-PL" dirty="0" smtClean="0"/>
+          </a:p>
+          <a:p>
+            <a:endParaRPr lang="pl-PL" dirty="0"/>
+          </a:p>
+        </p:txBody>
+      </p:sp>
+      <p:graphicFrame>
+        <p:nvGraphicFramePr>
+          <p:cNvPr id="4" name="Wykres 3"/>
+          <p:cNvGraphicFramePr>
+            <a:graphicFrameLocks/>
+          </p:cNvGraphicFramePr>
+          <p:nvPr>
+            <p:extLst>
+              <p:ext uri="{D42A27DB-BD31-4B8C-83A1-F6EECF244321}">
+                <p14:modId xmlns:p14="http://schemas.microsoft.com/office/powerpoint/2010/main" val="1319884066"/>
+              </p:ext>
+            </p:extLst>
+          </p:nvPr>
+        </p:nvGraphicFramePr>
+        <p:xfrm>
+          <a:off x="2123728" y="3140968"/>
+          <a:ext cx="6750323" cy="3352304"/>
+        </p:xfrm>
+        <a:graphic>
+          <a:graphicData uri="http://schemas.openxmlformats.org/drawingml/2006/chart">
+            <c:chart xmlns:c="http://schemas.openxmlformats.org/drawingml/2006/chart" xmlns:r="http://schemas.openxmlformats.org/officeDocument/2006/relationships" r:id="rId3"/>
+          </a:graphicData>
+        </a:graphic>
+      </p:graphicFrame>
     </p:spTree>
     <p:extLst>
       <p:ext uri="{BB962C8B-B14F-4D97-AF65-F5344CB8AC3E}">
-        <p14:creationId xmlns:p14="http://schemas.microsoft.com/office/powerpoint/2010/main" xmlns="" val="4045055366"/>
+        <p14:creationId xmlns:p14="http://schemas.microsoft.com/office/powerpoint/2010/main" val="2946628836"/>
       </p:ext>
     </p:extLst>
   </p:cSld>
@@ -7360,22 +7386,16 @@
         </p:nvSpPr>
         <p:spPr/>
         <p:txBody>
-          <a:bodyPr/>
+          <a:bodyPr>
+            <a:normAutofit/>
+          </a:bodyPr>
           <a:lstStyle/>
           <a:p>
             <a:r>
-              <a:rPr lang="en-US" i="1" dirty="0" err="1"/>
-              <a:t>Apriori</a:t>
-            </a:r>
-            <a:r>
-              <a:rPr lang="en-US" dirty="0"/>
-              <a:t> – </a:t>
-            </a:r>
-            <a:r>
               <a:rPr lang="pl-PL" dirty="0" smtClean="0"/>
-              <a:t>MT</a:t>
-            </a:r>
-            <a:endParaRPr lang="pl-PL" dirty="0"/>
+              <a:t>Bitmapa transakcji</a:t>
+            </a:r>
+            <a:endParaRPr lang="en-US" dirty="0"/>
           </a:p>
         </p:txBody>
       </p:sp>
@@ -7390,10 +7410,10 @@
           </p:nvPr>
         </p:nvPicPr>
         <p:blipFill>
-          <a:blip r:embed="rId2" cstate="print">
+          <a:blip r:embed="rId3" cstate="print">
             <a:extLst>
               <a:ext uri="{28A0092B-C50C-407E-A947-70E740481C1C}">
-                <a14:useLocalDpi xmlns:a14="http://schemas.microsoft.com/office/drawing/2010/main" xmlns="" val="0"/>
+                <a14:useLocalDpi xmlns:a14="http://schemas.microsoft.com/office/drawing/2010/main" val="0"/>
               </a:ext>
             </a:extLst>
           </a:blip>
@@ -7403,15 +7423,15 @@
         </p:blipFill>
         <p:spPr>
           <a:xfrm>
-            <a:off x="4470897" y="2286000"/>
-            <a:ext cx="2183406" cy="3840163"/>
+            <a:off x="1835696" y="1700808"/>
+            <a:ext cx="7308304" cy="5040399"/>
           </a:xfrm>
         </p:spPr>
       </p:pic>
     </p:spTree>
     <p:extLst>
       <p:ext uri="{BB962C8B-B14F-4D97-AF65-F5344CB8AC3E}">
-        <p14:creationId xmlns:p14="http://schemas.microsoft.com/office/powerpoint/2010/main" xmlns="" val="2860242439"/>
+        <p14:creationId xmlns:p14="http://schemas.microsoft.com/office/powerpoint/2010/main" val="3634968103"/>
       </p:ext>
     </p:extLst>
   </p:cSld>
@@ -7454,80 +7474,55 @@
           <a:lstStyle/>
           <a:p>
             <a:r>
-              <a:rPr lang="pl-PL" dirty="0" smtClean="0"/>
-              <a:t>GPU MINER</a:t>
+              <a:rPr lang="pl-PL" dirty="0"/>
+              <a:t>Bitmapa transakcji</a:t>
             </a:r>
             <a:endParaRPr lang="pl-PL" dirty="0"/>
           </a:p>
         </p:txBody>
       </p:sp>
-      <p:sp>
-        <p:nvSpPr>
-          <p:cNvPr id="3" name="Symbol zastępczy zawartości 2"/>
-          <p:cNvSpPr>
-            <a:spLocks noGrp="1"/>
-          </p:cNvSpPr>
+      <p:pic>
+        <p:nvPicPr>
+          <p:cNvPr id="4" name="Symbol zastępczy zawartości 3"/>
+          <p:cNvPicPr>
+            <a:picLocks noGrp="1" noChangeAspect="1"/>
+          </p:cNvPicPr>
           <p:nvPr>
             <p:ph idx="1"/>
           </p:nvPr>
-        </p:nvSpPr>
+        </p:nvPicPr>
+        <p:blipFill>
+          <a:blip r:embed="rId2" cstate="print">
+            <a:extLst>
+              <a:ext uri="{28A0092B-C50C-407E-A947-70E740481C1C}">
+                <a14:useLocalDpi xmlns:a14="http://schemas.microsoft.com/office/drawing/2010/main" val="0"/>
+              </a:ext>
+            </a:extLst>
+          </a:blip>
+          <a:stretch>
+            <a:fillRect/>
+          </a:stretch>
+        </p:blipFill>
         <p:spPr>
           <a:xfrm>
-            <a:off x="1979712" y="1916832"/>
-            <a:ext cx="6984776" cy="4209331"/>
+            <a:off x="2627784" y="1952739"/>
+            <a:ext cx="6120680" cy="4699439"/>
           </a:xfrm>
+          <a:prstGeom prst="rect">
+            <a:avLst/>
+          </a:prstGeom>
+          <a:ln>
+            <a:noFill/>
+          </a:ln>
+          <a:effectLst>
+            <a:softEdge rad="112500"/>
+          </a:effectLst>
         </p:spPr>
-        <p:txBody>
-          <a:bodyPr/>
-          <a:lstStyle/>
-          <a:p>
-            <a:r>
-              <a:rPr lang="pl-PL" dirty="0" smtClean="0"/>
-              <a:t>Napisany w CUDA C</a:t>
-            </a:r>
-          </a:p>
-          <a:p>
-            <a:r>
-              <a:rPr lang="pl-PL" dirty="0" smtClean="0"/>
-              <a:t>Wymaga Berkeley DB</a:t>
-            </a:r>
-          </a:p>
-          <a:p>
-            <a:endParaRPr lang="pl-PL" dirty="0" smtClean="0"/>
-          </a:p>
-          <a:p>
-            <a:endParaRPr lang="pl-PL" dirty="0"/>
-          </a:p>
-        </p:txBody>
-      </p:sp>
-      <p:graphicFrame>
-        <p:nvGraphicFramePr>
-          <p:cNvPr id="4" name="Wykres 3"/>
-          <p:cNvGraphicFramePr>
-            <a:graphicFrameLocks/>
-          </p:cNvGraphicFramePr>
-          <p:nvPr>
-            <p:extLst>
-              <p:ext uri="{D42A27DB-BD31-4B8C-83A1-F6EECF244321}">
-                <p14:modId xmlns:p14="http://schemas.microsoft.com/office/powerpoint/2010/main" xmlns="" val="1319884066"/>
-              </p:ext>
-            </p:extLst>
-          </p:nvPr>
-        </p:nvGraphicFramePr>
-        <p:xfrm>
-          <a:off x="2123728" y="3140968"/>
-          <a:ext cx="6750323" cy="3352304"/>
-        </p:xfrm>
-        <a:graphic>
-          <a:graphicData uri="http://schemas.openxmlformats.org/drawingml/2006/chart">
-            <c:chart xmlns:c="http://schemas.openxmlformats.org/drawingml/2006/chart" xmlns:r="http://schemas.openxmlformats.org/officeDocument/2006/relationships" r:id="rId3"/>
-          </a:graphicData>
-        </a:graphic>
-      </p:graphicFrame>
+      </p:pic>
     </p:spTree>
     <p:extLst>
       <p:ext uri="{BB962C8B-B14F-4D97-AF65-F5344CB8AC3E}">
-        <p14:creationId xmlns:p14="http://schemas.microsoft.com/office/powerpoint/2010/main" xmlns="" val="2946628836"/>
+        <p14:creationId xmlns:p14="http://schemas.microsoft.com/office/powerpoint/2010/main" val="2435867398"/>
       </p:ext>
     </p:extLst>
   </p:cSld>
@@ -7567,51 +7562,1078 @@
         <p:spPr/>
         <p:txBody>
           <a:bodyPr>
-            <a:normAutofit/>
+            <a:normAutofit fontScale="90000"/>
           </a:bodyPr>
           <a:lstStyle/>
           <a:p>
             <a:r>
-              <a:rPr lang="en-US" dirty="0" smtClean="0"/>
-              <a:t>Transaction Bitmap</a:t>
+              <a:rPr lang="pl-PL" dirty="0" smtClean="0"/>
+              <a:t>Bitmapowe generowanie kandydatów</a:t>
             </a:r>
             <a:endParaRPr lang="en-US" dirty="0"/>
           </a:p>
         </p:txBody>
       </p:sp>
-      <p:pic>
-        <p:nvPicPr>
+      <p:graphicFrame>
+        <p:nvGraphicFramePr>
           <p:cNvPr id="4" name="Symbol zastępczy zawartości 3"/>
-          <p:cNvPicPr>
-            <a:picLocks noGrp="1" noChangeAspect="1"/>
-          </p:cNvPicPr>
+          <p:cNvGraphicFramePr>
+            <a:graphicFrameLocks noGrp="1"/>
+          </p:cNvGraphicFramePr>
           <p:nvPr>
             <p:ph idx="1"/>
-          </p:nvPr>
-        </p:nvPicPr>
-        <p:blipFill>
-          <a:blip r:embed="rId3" cstate="print">
-            <a:extLst>
-              <a:ext uri="{28A0092B-C50C-407E-A947-70E740481C1C}">
-                <a14:useLocalDpi xmlns:a14="http://schemas.microsoft.com/office/drawing/2010/main" xmlns="" val="0"/>
-              </a:ext>
-            </a:extLst>
-          </a:blip>
-          <a:stretch>
-            <a:fillRect/>
-          </a:stretch>
-        </p:blipFill>
+            <p:extLst>
+              <p:ext uri="{D42A27DB-BD31-4B8C-83A1-F6EECF244321}">
+                <p14:modId xmlns:p14="http://schemas.microsoft.com/office/powerpoint/2010/main" val="2042678235"/>
+              </p:ext>
+            </p:extLst>
+          </p:nvPr>
+        </p:nvGraphicFramePr>
+        <p:xfrm>
+          <a:off x="2123728" y="2420888"/>
+          <a:ext cx="6248396" cy="1854200"/>
+        </p:xfrm>
+        <a:graphic>
+          <a:graphicData uri="http://schemas.openxmlformats.org/drawingml/2006/table">
+            <a:tbl>
+              <a:tblPr firstRow="1" bandRow="1">
+                <a:tableStyleId>{5C22544A-7EE6-4342-B048-85BDC9FD1C3A}</a:tableStyleId>
+              </a:tblPr>
+              <a:tblGrid>
+                <a:gridCol w="568036"/>
+                <a:gridCol w="568036"/>
+                <a:gridCol w="568036"/>
+                <a:gridCol w="568036"/>
+                <a:gridCol w="568036"/>
+                <a:gridCol w="568036"/>
+                <a:gridCol w="568036"/>
+                <a:gridCol w="568036"/>
+                <a:gridCol w="568036"/>
+                <a:gridCol w="568036"/>
+                <a:gridCol w="568036"/>
+              </a:tblGrid>
+              <a:tr h="370840">
+                <a:tc>
+                  <a:txBody>
+                    <a:bodyPr/>
+                    <a:lstStyle/>
+                    <a:p>
+                      <a:endParaRPr lang="pl-PL" i="1" dirty="0"/>
+                    </a:p>
+                  </a:txBody>
+                  <a:tcPr>
+                    <a:solidFill>
+                      <a:schemeClr val="accent4">
+                        <a:lumMod val="50000"/>
+                      </a:schemeClr>
+                    </a:solidFill>
+                  </a:tcPr>
+                </a:tc>
+                <a:tc>
+                  <a:txBody>
+                    <a:bodyPr/>
+                    <a:lstStyle/>
+                    <a:p>
+                      <a:r>
+                        <a:rPr lang="pl-PL" dirty="0" smtClean="0"/>
+                        <a:t>a1</a:t>
+                      </a:r>
+                      <a:endParaRPr lang="pl-PL" dirty="0"/>
+                    </a:p>
+                  </a:txBody>
+                  <a:tcPr>
+                    <a:solidFill>
+                      <a:schemeClr val="accent4">
+                        <a:lumMod val="50000"/>
+                      </a:schemeClr>
+                    </a:solidFill>
+                  </a:tcPr>
+                </a:tc>
+                <a:tc>
+                  <a:txBody>
+                    <a:bodyPr/>
+                    <a:lstStyle/>
+                    <a:p>
+                      <a:r>
+                        <a:rPr lang="pl-PL" dirty="0" smtClean="0"/>
+                        <a:t>a2</a:t>
+                      </a:r>
+                      <a:endParaRPr lang="pl-PL" dirty="0"/>
+                    </a:p>
+                  </a:txBody>
+                  <a:tcPr>
+                    <a:solidFill>
+                      <a:schemeClr val="accent4">
+                        <a:lumMod val="50000"/>
+                      </a:schemeClr>
+                    </a:solidFill>
+                  </a:tcPr>
+                </a:tc>
+                <a:tc>
+                  <a:txBody>
+                    <a:bodyPr/>
+                    <a:lstStyle/>
+                    <a:p>
+                      <a:r>
+                        <a:rPr lang="pl-PL" dirty="0" smtClean="0"/>
+                        <a:t>a3</a:t>
+                      </a:r>
+                      <a:endParaRPr lang="pl-PL" dirty="0"/>
+                    </a:p>
+                  </a:txBody>
+                  <a:tcPr>
+                    <a:solidFill>
+                      <a:schemeClr val="accent4">
+                        <a:lumMod val="50000"/>
+                      </a:schemeClr>
+                    </a:solidFill>
+                  </a:tcPr>
+                </a:tc>
+                <a:tc>
+                  <a:txBody>
+                    <a:bodyPr/>
+                    <a:lstStyle/>
+                    <a:p>
+                      <a:r>
+                        <a:rPr lang="pl-PL" dirty="0" smtClean="0"/>
+                        <a:t>a4</a:t>
+                      </a:r>
+                      <a:endParaRPr lang="pl-PL" dirty="0"/>
+                    </a:p>
+                  </a:txBody>
+                  <a:tcPr>
+                    <a:solidFill>
+                      <a:schemeClr val="accent4">
+                        <a:lumMod val="50000"/>
+                      </a:schemeClr>
+                    </a:solidFill>
+                  </a:tcPr>
+                </a:tc>
+                <a:tc>
+                  <a:txBody>
+                    <a:bodyPr/>
+                    <a:lstStyle/>
+                    <a:p>
+                      <a:r>
+                        <a:rPr lang="pl-PL" dirty="0" smtClean="0"/>
+                        <a:t>a5</a:t>
+                      </a:r>
+                      <a:endParaRPr lang="pl-PL" dirty="0"/>
+                    </a:p>
+                  </a:txBody>
+                  <a:tcPr>
+                    <a:solidFill>
+                      <a:schemeClr val="accent4">
+                        <a:lumMod val="50000"/>
+                      </a:schemeClr>
+                    </a:solidFill>
+                  </a:tcPr>
+                </a:tc>
+                <a:tc>
+                  <a:txBody>
+                    <a:bodyPr/>
+                    <a:lstStyle/>
+                    <a:p>
+                      <a:r>
+                        <a:rPr lang="pl-PL" dirty="0" smtClean="0"/>
+                        <a:t>a6</a:t>
+                      </a:r>
+                      <a:endParaRPr lang="pl-PL" dirty="0"/>
+                    </a:p>
+                  </a:txBody>
+                  <a:tcPr>
+                    <a:solidFill>
+                      <a:schemeClr val="accent4">
+                        <a:lumMod val="50000"/>
+                      </a:schemeClr>
+                    </a:solidFill>
+                  </a:tcPr>
+                </a:tc>
+                <a:tc>
+                  <a:txBody>
+                    <a:bodyPr/>
+                    <a:lstStyle/>
+                    <a:p>
+                      <a:r>
+                        <a:rPr lang="pl-PL" dirty="0" smtClean="0"/>
+                        <a:t>a7</a:t>
+                      </a:r>
+                      <a:endParaRPr lang="pl-PL" dirty="0"/>
+                    </a:p>
+                  </a:txBody>
+                  <a:tcPr>
+                    <a:solidFill>
+                      <a:schemeClr val="accent4">
+                        <a:lumMod val="50000"/>
+                      </a:schemeClr>
+                    </a:solidFill>
+                  </a:tcPr>
+                </a:tc>
+                <a:tc>
+                  <a:txBody>
+                    <a:bodyPr/>
+                    <a:lstStyle/>
+                    <a:p>
+                      <a:r>
+                        <a:rPr lang="pl-PL" dirty="0" smtClean="0"/>
+                        <a:t>a8</a:t>
+                      </a:r>
+                      <a:endParaRPr lang="pl-PL" dirty="0"/>
+                    </a:p>
+                  </a:txBody>
+                  <a:tcPr>
+                    <a:solidFill>
+                      <a:schemeClr val="accent4">
+                        <a:lumMod val="50000"/>
+                      </a:schemeClr>
+                    </a:solidFill>
+                  </a:tcPr>
+                </a:tc>
+                <a:tc>
+                  <a:txBody>
+                    <a:bodyPr/>
+                    <a:lstStyle/>
+                    <a:p>
+                      <a:r>
+                        <a:rPr lang="pl-PL" dirty="0" smtClean="0"/>
+                        <a:t>a9</a:t>
+                      </a:r>
+                      <a:endParaRPr lang="pl-PL" dirty="0"/>
+                    </a:p>
+                  </a:txBody>
+                  <a:tcPr>
+                    <a:solidFill>
+                      <a:schemeClr val="accent4">
+                        <a:lumMod val="50000"/>
+                      </a:schemeClr>
+                    </a:solidFill>
+                  </a:tcPr>
+                </a:tc>
+                <a:tc>
+                  <a:txBody>
+                    <a:bodyPr/>
+                    <a:lstStyle/>
+                    <a:p>
+                      <a:r>
+                        <a:rPr lang="pl-PL" dirty="0" smtClean="0"/>
+                        <a:t>a10</a:t>
+                      </a:r>
+                      <a:endParaRPr lang="pl-PL" dirty="0"/>
+                    </a:p>
+                  </a:txBody>
+                  <a:tcPr>
+                    <a:solidFill>
+                      <a:schemeClr val="accent4">
+                        <a:lumMod val="50000"/>
+                      </a:schemeClr>
+                    </a:solidFill>
+                  </a:tcPr>
+                </a:tc>
+              </a:tr>
+              <a:tr h="370840">
+                <a:tc>
+                  <a:txBody>
+                    <a:bodyPr/>
+                    <a:lstStyle/>
+                    <a:p>
+                      <a:r>
+                        <a:rPr lang="pl-PL" i="1" dirty="0" smtClean="0"/>
+                        <a:t>A</a:t>
+                      </a:r>
+                      <a:endParaRPr lang="pl-PL" i="1" dirty="0"/>
+                    </a:p>
+                  </a:txBody>
+                  <a:tcPr>
+                    <a:solidFill>
+                      <a:schemeClr val="accent1"/>
+                    </a:solidFill>
+                  </a:tcPr>
+                </a:tc>
+                <a:tc>
+                  <a:txBody>
+                    <a:bodyPr/>
+                    <a:lstStyle/>
+                    <a:p>
+                      <a:r>
+                        <a:rPr lang="pl-PL" dirty="0" smtClean="0"/>
+                        <a:t>1</a:t>
+                      </a:r>
+                      <a:endParaRPr lang="pl-PL" dirty="0"/>
+                    </a:p>
+                  </a:txBody>
+                  <a:tcPr>
+                    <a:solidFill>
+                      <a:schemeClr val="accent1"/>
+                    </a:solidFill>
+                  </a:tcPr>
+                </a:tc>
+                <a:tc>
+                  <a:txBody>
+                    <a:bodyPr/>
+                    <a:lstStyle/>
+                    <a:p>
+                      <a:r>
+                        <a:rPr lang="pl-PL" dirty="0" smtClean="0"/>
+                        <a:t>0</a:t>
+                      </a:r>
+                      <a:endParaRPr lang="pl-PL" dirty="0"/>
+                    </a:p>
+                  </a:txBody>
+                  <a:tcPr>
+                    <a:solidFill>
+                      <a:schemeClr val="accent1"/>
+                    </a:solidFill>
+                  </a:tcPr>
+                </a:tc>
+                <a:tc>
+                  <a:txBody>
+                    <a:bodyPr/>
+                    <a:lstStyle/>
+                    <a:p>
+                      <a:r>
+                        <a:rPr lang="pl-PL" dirty="0" smtClean="0"/>
+                        <a:t>1</a:t>
+                      </a:r>
+                      <a:endParaRPr lang="pl-PL" dirty="0"/>
+                    </a:p>
+                  </a:txBody>
+                  <a:tcPr>
+                    <a:solidFill>
+                      <a:schemeClr val="accent1"/>
+                    </a:solidFill>
+                  </a:tcPr>
+                </a:tc>
+                <a:tc>
+                  <a:txBody>
+                    <a:bodyPr/>
+                    <a:lstStyle/>
+                    <a:p>
+                      <a:r>
+                        <a:rPr lang="pl-PL" dirty="0" smtClean="0"/>
+                        <a:t>1</a:t>
+                      </a:r>
+                      <a:endParaRPr lang="pl-PL" dirty="0"/>
+                    </a:p>
+                  </a:txBody>
+                  <a:tcPr>
+                    <a:solidFill>
+                      <a:schemeClr val="accent1"/>
+                    </a:solidFill>
+                  </a:tcPr>
+                </a:tc>
+                <a:tc>
+                  <a:txBody>
+                    <a:bodyPr/>
+                    <a:lstStyle/>
+                    <a:p>
+                      <a:r>
+                        <a:rPr lang="pl-PL" dirty="0" smtClean="0"/>
+                        <a:t>0</a:t>
+                      </a:r>
+                      <a:endParaRPr lang="pl-PL" dirty="0"/>
+                    </a:p>
+                  </a:txBody>
+                  <a:tcPr>
+                    <a:solidFill>
+                      <a:schemeClr val="accent1"/>
+                    </a:solidFill>
+                  </a:tcPr>
+                </a:tc>
+                <a:tc>
+                  <a:txBody>
+                    <a:bodyPr/>
+                    <a:lstStyle/>
+                    <a:p>
+                      <a:r>
+                        <a:rPr lang="pl-PL" dirty="0" smtClean="0"/>
+                        <a:t>0</a:t>
+                      </a:r>
+                      <a:endParaRPr lang="pl-PL" dirty="0"/>
+                    </a:p>
+                  </a:txBody>
+                  <a:tcPr>
+                    <a:solidFill>
+                      <a:schemeClr val="accent1"/>
+                    </a:solidFill>
+                  </a:tcPr>
+                </a:tc>
+                <a:tc>
+                  <a:txBody>
+                    <a:bodyPr/>
+                    <a:lstStyle/>
+                    <a:p>
+                      <a:r>
+                        <a:rPr lang="pl-PL" dirty="0" smtClean="0"/>
+                        <a:t>0</a:t>
+                      </a:r>
+                      <a:endParaRPr lang="pl-PL" dirty="0"/>
+                    </a:p>
+                  </a:txBody>
+                  <a:tcPr>
+                    <a:solidFill>
+                      <a:schemeClr val="accent1"/>
+                    </a:solidFill>
+                  </a:tcPr>
+                </a:tc>
+                <a:tc>
+                  <a:txBody>
+                    <a:bodyPr/>
+                    <a:lstStyle/>
+                    <a:p>
+                      <a:r>
+                        <a:rPr lang="pl-PL" dirty="0" smtClean="0"/>
+                        <a:t>0</a:t>
+                      </a:r>
+                      <a:endParaRPr lang="pl-PL" dirty="0"/>
+                    </a:p>
+                  </a:txBody>
+                  <a:tcPr>
+                    <a:solidFill>
+                      <a:schemeClr val="accent1"/>
+                    </a:solidFill>
+                  </a:tcPr>
+                </a:tc>
+                <a:tc>
+                  <a:txBody>
+                    <a:bodyPr/>
+                    <a:lstStyle/>
+                    <a:p>
+                      <a:r>
+                        <a:rPr lang="pl-PL" dirty="0" smtClean="0"/>
+                        <a:t>0</a:t>
+                      </a:r>
+                      <a:endParaRPr lang="pl-PL" dirty="0"/>
+                    </a:p>
+                  </a:txBody>
+                  <a:tcPr>
+                    <a:solidFill>
+                      <a:schemeClr val="accent1"/>
+                    </a:solidFill>
+                  </a:tcPr>
+                </a:tc>
+                <a:tc>
+                  <a:txBody>
+                    <a:bodyPr/>
+                    <a:lstStyle/>
+                    <a:p>
+                      <a:r>
+                        <a:rPr lang="pl-PL" dirty="0" smtClean="0"/>
+                        <a:t>0</a:t>
+                      </a:r>
+                      <a:endParaRPr lang="pl-PL" dirty="0"/>
+                    </a:p>
+                  </a:txBody>
+                  <a:tcPr>
+                    <a:solidFill>
+                      <a:schemeClr val="accent1"/>
+                    </a:solidFill>
+                  </a:tcPr>
+                </a:tc>
+              </a:tr>
+              <a:tr h="370840">
+                <a:tc>
+                  <a:txBody>
+                    <a:bodyPr/>
+                    <a:lstStyle/>
+                    <a:p>
+                      <a:r>
+                        <a:rPr lang="pl-PL" i="1" dirty="0" smtClean="0"/>
+                        <a:t>v1</a:t>
+                      </a:r>
+                      <a:endParaRPr lang="pl-PL" i="1" dirty="0"/>
+                    </a:p>
+                  </a:txBody>
+                  <a:tcPr/>
+                </a:tc>
+                <a:tc>
+                  <a:txBody>
+                    <a:bodyPr/>
+                    <a:lstStyle/>
+                    <a:p>
+                      <a:r>
+                        <a:rPr lang="pl-PL" dirty="0" smtClean="0"/>
+                        <a:t>0</a:t>
+                      </a:r>
+                      <a:endParaRPr lang="pl-PL" dirty="0"/>
+                    </a:p>
+                  </a:txBody>
+                  <a:tcPr/>
+                </a:tc>
+                <a:tc>
+                  <a:txBody>
+                    <a:bodyPr/>
+                    <a:lstStyle/>
+                    <a:p>
+                      <a:r>
+                        <a:rPr lang="pl-PL" dirty="0" smtClean="0"/>
+                        <a:t>0</a:t>
+                      </a:r>
+                      <a:endParaRPr lang="pl-PL" dirty="0"/>
+                    </a:p>
+                  </a:txBody>
+                  <a:tcPr/>
+                </a:tc>
+                <a:tc>
+                  <a:txBody>
+                    <a:bodyPr/>
+                    <a:lstStyle/>
+                    <a:p>
+                      <a:r>
+                        <a:rPr lang="pl-PL" dirty="0" smtClean="0"/>
+                        <a:t>0</a:t>
+                      </a:r>
+                      <a:endParaRPr lang="pl-PL" dirty="0"/>
+                    </a:p>
+                  </a:txBody>
+                  <a:tcPr/>
+                </a:tc>
+                <a:tc>
+                  <a:txBody>
+                    <a:bodyPr/>
+                    <a:lstStyle/>
+                    <a:p>
+                      <a:r>
+                        <a:rPr lang="pl-PL" dirty="0" smtClean="0"/>
+                        <a:t>0</a:t>
+                      </a:r>
+                      <a:endParaRPr lang="pl-PL" dirty="0"/>
+                    </a:p>
+                  </a:txBody>
+                  <a:tcPr/>
+                </a:tc>
+                <a:tc>
+                  <a:txBody>
+                    <a:bodyPr/>
+                    <a:lstStyle/>
+                    <a:p>
+                      <a:r>
+                        <a:rPr lang="pl-PL" b="1" dirty="0" smtClean="0">
+                          <a:solidFill>
+                            <a:srgbClr val="FF0000"/>
+                          </a:solidFill>
+                        </a:rPr>
+                        <a:t>1</a:t>
+                      </a:r>
+                      <a:endParaRPr lang="pl-PL" b="1" dirty="0">
+                        <a:solidFill>
+                          <a:srgbClr val="FF0000"/>
+                        </a:solidFill>
+                      </a:endParaRPr>
+                    </a:p>
+                  </a:txBody>
+                  <a:tcPr/>
+                </a:tc>
+                <a:tc>
+                  <a:txBody>
+                    <a:bodyPr/>
+                    <a:lstStyle/>
+                    <a:p>
+                      <a:r>
+                        <a:rPr lang="pl-PL" dirty="0" smtClean="0"/>
+                        <a:t>0</a:t>
+                      </a:r>
+                      <a:endParaRPr lang="pl-PL" dirty="0"/>
+                    </a:p>
+                  </a:txBody>
+                  <a:tcPr/>
+                </a:tc>
+                <a:tc>
+                  <a:txBody>
+                    <a:bodyPr/>
+                    <a:lstStyle/>
+                    <a:p>
+                      <a:r>
+                        <a:rPr lang="pl-PL" dirty="0" smtClean="0"/>
+                        <a:t>0</a:t>
+                      </a:r>
+                      <a:endParaRPr lang="pl-PL" dirty="0"/>
+                    </a:p>
+                  </a:txBody>
+                  <a:tcPr/>
+                </a:tc>
+                <a:tc>
+                  <a:txBody>
+                    <a:bodyPr/>
+                    <a:lstStyle/>
+                    <a:p>
+                      <a:r>
+                        <a:rPr lang="pl-PL" dirty="0" smtClean="0"/>
+                        <a:t>0</a:t>
+                      </a:r>
+                      <a:endParaRPr lang="pl-PL" dirty="0"/>
+                    </a:p>
+                  </a:txBody>
+                  <a:tcPr/>
+                </a:tc>
+                <a:tc>
+                  <a:txBody>
+                    <a:bodyPr/>
+                    <a:lstStyle/>
+                    <a:p>
+                      <a:r>
+                        <a:rPr lang="pl-PL" dirty="0" smtClean="0"/>
+                        <a:t>0</a:t>
+                      </a:r>
+                      <a:endParaRPr lang="pl-PL" dirty="0"/>
+                    </a:p>
+                  </a:txBody>
+                  <a:tcPr/>
+                </a:tc>
+                <a:tc>
+                  <a:txBody>
+                    <a:bodyPr/>
+                    <a:lstStyle/>
+                    <a:p>
+                      <a:r>
+                        <a:rPr lang="pl-PL" dirty="0" smtClean="0"/>
+                        <a:t>0</a:t>
+                      </a:r>
+                      <a:endParaRPr lang="pl-PL" dirty="0"/>
+                    </a:p>
+                  </a:txBody>
+                  <a:tcPr/>
+                </a:tc>
+              </a:tr>
+              <a:tr h="370840">
+                <a:tc>
+                  <a:txBody>
+                    <a:bodyPr/>
+                    <a:lstStyle/>
+                    <a:p>
+                      <a:r>
+                        <a:rPr lang="pl-PL" i="1" dirty="0" smtClean="0"/>
+                        <a:t>v2</a:t>
+                      </a:r>
+                      <a:endParaRPr lang="pl-PL" i="1" dirty="0"/>
+                    </a:p>
+                  </a:txBody>
+                  <a:tcPr/>
+                </a:tc>
+                <a:tc>
+                  <a:txBody>
+                    <a:bodyPr/>
+                    <a:lstStyle/>
+                    <a:p>
+                      <a:r>
+                        <a:rPr lang="pl-PL" dirty="0" smtClean="0"/>
+                        <a:t>0</a:t>
+                      </a:r>
+                      <a:endParaRPr lang="pl-PL" dirty="0"/>
+                    </a:p>
+                  </a:txBody>
+                  <a:tcPr/>
+                </a:tc>
+                <a:tc>
+                  <a:txBody>
+                    <a:bodyPr/>
+                    <a:lstStyle/>
+                    <a:p>
+                      <a:r>
+                        <a:rPr lang="pl-PL" dirty="0" smtClean="0"/>
+                        <a:t>0</a:t>
+                      </a:r>
+                      <a:endParaRPr lang="pl-PL" dirty="0"/>
+                    </a:p>
+                  </a:txBody>
+                  <a:tcPr/>
+                </a:tc>
+                <a:tc>
+                  <a:txBody>
+                    <a:bodyPr/>
+                    <a:lstStyle/>
+                    <a:p>
+                      <a:r>
+                        <a:rPr lang="pl-PL" dirty="0" smtClean="0"/>
+                        <a:t>0</a:t>
+                      </a:r>
+                      <a:endParaRPr lang="pl-PL" dirty="0"/>
+                    </a:p>
+                  </a:txBody>
+                  <a:tcPr/>
+                </a:tc>
+                <a:tc>
+                  <a:txBody>
+                    <a:bodyPr/>
+                    <a:lstStyle/>
+                    <a:p>
+                      <a:r>
+                        <a:rPr lang="pl-PL" dirty="0" smtClean="0"/>
+                        <a:t>0</a:t>
+                      </a:r>
+                      <a:endParaRPr lang="pl-PL" dirty="0"/>
+                    </a:p>
+                  </a:txBody>
+                  <a:tcPr/>
+                </a:tc>
+                <a:tc>
+                  <a:txBody>
+                    <a:bodyPr/>
+                    <a:lstStyle/>
+                    <a:p>
+                      <a:r>
+                        <a:rPr lang="pl-PL" dirty="0" smtClean="0"/>
+                        <a:t>0</a:t>
+                      </a:r>
+                      <a:endParaRPr lang="pl-PL" dirty="0"/>
+                    </a:p>
+                  </a:txBody>
+                  <a:tcPr/>
+                </a:tc>
+                <a:tc>
+                  <a:txBody>
+                    <a:bodyPr/>
+                    <a:lstStyle/>
+                    <a:p>
+                      <a:r>
+                        <a:rPr lang="pl-PL" b="1" dirty="0" smtClean="0">
+                          <a:solidFill>
+                            <a:srgbClr val="FF0000"/>
+                          </a:solidFill>
+                        </a:rPr>
+                        <a:t>1</a:t>
+                      </a:r>
+                      <a:endParaRPr lang="pl-PL" b="1" dirty="0">
+                        <a:solidFill>
+                          <a:srgbClr val="FF0000"/>
+                        </a:solidFill>
+                      </a:endParaRPr>
+                    </a:p>
+                  </a:txBody>
+                  <a:tcPr/>
+                </a:tc>
+                <a:tc>
+                  <a:txBody>
+                    <a:bodyPr/>
+                    <a:lstStyle/>
+                    <a:p>
+                      <a:r>
+                        <a:rPr lang="pl-PL" dirty="0" smtClean="0"/>
+                        <a:t>0</a:t>
+                      </a:r>
+                      <a:endParaRPr lang="pl-PL" dirty="0"/>
+                    </a:p>
+                  </a:txBody>
+                  <a:tcPr/>
+                </a:tc>
+                <a:tc>
+                  <a:txBody>
+                    <a:bodyPr/>
+                    <a:lstStyle/>
+                    <a:p>
+                      <a:r>
+                        <a:rPr lang="pl-PL" dirty="0" smtClean="0"/>
+                        <a:t>0</a:t>
+                      </a:r>
+                      <a:endParaRPr lang="pl-PL" dirty="0"/>
+                    </a:p>
+                  </a:txBody>
+                  <a:tcPr/>
+                </a:tc>
+                <a:tc>
+                  <a:txBody>
+                    <a:bodyPr/>
+                    <a:lstStyle/>
+                    <a:p>
+                      <a:r>
+                        <a:rPr lang="pl-PL" dirty="0" smtClean="0"/>
+                        <a:t>0</a:t>
+                      </a:r>
+                      <a:endParaRPr lang="pl-PL" dirty="0"/>
+                    </a:p>
+                  </a:txBody>
+                  <a:tcPr/>
+                </a:tc>
+                <a:tc>
+                  <a:txBody>
+                    <a:bodyPr/>
+                    <a:lstStyle/>
+                    <a:p>
+                      <a:r>
+                        <a:rPr lang="pl-PL" dirty="0" smtClean="0"/>
+                        <a:t>0</a:t>
+                      </a:r>
+                      <a:endParaRPr lang="pl-PL" dirty="0"/>
+                    </a:p>
+                  </a:txBody>
+                  <a:tcPr/>
+                </a:tc>
+              </a:tr>
+              <a:tr h="370840">
+                <a:tc>
+                  <a:txBody>
+                    <a:bodyPr/>
+                    <a:lstStyle/>
+                    <a:p>
+                      <a:r>
+                        <a:rPr lang="pl-PL" i="1" dirty="0" smtClean="0"/>
+                        <a:t>vi</a:t>
+                      </a:r>
+                      <a:endParaRPr lang="pl-PL" i="1" dirty="0"/>
+                    </a:p>
+                  </a:txBody>
+                  <a:tcPr/>
+                </a:tc>
+                <a:tc>
+                  <a:txBody>
+                    <a:bodyPr/>
+                    <a:lstStyle/>
+                    <a:p>
+                      <a:r>
+                        <a:rPr lang="pl-PL" dirty="0" smtClean="0"/>
+                        <a:t>0</a:t>
+                      </a:r>
+                      <a:endParaRPr lang="pl-PL" dirty="0"/>
+                    </a:p>
+                  </a:txBody>
+                  <a:tcPr/>
+                </a:tc>
+                <a:tc>
+                  <a:txBody>
+                    <a:bodyPr/>
+                    <a:lstStyle/>
+                    <a:p>
+                      <a:r>
+                        <a:rPr lang="pl-PL" dirty="0" smtClean="0"/>
+                        <a:t>.</a:t>
+                      </a:r>
+                      <a:endParaRPr lang="pl-PL" dirty="0"/>
+                    </a:p>
+                  </a:txBody>
+                  <a:tcPr/>
+                </a:tc>
+                <a:tc>
+                  <a:txBody>
+                    <a:bodyPr/>
+                    <a:lstStyle/>
+                    <a:p>
+                      <a:r>
+                        <a:rPr lang="pl-PL" dirty="0" smtClean="0"/>
+                        <a:t>.</a:t>
+                      </a:r>
+                      <a:endParaRPr lang="pl-PL" dirty="0"/>
+                    </a:p>
+                  </a:txBody>
+                  <a:tcPr/>
+                </a:tc>
+                <a:tc>
+                  <a:txBody>
+                    <a:bodyPr/>
+                    <a:lstStyle/>
+                    <a:p>
+                      <a:r>
+                        <a:rPr lang="pl-PL" dirty="0" smtClean="0"/>
+                        <a:t>.</a:t>
+                      </a:r>
+                      <a:endParaRPr lang="pl-PL" dirty="0"/>
+                    </a:p>
+                  </a:txBody>
+                  <a:tcPr/>
+                </a:tc>
+                <a:tc>
+                  <a:txBody>
+                    <a:bodyPr/>
+                    <a:lstStyle/>
+                    <a:p>
+                      <a:r>
+                        <a:rPr lang="pl-PL" dirty="0" smtClean="0"/>
+                        <a:t>.</a:t>
+                      </a:r>
+                      <a:endParaRPr lang="pl-PL" dirty="0"/>
+                    </a:p>
+                  </a:txBody>
+                  <a:tcPr/>
+                </a:tc>
+                <a:tc>
+                  <a:txBody>
+                    <a:bodyPr/>
+                    <a:lstStyle/>
+                    <a:p>
+                      <a:r>
+                        <a:rPr lang="pl-PL" b="0" dirty="0" smtClean="0">
+                          <a:solidFill>
+                            <a:schemeClr val="tx1"/>
+                          </a:solidFill>
+                        </a:rPr>
+                        <a:t>.</a:t>
+                      </a:r>
+                      <a:endParaRPr lang="pl-PL" b="0" dirty="0">
+                        <a:solidFill>
+                          <a:schemeClr val="tx1"/>
+                        </a:solidFill>
+                      </a:endParaRPr>
+                    </a:p>
+                  </a:txBody>
+                  <a:tcPr/>
+                </a:tc>
+                <a:tc>
+                  <a:txBody>
+                    <a:bodyPr/>
+                    <a:lstStyle/>
+                    <a:p>
+                      <a:r>
+                        <a:rPr lang="pl-PL" dirty="0" smtClean="0"/>
+                        <a:t>.</a:t>
+                      </a:r>
+                      <a:endParaRPr lang="pl-PL" dirty="0"/>
+                    </a:p>
+                  </a:txBody>
+                  <a:tcPr/>
+                </a:tc>
+                <a:tc>
+                  <a:txBody>
+                    <a:bodyPr/>
+                    <a:lstStyle/>
+                    <a:p>
+                      <a:r>
+                        <a:rPr lang="pl-PL" dirty="0" smtClean="0"/>
+                        <a:t>1</a:t>
+                      </a:r>
+                      <a:endParaRPr lang="pl-PL" dirty="0"/>
+                    </a:p>
+                  </a:txBody>
+                  <a:tcPr/>
+                </a:tc>
+                <a:tc>
+                  <a:txBody>
+                    <a:bodyPr/>
+                    <a:lstStyle/>
+                    <a:p>
+                      <a:r>
+                        <a:rPr lang="pl-PL" dirty="0" smtClean="0"/>
+                        <a:t>.</a:t>
+                      </a:r>
+                      <a:endParaRPr lang="pl-PL" dirty="0"/>
+                    </a:p>
+                  </a:txBody>
+                  <a:tcPr/>
+                </a:tc>
+                <a:tc>
+                  <a:txBody>
+                    <a:bodyPr/>
+                    <a:lstStyle/>
+                    <a:p>
+                      <a:r>
+                        <a:rPr lang="pl-PL" dirty="0" smtClean="0"/>
+                        <a:t>.</a:t>
+                      </a:r>
+                      <a:endParaRPr lang="pl-PL" dirty="0"/>
+                    </a:p>
+                  </a:txBody>
+                  <a:tcPr/>
+                </a:tc>
+              </a:tr>
+            </a:tbl>
+          </a:graphicData>
+        </a:graphic>
+      </p:graphicFrame>
+      <p:sp>
+        <p:nvSpPr>
+          <p:cNvPr id="7" name="pole tekstowe 6"/>
+          <p:cNvSpPr txBox="1"/>
+          <p:nvPr/>
+        </p:nvSpPr>
         <p:spPr>
           <a:xfrm>
-            <a:off x="1835696" y="1700808"/>
-            <a:ext cx="7308304" cy="5040399"/>
+            <a:off x="2195736" y="4797152"/>
+            <a:ext cx="6192688" cy="369332"/>
           </a:xfrm>
+          <a:prstGeom prst="rect">
+            <a:avLst/>
+          </a:prstGeom>
+          <a:effectLst>
+            <a:outerShdw blurRad="50800" dist="38100" dir="2700000" algn="tl" rotWithShape="0">
+              <a:prstClr val="black">
+                <a:alpha val="40000"/>
+              </a:prstClr>
+            </a:outerShdw>
+          </a:effectLst>
         </p:spPr>
-      </p:pic>
+        <p:style>
+          <a:lnRef idx="1">
+            <a:schemeClr val="accent3"/>
+          </a:lnRef>
+          <a:fillRef idx="2">
+            <a:schemeClr val="accent3"/>
+          </a:fillRef>
+          <a:effectRef idx="1">
+            <a:schemeClr val="accent3"/>
+          </a:effectRef>
+          <a:fontRef idx="minor">
+            <a:schemeClr val="dk1"/>
+          </a:fontRef>
+        </p:style>
+        <p:txBody>
+          <a:bodyPr wrap="square" rtlCol="0">
+            <a:spAutoFit/>
+          </a:bodyPr>
+          <a:lstStyle/>
+          <a:p>
+            <a:r>
+              <a:rPr lang="pl-PL" dirty="0" smtClean="0"/>
+              <a:t>Problem małej gęstości wektora !</a:t>
+            </a:r>
+            <a:endParaRPr lang="pl-PL" dirty="0"/>
+          </a:p>
+        </p:txBody>
+      </p:sp>
+      <p:sp>
+        <p:nvSpPr>
+          <p:cNvPr id="9" name="pole tekstowe 8"/>
+          <p:cNvSpPr txBox="1"/>
+          <p:nvPr/>
+        </p:nvSpPr>
+        <p:spPr>
+          <a:xfrm>
+            <a:off x="2197667" y="5661248"/>
+            <a:ext cx="6192688" cy="369332"/>
+          </a:xfrm>
+          <a:prstGeom prst="rect">
+            <a:avLst/>
+          </a:prstGeom>
+          <a:effectLst>
+            <a:outerShdw blurRad="50800" dist="38100" dir="2700000" algn="tl" rotWithShape="0">
+              <a:prstClr val="black">
+                <a:alpha val="40000"/>
+              </a:prstClr>
+            </a:outerShdw>
+          </a:effectLst>
+        </p:spPr>
+        <p:style>
+          <a:lnRef idx="1">
+            <a:schemeClr val="accent3"/>
+          </a:lnRef>
+          <a:fillRef idx="2">
+            <a:schemeClr val="accent3"/>
+          </a:fillRef>
+          <a:effectRef idx="1">
+            <a:schemeClr val="accent3"/>
+          </a:effectRef>
+          <a:fontRef idx="minor">
+            <a:schemeClr val="dk1"/>
+          </a:fontRef>
+        </p:style>
+        <p:txBody>
+          <a:bodyPr wrap="square" rtlCol="0">
+            <a:spAutoFit/>
+          </a:bodyPr>
+          <a:lstStyle/>
+          <a:p>
+            <a:r>
+              <a:rPr lang="pl-PL" dirty="0" smtClean="0"/>
+              <a:t>Problem ułożenia pamięci na </a:t>
+            </a:r>
+            <a:r>
+              <a:rPr lang="pl-PL" smtClean="0"/>
+              <a:t>systemach heterogenicznych !</a:t>
+            </a:r>
+            <a:endParaRPr lang="pl-PL" dirty="0"/>
+          </a:p>
+        </p:txBody>
+      </p:sp>
     </p:spTree>
     <p:extLst>
       <p:ext uri="{BB962C8B-B14F-4D97-AF65-F5344CB8AC3E}">
-        <p14:creationId xmlns:p14="http://schemas.microsoft.com/office/powerpoint/2010/main" xmlns="" val="3634968103"/>
+        <p14:creationId xmlns:p14="http://schemas.microsoft.com/office/powerpoint/2010/main" val="916069942"/>
       </p:ext>
     </p:extLst>
   </p:cSld>
@@ -7654,59 +8676,62 @@
           <a:lstStyle/>
           <a:p>
             <a:r>
-              <a:rPr lang="en-US" dirty="0"/>
-              <a:t>Transaction Bitmap</a:t>
-            </a:r>
-            <a:r>
               <a:rPr lang="pl-PL" dirty="0" smtClean="0"/>
-              <a:t> </a:t>
+              <a:t>Implementacja</a:t>
             </a:r>
             <a:endParaRPr lang="pl-PL" dirty="0"/>
           </a:p>
         </p:txBody>
       </p:sp>
-      <p:pic>
-        <p:nvPicPr>
-          <p:cNvPr id="4" name="Symbol zastępczy zawartości 3"/>
-          <p:cNvPicPr>
-            <a:picLocks noGrp="1" noChangeAspect="1"/>
-          </p:cNvPicPr>
+      <p:sp>
+        <p:nvSpPr>
+          <p:cNvPr id="3" name="Symbol zastępczy zawartości 2"/>
+          <p:cNvSpPr>
+            <a:spLocks noGrp="1"/>
+          </p:cNvSpPr>
           <p:nvPr>
             <p:ph idx="1"/>
           </p:nvPr>
-        </p:nvPicPr>
-        <p:blipFill>
-          <a:blip r:embed="rId2" cstate="print">
-            <a:extLst>
-              <a:ext uri="{28A0092B-C50C-407E-A947-70E740481C1C}">
-                <a14:useLocalDpi xmlns:a14="http://schemas.microsoft.com/office/drawing/2010/main" xmlns="" val="0"/>
-              </a:ext>
-            </a:extLst>
-          </a:blip>
-          <a:stretch>
-            <a:fillRect/>
-          </a:stretch>
-        </p:blipFill>
-        <p:spPr>
-          <a:xfrm>
-            <a:off x="2627784" y="1952739"/>
-            <a:ext cx="6120680" cy="4699439"/>
-          </a:xfrm>
-          <a:prstGeom prst="rect">
-            <a:avLst/>
-          </a:prstGeom>
-          <a:ln>
-            <a:noFill/>
-          </a:ln>
-          <a:effectLst>
-            <a:softEdge rad="112500"/>
-          </a:effectLst>
-        </p:spPr>
-      </p:pic>
+        </p:nvSpPr>
+        <p:spPr/>
+        <p:txBody>
+          <a:bodyPr/>
+          <a:lstStyle/>
+          <a:p>
+            <a:r>
+              <a:rPr lang="pl-PL" dirty="0" err="1" smtClean="0"/>
+              <a:t>Oracle</a:t>
+            </a:r>
+            <a:r>
+              <a:rPr lang="pl-PL" dirty="0" smtClean="0"/>
+              <a:t> Java 1.6</a:t>
+            </a:r>
+          </a:p>
+          <a:p>
+            <a:r>
+              <a:rPr lang="pl-PL" dirty="0" smtClean="0"/>
+              <a:t>JOCL 0.1.6</a:t>
+            </a:r>
+          </a:p>
+          <a:p>
+            <a:r>
+              <a:rPr lang="pl-PL" dirty="0" smtClean="0"/>
+              <a:t>JCUDA 0.3.2a</a:t>
+            </a:r>
+          </a:p>
+          <a:p>
+            <a:r>
+              <a:rPr lang="pl-PL" dirty="0" smtClean="0"/>
+              <a:t>Weka 3.7.3</a:t>
+            </a:r>
+            <a:endParaRPr lang="pl-PL" dirty="0"/>
+          </a:p>
+        </p:txBody>
+      </p:sp>
     </p:spTree>
     <p:extLst>
       <p:ext uri="{BB962C8B-B14F-4D97-AF65-F5344CB8AC3E}">
-        <p14:creationId xmlns:p14="http://schemas.microsoft.com/office/powerpoint/2010/main" xmlns="" val="2435867398"/>
+        <p14:creationId xmlns:p14="http://schemas.microsoft.com/office/powerpoint/2010/main" val="228527706"/>
       </p:ext>
     </p:extLst>
   </p:cSld>
@@ -7773,7 +8798,9 @@
           </a:xfrm>
         </p:spPr>
         <p:txBody>
-          <a:bodyPr/>
+          <a:bodyPr>
+            <a:normAutofit fontScale="92500" lnSpcReduction="20000"/>
+          </a:bodyPr>
           <a:lstStyle/>
           <a:p>
             <a:r>
@@ -7817,6 +8844,13 @@
               <a:t>Shaders</a:t>
             </a:r>
             <a:endParaRPr lang="pl-PL" dirty="0" smtClean="0"/>
+          </a:p>
+          <a:p>
+            <a:r>
+              <a:rPr lang="en-US" dirty="0" smtClean="0"/>
+              <a:t>Unified Cores</a:t>
+            </a:r>
+            <a:endParaRPr lang="en-US" dirty="0" smtClean="0"/>
           </a:p>
           <a:p>
             <a:pPr marL="0" indent="0">
@@ -7824,7 +8858,11 @@
             </a:pPr>
             <a:r>
               <a:rPr lang="pl-PL" i="1" dirty="0" smtClean="0"/>
-              <a:t>Ciekawostka operacje bitowe (|, &amp;)pojawiły się dopiero w </a:t>
+              <a:t>Ciekawostka </a:t>
+            </a:r>
+            <a:r>
+              <a:rPr lang="pl-PL" i="1" dirty="0" smtClean="0"/>
+              <a:t>operacje bitowe (|, &amp;)pojawiły się dopiero w </a:t>
             </a:r>
             <a:r>
               <a:rPr lang="pl-PL" i="1" dirty="0" err="1" smtClean="0"/>
@@ -7851,7 +8889,7 @@
     </p:spTree>
     <p:extLst>
       <p:ext uri="{BB962C8B-B14F-4D97-AF65-F5344CB8AC3E}">
-        <p14:creationId xmlns:p14="http://schemas.microsoft.com/office/powerpoint/2010/main" xmlns="" val="296281128"/>
+        <p14:creationId xmlns:p14="http://schemas.microsoft.com/office/powerpoint/2010/main" val="296281128"/>
       </p:ext>
     </p:extLst>
   </p:cSld>
@@ -7890,42 +8928,92 @@
         </p:nvSpPr>
         <p:spPr/>
         <p:txBody>
-          <a:bodyPr>
-            <a:normAutofit fontScale="90000"/>
+          <a:bodyPr/>
+          <a:lstStyle/>
+          <a:p>
+            <a:r>
+              <a:rPr lang="pl-PL" dirty="0" smtClean="0"/>
+              <a:t>Kod</a:t>
+            </a:r>
+            <a:endParaRPr lang="pl-PL" dirty="0"/>
+          </a:p>
+        </p:txBody>
+      </p:sp>
+      <p:pic>
+        <p:nvPicPr>
+          <p:cNvPr id="4" name="Symbol zastępczy zawartości 3"/>
+          <p:cNvPicPr>
+            <a:picLocks noGrp="1" noChangeAspect="1"/>
+          </p:cNvPicPr>
+          <p:nvPr>
+            <p:ph idx="1"/>
+          </p:nvPr>
+        </p:nvPicPr>
+        <p:blipFill>
+          <a:blip r:embed="rId2" cstate="print">
+            <a:extLst>
+              <a:ext uri="{28A0092B-C50C-407E-A947-70E740481C1C}">
+                <a14:useLocalDpi xmlns:a14="http://schemas.microsoft.com/office/drawing/2010/main" val="0"/>
+              </a:ext>
+            </a:extLst>
+          </a:blip>
+          <a:stretch>
+            <a:fillRect/>
+          </a:stretch>
+        </p:blipFill>
+        <p:spPr>
+          <a:xfrm>
+            <a:off x="4149367" y="2204864"/>
+            <a:ext cx="2610014" cy="3599232"/>
+          </a:xfrm>
+          <a:prstGeom prst="rect">
+            <a:avLst/>
+          </a:prstGeom>
+          <a:ln>
+            <a:noFill/>
+          </a:ln>
+          <a:effectLst>
+            <a:softEdge rad="112500"/>
+          </a:effectLst>
+        </p:spPr>
+      </p:pic>
+      <p:sp>
+        <p:nvSpPr>
+          <p:cNvPr id="3" name="pole tekstowe 2"/>
+          <p:cNvSpPr txBox="1"/>
+          <p:nvPr/>
+        </p:nvSpPr>
+        <p:spPr>
+          <a:xfrm>
+            <a:off x="2106002" y="6165304"/>
+            <a:ext cx="6696744" cy="400110"/>
+          </a:xfrm>
+          <a:prstGeom prst="rect">
+            <a:avLst/>
+          </a:prstGeom>
+          <a:noFill/>
+        </p:spPr>
+        <p:txBody>
+          <a:bodyPr wrap="square" rtlCol="0">
+            <a:spAutoFit/>
           </a:bodyPr>
           <a:lstStyle/>
           <a:p>
-            <a:r>
-              <a:rPr lang="en-US" dirty="0" smtClean="0"/>
-              <a:t>Bitmap candidates generation</a:t>
-            </a:r>
-            <a:endParaRPr lang="en-US" dirty="0"/>
-          </a:p>
-        </p:txBody>
-      </p:sp>
-      <p:sp>
-        <p:nvSpPr>
-          <p:cNvPr id="3" name="Symbol zastępczy zawartości 2"/>
-          <p:cNvSpPr>
-            <a:spLocks noGrp="1"/>
-          </p:cNvSpPr>
-          <p:nvPr>
-            <p:ph idx="1"/>
-          </p:nvPr>
-        </p:nvSpPr>
-        <p:spPr/>
-        <p:txBody>
-          <a:bodyPr/>
-          <a:lstStyle/>
-          <a:p>
-            <a:endParaRPr lang="pl-PL"/>
+            <a:pPr algn="ctr"/>
+            <a:r>
+              <a:rPr lang="pl-PL" sz="2000" dirty="0">
+                <a:hlinkClick r:id="rId3"/>
+              </a:rPr>
+              <a:t>https://github.com/Dzess/DMARF</a:t>
+            </a:r>
+            <a:endParaRPr lang="pl-PL" sz="2000" dirty="0"/>
           </a:p>
         </p:txBody>
       </p:sp>
     </p:spTree>
     <p:extLst>
       <p:ext uri="{BB962C8B-B14F-4D97-AF65-F5344CB8AC3E}">
-        <p14:creationId xmlns:p14="http://schemas.microsoft.com/office/powerpoint/2010/main" xmlns="" val="916069942"/>
+        <p14:creationId xmlns:p14="http://schemas.microsoft.com/office/powerpoint/2010/main" val="3558109262"/>
       </p:ext>
     </p:extLst>
   </p:cSld>
@@ -7969,7 +9057,7 @@
           <a:p>
             <a:r>
               <a:rPr lang="pl-PL" dirty="0" smtClean="0"/>
-              <a:t>Implementacja</a:t>
+              <a:t>Referencje</a:t>
             </a:r>
             <a:endParaRPr lang="pl-PL" dirty="0"/>
           </a:p>
@@ -7985,37 +9073,152 @@
             <p:ph idx="1"/>
           </p:nvPr>
         </p:nvSpPr>
-        <p:spPr/>
-        <p:txBody>
-          <a:bodyPr/>
+        <p:spPr>
+          <a:xfrm>
+            <a:off x="2438400" y="2286000"/>
+            <a:ext cx="6598096" cy="4167336"/>
+          </a:xfrm>
+        </p:spPr>
+        <p:txBody>
+          <a:bodyPr>
+            <a:normAutofit fontScale="62500" lnSpcReduction="20000"/>
+          </a:bodyPr>
           <a:lstStyle/>
           <a:p>
-            <a:r>
-              <a:rPr lang="pl-PL" dirty="0" err="1" smtClean="0"/>
-              <a:t>Oracle</a:t>
-            </a:r>
-            <a:r>
-              <a:rPr lang="pl-PL" dirty="0" smtClean="0"/>
-              <a:t> Java 1.6</a:t>
-            </a:r>
-          </a:p>
-          <a:p>
-            <a:r>
-              <a:rPr lang="pl-PL" dirty="0" smtClean="0"/>
-              <a:t>JOCL 0.1.6</a:t>
-            </a:r>
-          </a:p>
-          <a:p>
-            <a:r>
-              <a:rPr lang="pl-PL" dirty="0" smtClean="0"/>
-              <a:t>JCUDA 0.3.2a</a:t>
-            </a:r>
-          </a:p>
-          <a:p>
-            <a:r>
-              <a:rPr lang="pl-PL" dirty="0" smtClean="0"/>
-              <a:t>Weka 3.7.3</a:t>
-            </a:r>
+            <a:pPr marL="0" indent="0">
+              <a:buNone/>
+            </a:pPr>
+            <a:r>
+              <a:rPr lang="pl-PL" sz="2600" dirty="0" smtClean="0"/>
+              <a:t>GPGPU</a:t>
+            </a:r>
+            <a:endParaRPr lang="pl-PL" dirty="0" smtClean="0">
+              <a:hlinkClick r:id="rId2"/>
+            </a:endParaRPr>
+          </a:p>
+          <a:p>
+            <a:r>
+              <a:rPr lang="pl-PL" sz="2500" dirty="0">
+                <a:hlinkClick r:id="rId3"/>
+              </a:rPr>
+              <a:t>http://</a:t>
+            </a:r>
+            <a:r>
+              <a:rPr lang="pl-PL" sz="2500" dirty="0" smtClean="0">
+                <a:hlinkClick r:id="rId3"/>
+              </a:rPr>
+              <a:t>www.gpucomputing.net</a:t>
+            </a:r>
+            <a:endParaRPr lang="pl-PL" sz="2500" dirty="0" smtClean="0"/>
+          </a:p>
+          <a:p>
+            <a:r>
+              <a:rPr lang="pl-PL" sz="2500" dirty="0">
+                <a:hlinkClick r:id="rId4"/>
+              </a:rPr>
+              <a:t>http://www.khronos.org/opencl</a:t>
+            </a:r>
+            <a:r>
+              <a:rPr lang="pl-PL" sz="2500" dirty="0" smtClean="0">
+                <a:hlinkClick r:id="rId4"/>
+              </a:rPr>
+              <a:t>/</a:t>
+            </a:r>
+            <a:endParaRPr lang="pl-PL" sz="2500" dirty="0" smtClean="0">
+              <a:hlinkClick r:id="rId2"/>
+            </a:endParaRPr>
+          </a:p>
+          <a:p>
+            <a:r>
+              <a:rPr lang="pl-PL" sz="2500" dirty="0" smtClean="0">
+                <a:hlinkClick r:id="rId5"/>
+              </a:rPr>
+              <a:t>http://developer.nvidia.com/</a:t>
+            </a:r>
+            <a:r>
+              <a:rPr lang="pl-PL" sz="2500" dirty="0" smtClean="0"/>
+              <a:t> </a:t>
+            </a:r>
+          </a:p>
+          <a:p>
+            <a:r>
+              <a:rPr lang="pl-PL" sz="2500" dirty="0" smtClean="0">
+                <a:hlinkClick r:id="rId6"/>
+              </a:rPr>
+              <a:t>http://www.pgroup.com/resources/accel.htm</a:t>
+            </a:r>
+            <a:endParaRPr lang="pl-PL" sz="2500" dirty="0" smtClean="0"/>
+          </a:p>
+          <a:p>
+            <a:r>
+              <a:rPr lang="pl-PL" sz="2500" dirty="0" smtClean="0">
+                <a:hlinkClick r:id="rId7"/>
+              </a:rPr>
+              <a:t>http</a:t>
+            </a:r>
+            <a:r>
+              <a:rPr lang="pl-PL" sz="2500" dirty="0">
+                <a:hlinkClick r:id="rId7"/>
+              </a:rPr>
+              <a:t>://</a:t>
+            </a:r>
+            <a:r>
+              <a:rPr lang="pl-PL" sz="2500" dirty="0" smtClean="0">
+                <a:hlinkClick r:id="rId7"/>
+              </a:rPr>
+              <a:t>developer.amd.com/gpu/AMDAPPSDK/Pages/default.aspx</a:t>
+            </a:r>
+            <a:endParaRPr lang="pl-PL" sz="2500" dirty="0" smtClean="0"/>
+          </a:p>
+          <a:p>
+            <a:r>
+              <a:rPr lang="pl-PL" sz="2500" dirty="0">
+                <a:hlinkClick r:id="rId8"/>
+              </a:rPr>
+              <a:t>http://graphics.stanford.edu/projects/brookgpu/</a:t>
+            </a:r>
+            <a:endParaRPr lang="pl-PL" sz="2500" dirty="0" smtClean="0"/>
+          </a:p>
+          <a:p>
+            <a:r>
+              <a:rPr lang="pl-PL" sz="2500" dirty="0">
+                <a:hlinkClick r:id="rId9"/>
+              </a:rPr>
+              <a:t>http://software.intel.com/en-us/articles/opencl-sdk</a:t>
+            </a:r>
+            <a:r>
+              <a:rPr lang="pl-PL" sz="2500" dirty="0" smtClean="0">
+                <a:hlinkClick r:id="rId9"/>
+              </a:rPr>
+              <a:t>/</a:t>
+            </a:r>
+            <a:endParaRPr lang="pl-PL" sz="2500" dirty="0" smtClean="0"/>
+          </a:p>
+          <a:p>
+            <a:r>
+              <a:rPr lang="pl-PL" sz="2500" dirty="0">
+                <a:hlinkClick r:id="rId10"/>
+              </a:rPr>
+              <a:t>http://www.jocl.org</a:t>
+            </a:r>
+            <a:r>
+              <a:rPr lang="pl-PL" sz="2500" dirty="0" smtClean="0">
+                <a:hlinkClick r:id="rId10"/>
+              </a:rPr>
+              <a:t>/</a:t>
+            </a:r>
+            <a:endParaRPr lang="pl-PL" sz="2500" dirty="0" smtClean="0"/>
+          </a:p>
+          <a:p>
+            <a:r>
+              <a:rPr lang="pl-PL" sz="2500" dirty="0">
+                <a:hlinkClick r:id="rId11"/>
+              </a:rPr>
+              <a:t>http://www.mimuw.edu.pl/~krzadca/opencl.html</a:t>
+            </a:r>
+            <a:endParaRPr lang="pl-PL" sz="2500" dirty="0" smtClean="0"/>
+          </a:p>
+          <a:p>
             <a:endParaRPr lang="pl-PL" dirty="0"/>
           </a:p>
         </p:txBody>
@@ -8023,7 +9226,7 @@
     </p:spTree>
     <p:extLst>
       <p:ext uri="{BB962C8B-B14F-4D97-AF65-F5344CB8AC3E}">
-        <p14:creationId xmlns:p14="http://schemas.microsoft.com/office/powerpoint/2010/main" xmlns="" val="228527706"/>
+        <p14:creationId xmlns:p14="http://schemas.microsoft.com/office/powerpoint/2010/main" val="1708677104"/>
       </p:ext>
     </p:extLst>
   </p:cSld>
@@ -8067,310 +9270,6 @@
           <a:p>
             <a:r>
               <a:rPr lang="pl-PL" dirty="0" smtClean="0"/>
-              <a:t>Kod</a:t>
-            </a:r>
-            <a:endParaRPr lang="pl-PL" dirty="0"/>
-          </a:p>
-        </p:txBody>
-      </p:sp>
-      <p:pic>
-        <p:nvPicPr>
-          <p:cNvPr id="4" name="Symbol zastępczy zawartości 3"/>
-          <p:cNvPicPr>
-            <a:picLocks noGrp="1" noChangeAspect="1"/>
-          </p:cNvPicPr>
-          <p:nvPr>
-            <p:ph idx="1"/>
-          </p:nvPr>
-        </p:nvPicPr>
-        <p:blipFill>
-          <a:blip r:embed="rId2" cstate="print">
-            <a:extLst>
-              <a:ext uri="{28A0092B-C50C-407E-A947-70E740481C1C}">
-                <a14:useLocalDpi xmlns:a14="http://schemas.microsoft.com/office/drawing/2010/main" xmlns="" val="0"/>
-              </a:ext>
-            </a:extLst>
-          </a:blip>
-          <a:stretch>
-            <a:fillRect/>
-          </a:stretch>
-        </p:blipFill>
-        <p:spPr>
-          <a:xfrm>
-            <a:off x="2267744" y="2276872"/>
-            <a:ext cx="2784727" cy="3840163"/>
-          </a:xfrm>
-          <a:prstGeom prst="rect">
-            <a:avLst/>
-          </a:prstGeom>
-          <a:ln>
-            <a:noFill/>
-          </a:ln>
-          <a:effectLst>
-            <a:softEdge rad="112500"/>
-          </a:effectLst>
-        </p:spPr>
-      </p:pic>
-    </p:spTree>
-    <p:extLst>
-      <p:ext uri="{BB962C8B-B14F-4D97-AF65-F5344CB8AC3E}">
-        <p14:creationId xmlns:p14="http://schemas.microsoft.com/office/powerpoint/2010/main" xmlns="" val="3558109262"/>
-      </p:ext>
-    </p:extLst>
-  </p:cSld>
-  <p:clrMapOvr>
-    <a:masterClrMapping/>
-  </p:clrMapOvr>
-</p:sld>
-</file>
-
-<file path=ppt/slides/slide23.xml><?xml version="1.0" encoding="utf-8"?>
-<p:sld xmlns:a="http://schemas.openxmlformats.org/drawingml/2006/main" xmlns:r="http://schemas.openxmlformats.org/officeDocument/2006/relationships" xmlns:p="http://schemas.openxmlformats.org/presentationml/2006/main">
-  <p:cSld>
-    <p:spTree>
-      <p:nvGrpSpPr>
-        <p:cNvPr id="1" name=""/>
-        <p:cNvGrpSpPr/>
-        <p:nvPr/>
-      </p:nvGrpSpPr>
-      <p:grpSpPr>
-        <a:xfrm>
-          <a:off x="0" y="0"/>
-          <a:ext cx="0" cy="0"/>
-          <a:chOff x="0" y="0"/>
-          <a:chExt cx="0" cy="0"/>
-        </a:xfrm>
-      </p:grpSpPr>
-      <p:sp>
-        <p:nvSpPr>
-          <p:cNvPr id="2" name="Tytuł 1"/>
-          <p:cNvSpPr>
-            <a:spLocks noGrp="1"/>
-          </p:cNvSpPr>
-          <p:nvPr>
-            <p:ph type="title"/>
-          </p:nvPr>
-        </p:nvSpPr>
-        <p:spPr/>
-        <p:txBody>
-          <a:bodyPr/>
-          <a:lstStyle/>
-          <a:p>
-            <a:r>
-              <a:rPr lang="pl-PL" dirty="0" smtClean="0"/>
-              <a:t>Referencje</a:t>
-            </a:r>
-            <a:endParaRPr lang="pl-PL" dirty="0"/>
-          </a:p>
-        </p:txBody>
-      </p:sp>
-      <p:sp>
-        <p:nvSpPr>
-          <p:cNvPr id="3" name="Symbol zastępczy zawartości 2"/>
-          <p:cNvSpPr>
-            <a:spLocks noGrp="1"/>
-          </p:cNvSpPr>
-          <p:nvPr>
-            <p:ph idx="1"/>
-          </p:nvPr>
-        </p:nvSpPr>
-        <p:spPr>
-          <a:xfrm>
-            <a:off x="2438400" y="2286000"/>
-            <a:ext cx="6598096" cy="4167336"/>
-          </a:xfrm>
-        </p:spPr>
-        <p:txBody>
-          <a:bodyPr>
-            <a:normAutofit fontScale="62500" lnSpcReduction="20000"/>
-          </a:bodyPr>
-          <a:lstStyle/>
-          <a:p>
-            <a:pPr marL="0" indent="0">
-              <a:buNone/>
-            </a:pPr>
-            <a:r>
-              <a:rPr lang="pl-PL" sz="2600" dirty="0" smtClean="0"/>
-              <a:t>GPGPU</a:t>
-            </a:r>
-            <a:endParaRPr lang="pl-PL" dirty="0" smtClean="0">
-              <a:hlinkClick r:id="rId2"/>
-            </a:endParaRPr>
-          </a:p>
-          <a:p>
-            <a:r>
-              <a:rPr lang="pl-PL" sz="2500" dirty="0">
-                <a:hlinkClick r:id="rId3"/>
-              </a:rPr>
-              <a:t>http://</a:t>
-            </a:r>
-            <a:r>
-              <a:rPr lang="pl-PL" sz="2500" dirty="0" smtClean="0">
-                <a:hlinkClick r:id="rId3"/>
-              </a:rPr>
-              <a:t>www.gpucomputing.net</a:t>
-            </a:r>
-            <a:endParaRPr lang="pl-PL" sz="2500" dirty="0" smtClean="0"/>
-          </a:p>
-          <a:p>
-            <a:r>
-              <a:rPr lang="pl-PL" sz="2500" dirty="0">
-                <a:hlinkClick r:id="rId4"/>
-              </a:rPr>
-              <a:t>http://www.khronos.org/opencl</a:t>
-            </a:r>
-            <a:r>
-              <a:rPr lang="pl-PL" sz="2500" dirty="0" smtClean="0">
-                <a:hlinkClick r:id="rId4"/>
-              </a:rPr>
-              <a:t>/</a:t>
-            </a:r>
-            <a:endParaRPr lang="pl-PL" sz="2500" dirty="0" smtClean="0">
-              <a:hlinkClick r:id="rId2"/>
-            </a:endParaRPr>
-          </a:p>
-          <a:p>
-            <a:r>
-              <a:rPr lang="pl-PL" sz="2500" dirty="0" smtClean="0">
-                <a:hlinkClick r:id="rId5"/>
-              </a:rPr>
-              <a:t>http://developer.nvidia.com/</a:t>
-            </a:r>
-            <a:r>
-              <a:rPr lang="pl-PL" sz="2500" dirty="0" smtClean="0"/>
-              <a:t> </a:t>
-            </a:r>
-          </a:p>
-          <a:p>
-            <a:r>
-              <a:rPr lang="pl-PL" sz="2500" dirty="0" smtClean="0">
-                <a:hlinkClick r:id="rId6"/>
-              </a:rPr>
-              <a:t>http://www.pgroup.com/resources/accel.htm</a:t>
-            </a:r>
-            <a:endParaRPr lang="pl-PL" sz="2500" dirty="0" smtClean="0"/>
-          </a:p>
-          <a:p>
-            <a:r>
-              <a:rPr lang="pl-PL" sz="2500" dirty="0" smtClean="0">
-                <a:hlinkClick r:id="rId7"/>
-              </a:rPr>
-              <a:t>http</a:t>
-            </a:r>
-            <a:r>
-              <a:rPr lang="pl-PL" sz="2500" dirty="0">
-                <a:hlinkClick r:id="rId7"/>
-              </a:rPr>
-              <a:t>://</a:t>
-            </a:r>
-            <a:r>
-              <a:rPr lang="pl-PL" sz="2500" dirty="0" smtClean="0">
-                <a:hlinkClick r:id="rId7"/>
-              </a:rPr>
-              <a:t>developer.amd.com/gpu/AMDAPPSDK/Pages/default.aspx</a:t>
-            </a:r>
-            <a:endParaRPr lang="pl-PL" sz="2500" dirty="0" smtClean="0"/>
-          </a:p>
-          <a:p>
-            <a:r>
-              <a:rPr lang="pl-PL" sz="2500" dirty="0">
-                <a:hlinkClick r:id="rId8"/>
-              </a:rPr>
-              <a:t>http://graphics.stanford.edu/projects/brookgpu/</a:t>
-            </a:r>
-            <a:endParaRPr lang="pl-PL" sz="2500" dirty="0" smtClean="0"/>
-          </a:p>
-          <a:p>
-            <a:r>
-              <a:rPr lang="pl-PL" sz="2500" dirty="0">
-                <a:hlinkClick r:id="rId9"/>
-              </a:rPr>
-              <a:t>http://software.intel.com/en-us/articles/opencl-sdk</a:t>
-            </a:r>
-            <a:r>
-              <a:rPr lang="pl-PL" sz="2500" dirty="0" smtClean="0">
-                <a:hlinkClick r:id="rId9"/>
-              </a:rPr>
-              <a:t>/</a:t>
-            </a:r>
-            <a:endParaRPr lang="pl-PL" sz="2500" dirty="0" smtClean="0"/>
-          </a:p>
-          <a:p>
-            <a:r>
-              <a:rPr lang="pl-PL" sz="2500" dirty="0">
-                <a:hlinkClick r:id="rId10"/>
-              </a:rPr>
-              <a:t>http://www.jocl.org</a:t>
-            </a:r>
-            <a:r>
-              <a:rPr lang="pl-PL" sz="2500" dirty="0" smtClean="0">
-                <a:hlinkClick r:id="rId10"/>
-              </a:rPr>
-              <a:t>/</a:t>
-            </a:r>
-            <a:endParaRPr lang="pl-PL" sz="2500" dirty="0" smtClean="0"/>
-          </a:p>
-          <a:p>
-            <a:r>
-              <a:rPr lang="pl-PL" sz="2500" dirty="0">
-                <a:hlinkClick r:id="rId11"/>
-              </a:rPr>
-              <a:t>http://www.mimuw.edu.pl/~krzadca/opencl.html</a:t>
-            </a:r>
-            <a:endParaRPr lang="pl-PL" sz="2500" dirty="0" smtClean="0"/>
-          </a:p>
-          <a:p>
-            <a:endParaRPr lang="pl-PL" dirty="0"/>
-          </a:p>
-        </p:txBody>
-      </p:sp>
-    </p:spTree>
-    <p:extLst>
-      <p:ext uri="{BB962C8B-B14F-4D97-AF65-F5344CB8AC3E}">
-        <p14:creationId xmlns:p14="http://schemas.microsoft.com/office/powerpoint/2010/main" xmlns="" val="1708677104"/>
-      </p:ext>
-    </p:extLst>
-  </p:cSld>
-  <p:clrMapOvr>
-    <a:masterClrMapping/>
-  </p:clrMapOvr>
-</p:sld>
-</file>
-
-<file path=ppt/slides/slide24.xml><?xml version="1.0" encoding="utf-8"?>
-<p:sld xmlns:a="http://schemas.openxmlformats.org/drawingml/2006/main" xmlns:r="http://schemas.openxmlformats.org/officeDocument/2006/relationships" xmlns:p="http://schemas.openxmlformats.org/presentationml/2006/main">
-  <p:cSld>
-    <p:spTree>
-      <p:nvGrpSpPr>
-        <p:cNvPr id="1" name=""/>
-        <p:cNvGrpSpPr/>
-        <p:nvPr/>
-      </p:nvGrpSpPr>
-      <p:grpSpPr>
-        <a:xfrm>
-          <a:off x="0" y="0"/>
-          <a:ext cx="0" cy="0"/>
-          <a:chOff x="0" y="0"/>
-          <a:chExt cx="0" cy="0"/>
-        </a:xfrm>
-      </p:grpSpPr>
-      <p:sp>
-        <p:nvSpPr>
-          <p:cNvPr id="2" name="Tytuł 1"/>
-          <p:cNvSpPr>
-            <a:spLocks noGrp="1"/>
-          </p:cNvSpPr>
-          <p:nvPr>
-            <p:ph type="title"/>
-          </p:nvPr>
-        </p:nvSpPr>
-        <p:spPr/>
-        <p:txBody>
-          <a:bodyPr/>
-          <a:lstStyle/>
-          <a:p>
-            <a:r>
-              <a:rPr lang="pl-PL" dirty="0" smtClean="0"/>
               <a:t>Referencje</a:t>
             </a:r>
             <a:endParaRPr lang="pl-PL" dirty="0"/>
@@ -8461,13 +9360,7 @@
               <a:rPr lang="pl-PL" sz="1600" dirty="0" smtClean="0">
                 <a:hlinkClick r:id="rId5"/>
               </a:rPr>
-              <a:t>http://</a:t>
-            </a:r>
-            <a:r>
-              <a:rPr lang="pl-PL" sz="1600" dirty="0" smtClean="0">
-                <a:hlinkClick r:id="rId5"/>
-              </a:rPr>
-              <a:t>portal.acm.org/citation.cfm?doid=1565694.1565702</a:t>
+              <a:t>http://portal.acm.org/citation.cfm?doid=1565694.1565702</a:t>
             </a:r>
             <a:endParaRPr lang="pl-PL" sz="1600" dirty="0" smtClean="0"/>
           </a:p>
@@ -8479,7 +9372,7 @@
     </p:spTree>
     <p:extLst>
       <p:ext uri="{BB962C8B-B14F-4D97-AF65-F5344CB8AC3E}">
-        <p14:creationId xmlns:p14="http://schemas.microsoft.com/office/powerpoint/2010/main" xmlns="" val="3607063138"/>
+        <p14:creationId xmlns:p14="http://schemas.microsoft.com/office/powerpoint/2010/main" val="3607063138"/>
       </p:ext>
     </p:extLst>
   </p:cSld>
@@ -8978,7 +9871,7 @@
     </p:spTree>
     <p:extLst>
       <p:ext uri="{BB962C8B-B14F-4D97-AF65-F5344CB8AC3E}">
-        <p14:creationId xmlns:p14="http://schemas.microsoft.com/office/powerpoint/2010/main" xmlns="" val="4234978235"/>
+        <p14:creationId xmlns:p14="http://schemas.microsoft.com/office/powerpoint/2010/main" val="4234978235"/>
       </p:ext>
     </p:extLst>
   </p:cSld>
@@ -9065,7 +9958,7 @@
     </p:spTree>
     <p:extLst>
       <p:ext uri="{BB962C8B-B14F-4D97-AF65-F5344CB8AC3E}">
-        <p14:creationId xmlns:p14="http://schemas.microsoft.com/office/powerpoint/2010/main" xmlns="" val="2737268927"/>
+        <p14:creationId xmlns:p14="http://schemas.microsoft.com/office/powerpoint/2010/main" val="2737268927"/>
       </p:ext>
     </p:extLst>
   </p:cSld>
@@ -9206,7 +10099,7 @@
     </p:spTree>
     <p:extLst>
       <p:ext uri="{BB962C8B-B14F-4D97-AF65-F5344CB8AC3E}">
-        <p14:creationId xmlns:p14="http://schemas.microsoft.com/office/powerpoint/2010/main" xmlns="" val="923430665"/>
+        <p14:creationId xmlns:p14="http://schemas.microsoft.com/office/powerpoint/2010/main" val="923430665"/>
       </p:ext>
     </p:extLst>
   </p:cSld>
@@ -9270,7 +10163,7 @@
           <a:blip r:embed="rId2" cstate="print">
             <a:extLst>
               <a:ext uri="{28A0092B-C50C-407E-A947-70E740481C1C}">
-                <a14:useLocalDpi xmlns:a14="http://schemas.microsoft.com/office/drawing/2010/main" xmlns="" val="0"/>
+                <a14:useLocalDpi xmlns:a14="http://schemas.microsoft.com/office/drawing/2010/main" val="0"/>
               </a:ext>
             </a:extLst>
           </a:blip>
@@ -9288,7 +10181,7 @@
     </p:spTree>
     <p:extLst>
       <p:ext uri="{BB962C8B-B14F-4D97-AF65-F5344CB8AC3E}">
-        <p14:creationId xmlns:p14="http://schemas.microsoft.com/office/powerpoint/2010/main" xmlns="" val="3043978223"/>
+        <p14:creationId xmlns:p14="http://schemas.microsoft.com/office/powerpoint/2010/main" val="3043978223"/>
       </p:ext>
     </p:extLst>
   </p:cSld>
@@ -9603,11 +10496,7 @@
             </a:r>
             <a:r>
               <a:rPr lang="pl-PL" sz="1600" dirty="0" smtClean="0"/>
-              <a:t> *</a:t>
-            </a:r>
-            <a:r>
-              <a:rPr lang="pl-PL" sz="1600" dirty="0" smtClean="0"/>
-              <a:t>a,</a:t>
+              <a:t> *a,</a:t>
             </a:r>
             <a:br>
               <a:rPr lang="pl-PL" sz="1600" dirty="0" smtClean="0"/>
@@ -9630,11 +10519,7 @@
             </a:r>
             <a:r>
               <a:rPr lang="pl-PL" sz="1600" dirty="0" smtClean="0"/>
-              <a:t> *</a:t>
-            </a:r>
-            <a:r>
-              <a:rPr lang="pl-PL" sz="1600" dirty="0" smtClean="0"/>
-              <a:t>b,</a:t>
+              <a:t> *b,</a:t>
             </a:r>
             <a:br>
               <a:rPr lang="pl-PL" sz="1600" dirty="0" smtClean="0"/>
@@ -9649,15 +10534,7 @@
             </a:r>
             <a:r>
               <a:rPr lang="pl-PL" sz="1600" dirty="0" smtClean="0"/>
-              <a:t> </a:t>
-            </a:r>
-            <a:r>
-              <a:rPr lang="pl-PL" sz="1600" dirty="0" smtClean="0"/>
-              <a:t>*c</a:t>
-            </a:r>
-            <a:r>
-              <a:rPr lang="pl-PL" sz="1600" dirty="0" smtClean="0"/>
-              <a:t>)</a:t>
+              <a:t> *c)</a:t>
             </a:r>
             <a:br>
               <a:rPr lang="pl-PL" sz="1600" dirty="0" smtClean="0"/>
@@ -9682,11 +10559,7 @@
             </a:br>
             <a:r>
               <a:rPr lang="pl-PL" sz="1600" dirty="0" smtClean="0"/>
-              <a:t>for </a:t>
-            </a:r>
-            <a:r>
-              <a:rPr lang="pl-PL" sz="1600" dirty="0" smtClean="0"/>
-              <a:t>(i=0; </a:t>
+              <a:t>for (i=0; </a:t>
             </a:r>
             <a:r>
               <a:rPr lang="pl-PL" sz="1600" dirty="0" err="1" smtClean="0"/>
@@ -9694,26 +10567,14 @@
             </a:r>
             <a:r>
               <a:rPr lang="pl-PL" sz="1600" dirty="0" smtClean="0"/>
-              <a:t>; i</a:t>
-            </a:r>
-            <a:r>
-              <a:rPr lang="pl-PL" sz="1600" dirty="0" smtClean="0"/>
-              <a:t>++)</a:t>
+              <a:t>; i++)</a:t>
             </a:r>
             <a:br>
               <a:rPr lang="pl-PL" sz="1600" dirty="0" smtClean="0"/>
             </a:br>
             <a:r>
               <a:rPr lang="pl-PL" sz="1600" dirty="0" smtClean="0"/>
-              <a:t>	c[i</a:t>
-            </a:r>
-            <a:r>
-              <a:rPr lang="pl-PL" sz="1600" dirty="0" smtClean="0"/>
-              <a:t>] = a[i] * b[i</a:t>
-            </a:r>
-            <a:r>
-              <a:rPr lang="pl-PL" sz="1600" dirty="0" smtClean="0"/>
-              <a:t>];</a:t>
+              <a:t>	c[i] = a[i] * b[i];</a:t>
             </a:r>
             <a:br>
               <a:rPr lang="pl-PL" sz="1600" dirty="0" smtClean="0"/>
@@ -9887,11 +10748,7 @@
           <a:p>
             <a:r>
               <a:rPr lang="pl-PL" sz="1600" dirty="0" smtClean="0"/>
-              <a:t> </a:t>
-            </a:r>
-            <a:r>
-              <a:rPr lang="pl-PL" sz="1600" dirty="0" smtClean="0"/>
-              <a:t>        </a:t>
+              <a:t>         </a:t>
             </a:r>
             <a:r>
               <a:rPr lang="pl-PL" sz="1600" dirty="0" err="1" smtClean="0"/>
@@ -9899,11 +10756,7 @@
             </a:r>
             <a:r>
               <a:rPr lang="pl-PL" sz="1600" dirty="0" smtClean="0"/>
-              <a:t> </a:t>
-            </a:r>
-            <a:r>
-              <a:rPr lang="pl-PL" sz="1600" dirty="0" smtClean="0"/>
-              <a:t>id = </a:t>
+              <a:t> id = </a:t>
             </a:r>
             <a:r>
               <a:rPr lang="pl-PL" sz="1600" b="1" dirty="0" err="1" smtClean="0"/>
@@ -9917,11 +10770,7 @@
           <a:p>
             <a:r>
               <a:rPr lang="pl-PL" sz="1600" dirty="0" smtClean="0"/>
-              <a:t>         c[id</a:t>
-            </a:r>
-            <a:r>
-              <a:rPr lang="pl-PL" sz="1600" dirty="0" smtClean="0"/>
-              <a:t>] = a[id] * b[id];</a:t>
+              <a:t>         c[id] = a[id] * b[id];</a:t>
             </a:r>
           </a:p>
           <a:p>

</xml_diff>

<commit_message>
Providing the injectable set, fixes in presentations
</commit_message>
<xml_diff>
--- a/presentation/GPGPU_in_data_minig.pptx
+++ b/presentation/GPGPU_in_data_minig.pptx
@@ -314,11 +314,11 @@
           <c:showBubbleSize val="0"/>
         </c:dLbls>
         <c:gapWidth val="150"/>
-        <c:axId val="42383616"/>
-        <c:axId val="44606208"/>
+        <c:axId val="77111296"/>
+        <c:axId val="77114752"/>
       </c:barChart>
       <c:catAx>
-        <c:axId val="42383616"/>
+        <c:axId val="77111296"/>
         <c:scaling>
           <c:orientation val="minMax"/>
         </c:scaling>
@@ -351,7 +351,7 @@
         <c:majorTickMark val="out"/>
         <c:minorTickMark val="none"/>
         <c:tickLblPos val="nextTo"/>
-        <c:crossAx val="44606208"/>
+        <c:crossAx val="77114752"/>
         <c:crosses val="autoZero"/>
         <c:auto val="1"/>
         <c:lblAlgn val="ctr"/>
@@ -359,7 +359,7 @@
         <c:noMultiLvlLbl val="0"/>
       </c:catAx>
       <c:valAx>
-        <c:axId val="44606208"/>
+        <c:axId val="77114752"/>
         <c:scaling>
           <c:orientation val="minMax"/>
         </c:scaling>
@@ -388,7 +388,7 @@
         <c:majorTickMark val="out"/>
         <c:minorTickMark val="none"/>
         <c:tickLblPos val="nextTo"/>
-        <c:crossAx val="42383616"/>
+        <c:crossAx val="77111296"/>
         <c:crosses val="autoZero"/>
         <c:crossBetween val="between"/>
       </c:valAx>
@@ -6163,6 +6163,13 @@
   <p:clrMapOvr>
     <a:masterClrMapping/>
   </p:clrMapOvr>
+  <p:timing>
+    <p:tnLst>
+      <p:par>
+        <p:cTn id="1" dur="indefinite" restart="never" nodeType="tmRoot"/>
+      </p:par>
+    </p:tnLst>
+  </p:timing>
 </p:sld>
 </file>
 
@@ -6888,6 +6895,13 @@
   <p:clrMapOvr>
     <a:masterClrMapping/>
   </p:clrMapOvr>
+  <p:timing>
+    <p:tnLst>
+      <p:par>
+        <p:cTn id="1" dur="indefinite" restart="never" nodeType="tmRoot"/>
+      </p:par>
+    </p:tnLst>
+  </p:timing>
 </p:sld>
 </file>
 
@@ -6974,6 +6988,13 @@
   <p:clrMapOvr>
     <a:masterClrMapping/>
   </p:clrMapOvr>
+  <p:timing>
+    <p:tnLst>
+      <p:par>
+        <p:cTn id="1" dur="indefinite" restart="never" nodeType="tmRoot"/>
+      </p:par>
+    </p:tnLst>
+  </p:timing>
 </p:sld>
 </file>
 
@@ -7060,6 +7081,13 @@
   <p:clrMapOvr>
     <a:masterClrMapping/>
   </p:clrMapOvr>
+  <p:timing>
+    <p:tnLst>
+      <p:par>
+        <p:cTn id="1" dur="indefinite" restart="never" nodeType="tmRoot"/>
+      </p:par>
+    </p:tnLst>
+  </p:timing>
 </p:sld>
 </file>
 
@@ -7148,6 +7176,13 @@
   <p:clrMapOvr>
     <a:masterClrMapping/>
   </p:clrMapOvr>
+  <p:timing>
+    <p:tnLst>
+      <p:par>
+        <p:cTn id="1" dur="indefinite" restart="never" nodeType="tmRoot"/>
+      </p:par>
+    </p:tnLst>
+  </p:timing>
 </p:sld>
 </file>
 
@@ -7238,6 +7273,13 @@
   <p:clrMapOvr>
     <a:masterClrMapping/>
   </p:clrMapOvr>
+  <p:timing>
+    <p:tnLst>
+      <p:par>
+        <p:cTn id="1" dur="indefinite" restart="never" nodeType="tmRoot"/>
+      </p:par>
+    </p:tnLst>
+  </p:timing>
 </p:sld>
 </file>
 
@@ -7354,6 +7396,13 @@
   <p:clrMapOvr>
     <a:masterClrMapping/>
   </p:clrMapOvr>
+  <p:timing>
+    <p:tnLst>
+      <p:par>
+        <p:cTn id="1" dur="indefinite" restart="never" nodeType="tmRoot"/>
+      </p:par>
+    </p:tnLst>
+  </p:timing>
 </p:sld>
 </file>
 
@@ -7438,6 +7487,13 @@
   <p:clrMapOvr>
     <a:masterClrMapping/>
   </p:clrMapOvr>
+  <p:timing>
+    <p:tnLst>
+      <p:par>
+        <p:cTn id="1" dur="indefinite" restart="never" nodeType="tmRoot"/>
+      </p:par>
+    </p:tnLst>
+  </p:timing>
 </p:sld>
 </file>
 
@@ -7477,7 +7533,6 @@
               <a:rPr lang="pl-PL" dirty="0"/>
               <a:t>Bitmapa transakcji</a:t>
             </a:r>
-            <a:endParaRPr lang="pl-PL" dirty="0"/>
           </a:p>
         </p:txBody>
       </p:sp>
@@ -7529,6 +7584,13 @@
   <p:clrMapOvr>
     <a:masterClrMapping/>
   </p:clrMapOvr>
+  <p:timing>
+    <p:tnLst>
+      <p:par>
+        <p:cTn id="1" dur="indefinite" restart="never" nodeType="tmRoot"/>
+      </p:par>
+    </p:tnLst>
+  </p:timing>
 </p:sld>
 </file>
 
@@ -7584,14 +7646,14 @@
             <p:ph idx="1"/>
             <p:extLst>
               <p:ext uri="{D42A27DB-BD31-4B8C-83A1-F6EECF244321}">
-                <p14:modId xmlns:p14="http://schemas.microsoft.com/office/powerpoint/2010/main" val="2042678235"/>
+                <p14:modId xmlns:p14="http://schemas.microsoft.com/office/powerpoint/2010/main" val="1474264554"/>
               </p:ext>
             </p:extLst>
           </p:nvPr>
         </p:nvGraphicFramePr>
         <p:xfrm>
           <a:off x="2123728" y="2420888"/>
-          <a:ext cx="6248396" cy="1854200"/>
+          <a:ext cx="6696744" cy="1854200"/>
         </p:xfrm>
         <a:graphic>
           <a:graphicData uri="http://schemas.openxmlformats.org/drawingml/2006/table">
@@ -7600,17 +7662,18 @@
                 <a:tableStyleId>{5C22544A-7EE6-4342-B048-85BDC9FD1C3A}</a:tableStyleId>
               </a:tblPr>
               <a:tblGrid>
-                <a:gridCol w="568036"/>
-                <a:gridCol w="568036"/>
-                <a:gridCol w="568036"/>
-                <a:gridCol w="568036"/>
-                <a:gridCol w="568036"/>
-                <a:gridCol w="568036"/>
-                <a:gridCol w="568036"/>
-                <a:gridCol w="568036"/>
-                <a:gridCol w="568036"/>
-                <a:gridCol w="568036"/>
-                <a:gridCol w="568036"/>
+                <a:gridCol w="558062"/>
+                <a:gridCol w="558062"/>
+                <a:gridCol w="558062"/>
+                <a:gridCol w="558062"/>
+                <a:gridCol w="558062"/>
+                <a:gridCol w="558062"/>
+                <a:gridCol w="558062"/>
+                <a:gridCol w="558062"/>
+                <a:gridCol w="558062"/>
+                <a:gridCol w="558062"/>
+                <a:gridCol w="558062"/>
+                <a:gridCol w="558062"/>
               </a:tblGrid>
               <a:tr h="370840">
                 <a:tc>
@@ -7829,6 +7892,26 @@
                     </a:solidFill>
                   </a:tcPr>
                 </a:tc>
+                <a:tc>
+                  <a:txBody>
+                    <a:bodyPr/>
+                    <a:lstStyle/>
+                    <a:p>
+                      <a:r>
+                        <a:rPr lang="pl-PL" dirty="0" smtClean="0"/>
+                        <a:t>…</a:t>
+                      </a:r>
+                      <a:endParaRPr lang="pl-PL" dirty="0"/>
+                    </a:p>
+                  </a:txBody>
+                  <a:tcPr>
+                    <a:solidFill>
+                      <a:schemeClr val="accent4">
+                        <a:lumMod val="50000"/>
+                      </a:schemeClr>
+                    </a:solidFill>
+                  </a:tcPr>
+                </a:tc>
               </a:tr>
               <a:tr h="370840">
                 <a:tc>
@@ -8029,6 +8112,24 @@
                     </a:solidFill>
                   </a:tcPr>
                 </a:tc>
+                <a:tc>
+                  <a:txBody>
+                    <a:bodyPr/>
+                    <a:lstStyle/>
+                    <a:p>
+                      <a:r>
+                        <a:rPr lang="pl-PL" dirty="0" smtClean="0"/>
+                        <a:t>…</a:t>
+                      </a:r>
+                      <a:endParaRPr lang="pl-PL" dirty="0"/>
+                    </a:p>
+                  </a:txBody>
+                  <a:tcPr>
+                    <a:solidFill>
+                      <a:schemeClr val="accent1"/>
+                    </a:solidFill>
+                  </a:tcPr>
+                </a:tc>
               </a:tr>
               <a:tr h="370840">
                 <a:tc>
@@ -8187,6 +8288,20 @@
                       <a:r>
                         <a:rPr lang="pl-PL" dirty="0" smtClean="0"/>
                         <a:t>0</a:t>
+                      </a:r>
+                      <a:endParaRPr lang="pl-PL" dirty="0"/>
+                    </a:p>
+                  </a:txBody>
+                  <a:tcPr/>
+                </a:tc>
+                <a:tc>
+                  <a:txBody>
+                    <a:bodyPr/>
+                    <a:lstStyle/>
+                    <a:p>
+                      <a:r>
+                        <a:rPr lang="pl-PL" dirty="0" smtClean="0"/>
+                        <a:t>…</a:t>
                       </a:r>
                       <a:endParaRPr lang="pl-PL" dirty="0"/>
                     </a:p>
@@ -8357,6 +8472,20 @@
                   </a:txBody>
                   <a:tcPr/>
                 </a:tc>
+                <a:tc>
+                  <a:txBody>
+                    <a:bodyPr/>
+                    <a:lstStyle/>
+                    <a:p>
+                      <a:r>
+                        <a:rPr lang="pl-PL" dirty="0" smtClean="0"/>
+                        <a:t>…</a:t>
+                      </a:r>
+                      <a:endParaRPr lang="pl-PL" dirty="0"/>
+                    </a:p>
+                  </a:txBody>
+                  <a:tcPr/>
+                </a:tc>
               </a:tr>
               <a:tr h="370840">
                 <a:tc>
@@ -8521,6 +8650,20 @@
                   </a:txBody>
                   <a:tcPr/>
                 </a:tc>
+                <a:tc>
+                  <a:txBody>
+                    <a:bodyPr/>
+                    <a:lstStyle/>
+                    <a:p>
+                      <a:r>
+                        <a:rPr lang="pl-PL" dirty="0" smtClean="0"/>
+                        <a:t>….</a:t>
+                      </a:r>
+                      <a:endParaRPr lang="pl-PL" dirty="0"/>
+                    </a:p>
+                  </a:txBody>
+                  <a:tcPr/>
+                </a:tc>
               </a:tr>
             </a:tbl>
           </a:graphicData>
@@ -8535,7 +8678,7 @@
         <p:spPr>
           <a:xfrm>
             <a:off x="2195736" y="4797152"/>
-            <a:ext cx="6192688" cy="369332"/>
+            <a:ext cx="6624736" cy="369332"/>
           </a:xfrm>
           <a:prstGeom prst="rect">
             <a:avLst/>
@@ -8584,8 +8727,8 @@
         </p:nvSpPr>
         <p:spPr>
           <a:xfrm>
-            <a:off x="2197667" y="5661248"/>
-            <a:ext cx="6192688" cy="369332"/>
+            <a:off x="2197666" y="5661248"/>
+            <a:ext cx="6622805" cy="369332"/>
           </a:xfrm>
           <a:prstGeom prst="rect">
             <a:avLst/>
@@ -8640,6 +8783,13 @@
   <p:clrMapOvr>
     <a:masterClrMapping/>
   </p:clrMapOvr>
+  <p:timing>
+    <p:tnLst>
+      <p:par>
+        <p:cTn id="1" dur="indefinite" restart="never" nodeType="tmRoot"/>
+      </p:par>
+    </p:tnLst>
+  </p:timing>
 </p:sld>
 </file>
 
@@ -8738,6 +8888,13 @@
   <p:clrMapOvr>
     <a:masterClrMapping/>
   </p:clrMapOvr>
+  <p:timing>
+    <p:tnLst>
+      <p:par>
+        <p:cTn id="1" dur="indefinite" restart="never" nodeType="tmRoot"/>
+      </p:par>
+    </p:tnLst>
+  </p:timing>
 </p:sld>
 </file>
 
@@ -8850,7 +9007,6 @@
               <a:rPr lang="en-US" dirty="0" smtClean="0"/>
               <a:t>Unified Cores</a:t>
             </a:r>
-            <a:endParaRPr lang="en-US" dirty="0" smtClean="0"/>
           </a:p>
           <a:p>
             <a:pPr marL="0" indent="0">
@@ -8858,11 +9014,7 @@
             </a:pPr>
             <a:r>
               <a:rPr lang="pl-PL" i="1" dirty="0" smtClean="0"/>
-              <a:t>Ciekawostka </a:t>
-            </a:r>
-            <a:r>
-              <a:rPr lang="pl-PL" i="1" dirty="0" smtClean="0"/>
-              <a:t>operacje bitowe (|, &amp;)pojawiły się dopiero w </a:t>
+              <a:t>Ciekawostka operacje bitowe (|, &amp;)pojawiły się dopiero w </a:t>
             </a:r>
             <a:r>
               <a:rPr lang="pl-PL" i="1" dirty="0" err="1" smtClean="0"/>
@@ -8896,6 +9048,13 @@
   <p:clrMapOvr>
     <a:masterClrMapping/>
   </p:clrMapOvr>
+  <p:timing>
+    <p:tnLst>
+      <p:par>
+        <p:cTn id="1" dur="indefinite" restart="never" nodeType="tmRoot"/>
+      </p:par>
+    </p:tnLst>
+  </p:timing>
 </p:sld>
 </file>
 
@@ -9020,6 +9179,13 @@
   <p:clrMapOvr>
     <a:masterClrMapping/>
   </p:clrMapOvr>
+  <p:timing>
+    <p:tnLst>
+      <p:par>
+        <p:cTn id="1" dur="indefinite" restart="never" nodeType="tmRoot"/>
+      </p:par>
+    </p:tnLst>
+  </p:timing>
 </p:sld>
 </file>
 
@@ -9233,6 +9399,13 @@
   <p:clrMapOvr>
     <a:masterClrMapping/>
   </p:clrMapOvr>
+  <p:timing>
+    <p:tnLst>
+      <p:par>
+        <p:cTn id="1" dur="indefinite" restart="never" nodeType="tmRoot"/>
+      </p:par>
+    </p:tnLst>
+  </p:timing>
 </p:sld>
 </file>
 
@@ -9379,6 +9552,13 @@
   <p:clrMapOvr>
     <a:masterClrMapping/>
   </p:clrMapOvr>
+  <p:timing>
+    <p:tnLst>
+      <p:par>
+        <p:cTn id="1" dur="indefinite" restart="never" nodeType="tmRoot"/>
+      </p:par>
+    </p:tnLst>
+  </p:timing>
 </p:sld>
 </file>
 
@@ -9878,6 +10058,13 @@
   <p:clrMapOvr>
     <a:masterClrMapping/>
   </p:clrMapOvr>
+  <p:timing>
+    <p:tnLst>
+      <p:par>
+        <p:cTn id="1" dur="indefinite" restart="never" nodeType="tmRoot"/>
+      </p:par>
+    </p:tnLst>
+  </p:timing>
 </p:sld>
 </file>
 
@@ -9965,6 +10152,13 @@
   <p:clrMapOvr>
     <a:masterClrMapping/>
   </p:clrMapOvr>
+  <p:timing>
+    <p:tnLst>
+      <p:par>
+        <p:cTn id="1" dur="indefinite" restart="never" nodeType="tmRoot"/>
+      </p:par>
+    </p:tnLst>
+  </p:timing>
 </p:sld>
 </file>
 
@@ -10106,6 +10300,13 @@
   <p:clrMapOvr>
     <a:masterClrMapping/>
   </p:clrMapOvr>
+  <p:timing>
+    <p:tnLst>
+      <p:par>
+        <p:cTn id="1" dur="indefinite" restart="never" nodeType="tmRoot"/>
+      </p:par>
+    </p:tnLst>
+  </p:timing>
 </p:sld>
 </file>
 
@@ -10188,6 +10389,13 @@
   <p:clrMapOvr>
     <a:masterClrMapping/>
   </p:clrMapOvr>
+  <p:timing>
+    <p:tnLst>
+      <p:par>
+        <p:cTn id="1" dur="indefinite" restart="never" nodeType="tmRoot"/>
+      </p:par>
+    </p:tnLst>
+  </p:timing>
 </p:sld>
 </file>
 
@@ -10270,6 +10478,13 @@
   <p:clrMapOvr>
     <a:masterClrMapping/>
   </p:clrMapOvr>
+  <p:timing>
+    <p:tnLst>
+      <p:par>
+        <p:cTn id="1" dur="indefinite" restart="never" nodeType="tmRoot"/>
+      </p:par>
+    </p:tnLst>
+  </p:timing>
 </p:sld>
 </file>
 
@@ -10352,6 +10567,13 @@
   <p:clrMapOvr>
     <a:masterClrMapping/>
   </p:clrMapOvr>
+  <p:timing>
+    <p:tnLst>
+      <p:par>
+        <p:cTn id="1" dur="indefinite" restart="never" nodeType="tmRoot"/>
+      </p:par>
+    </p:tnLst>
+  </p:timing>
 </p:sld>
 </file>
 
@@ -10840,6 +11062,13 @@
   <p:clrMapOvr>
     <a:masterClrMapping/>
   </p:clrMapOvr>
+  <p:timing>
+    <p:tnLst>
+      <p:par>
+        <p:cTn id="1" dur="indefinite" restart="never" nodeType="tmRoot"/>
+      </p:par>
+    </p:tnLst>
+  </p:timing>
 </p:sld>
 </file>
 

</xml_diff>

<commit_message>
Adding code with animations for presentation
</commit_message>
<xml_diff>
--- a/presentation/GPGPU_in_data_minig.pptx
+++ b/presentation/GPGPU_in_data_minig.pptx
@@ -314,11 +314,11 @@
           <c:showBubbleSize val="0"/>
         </c:dLbls>
         <c:gapWidth val="150"/>
-        <c:axId val="77111296"/>
-        <c:axId val="77114752"/>
+        <c:axId val="75501952"/>
+        <c:axId val="75503872"/>
       </c:barChart>
       <c:catAx>
-        <c:axId val="77111296"/>
+        <c:axId val="75501952"/>
         <c:scaling>
           <c:orientation val="minMax"/>
         </c:scaling>
@@ -351,7 +351,7 @@
         <c:majorTickMark val="out"/>
         <c:minorTickMark val="none"/>
         <c:tickLblPos val="nextTo"/>
-        <c:crossAx val="77114752"/>
+        <c:crossAx val="75503872"/>
         <c:crosses val="autoZero"/>
         <c:auto val="1"/>
         <c:lblAlgn val="ctr"/>
@@ -359,7 +359,7 @@
         <c:noMultiLvlLbl val="0"/>
       </c:catAx>
       <c:valAx>
-        <c:axId val="77114752"/>
+        <c:axId val="75503872"/>
         <c:scaling>
           <c:orientation val="minMax"/>
         </c:scaling>
@@ -388,7 +388,7 @@
         <c:majorTickMark val="out"/>
         <c:minorTickMark val="none"/>
         <c:tickLblPos val="nextTo"/>
-        <c:crossAx val="77111296"/>
+        <c:crossAx val="75501952"/>
         <c:crosses val="autoZero"/>
         <c:crossBetween val="between"/>
       </c:valAx>
@@ -7166,6 +7166,256 @@
           </a:xfrm>
         </p:spPr>
       </p:pic>
+      <p:grpSp>
+        <p:nvGrpSpPr>
+          <p:cNvPr id="7" name="Grupa 6"/>
+          <p:cNvGrpSpPr/>
+          <p:nvPr/>
+        </p:nvGrpSpPr>
+        <p:grpSpPr>
+          <a:xfrm>
+            <a:off x="2411760" y="1844824"/>
+            <a:ext cx="6048672" cy="2088232"/>
+            <a:chOff x="2411760" y="1844824"/>
+            <a:chExt cx="6048672" cy="2088232"/>
+          </a:xfrm>
+        </p:grpSpPr>
+        <p:sp>
+          <p:nvSpPr>
+            <p:cNvPr id="3" name="Objaśnienie prostokątne 2"/>
+            <p:cNvSpPr/>
+            <p:nvPr/>
+          </p:nvSpPr>
+          <p:spPr>
+            <a:xfrm>
+              <a:off x="2411760" y="1844824"/>
+              <a:ext cx="6048672" cy="2088232"/>
+            </a:xfrm>
+            <a:prstGeom prst="wedgeRectCallout">
+              <a:avLst>
+                <a:gd name="adj1" fmla="val -36662"/>
+                <a:gd name="adj2" fmla="val 20739"/>
+              </a:avLst>
+            </a:prstGeom>
+            <a:effectLst>
+              <a:outerShdw blurRad="50800" dist="38100" dir="2700000" algn="tl" rotWithShape="0">
+                <a:prstClr val="black">
+                  <a:alpha val="40000"/>
+                </a:prstClr>
+              </a:outerShdw>
+            </a:effectLst>
+          </p:spPr>
+          <p:style>
+            <a:lnRef idx="2">
+              <a:schemeClr val="accent5">
+                <a:shade val="50000"/>
+              </a:schemeClr>
+            </a:lnRef>
+            <a:fillRef idx="1">
+              <a:schemeClr val="accent5"/>
+            </a:fillRef>
+            <a:effectRef idx="0">
+              <a:schemeClr val="accent5"/>
+            </a:effectRef>
+            <a:fontRef idx="minor">
+              <a:schemeClr val="lt1"/>
+            </a:fontRef>
+          </p:style>
+          <p:txBody>
+            <a:bodyPr rtlCol="0" anchor="ctr"/>
+            <a:lstStyle/>
+            <a:p>
+              <a:pPr algn="ctr"/>
+              <a:endParaRPr lang="pl-PL"/>
+            </a:p>
+          </p:txBody>
+        </p:sp>
+        <p:sp>
+          <p:nvSpPr>
+            <p:cNvPr id="5" name="pole tekstowe 4"/>
+            <p:cNvSpPr txBox="1"/>
+            <p:nvPr/>
+          </p:nvSpPr>
+          <p:spPr>
+            <a:xfrm>
+              <a:off x="2555776" y="1988840"/>
+              <a:ext cx="5832648" cy="1200329"/>
+            </a:xfrm>
+            <a:prstGeom prst="rect">
+              <a:avLst/>
+            </a:prstGeom>
+            <a:noFill/>
+          </p:spPr>
+          <p:txBody>
+            <a:bodyPr wrap="square" rtlCol="0">
+              <a:spAutoFit/>
+            </a:bodyPr>
+            <a:lstStyle/>
+            <a:p>
+              <a:r>
+                <a:rPr lang="pl-PL" b="1" dirty="0" smtClean="0"/>
+                <a:t>For </a:t>
+              </a:r>
+              <a:r>
+                <a:rPr lang="pl-PL" b="1" dirty="0" err="1" smtClean="0"/>
+                <a:t>each</a:t>
+              </a:r>
+              <a:r>
+                <a:rPr lang="pl-PL" b="1" dirty="0" smtClean="0"/>
+                <a:t> </a:t>
+              </a:r>
+              <a:r>
+                <a:rPr lang="pl-PL" dirty="0" err="1" smtClean="0"/>
+                <a:t>candidate</a:t>
+              </a:r>
+              <a:r>
+                <a:rPr lang="pl-PL" dirty="0" smtClean="0"/>
+                <a:t> </a:t>
+              </a:r>
+              <a:r>
+                <a:rPr lang="pl-PL" b="1" dirty="0" smtClean="0"/>
+                <a:t>in</a:t>
+              </a:r>
+              <a:r>
+                <a:rPr lang="pl-PL" dirty="0" smtClean="0"/>
+                <a:t> </a:t>
+              </a:r>
+              <a:r>
+                <a:rPr lang="pl-PL" dirty="0" err="1" smtClean="0"/>
+                <a:t>candidateSet</a:t>
+              </a:r>
+              <a:r>
+                <a:rPr lang="pl-PL" dirty="0" smtClean="0"/>
+                <a:t> </a:t>
+              </a:r>
+              <a:r>
+                <a:rPr lang="pl-PL" b="1" dirty="0" smtClean="0"/>
+                <a:t>:</a:t>
+              </a:r>
+            </a:p>
+            <a:p>
+              <a:r>
+                <a:rPr lang="pl-PL" dirty="0"/>
+                <a:t>	</a:t>
+              </a:r>
+              <a:r>
+                <a:rPr lang="pl-PL" b="1" dirty="0"/>
+                <a:t>F</a:t>
+              </a:r>
+              <a:r>
+                <a:rPr lang="pl-PL" b="1" dirty="0" smtClean="0"/>
+                <a:t>or </a:t>
+              </a:r>
+              <a:r>
+                <a:rPr lang="pl-PL" b="1" dirty="0" err="1" smtClean="0"/>
+                <a:t>each</a:t>
+              </a:r>
+              <a:r>
+                <a:rPr lang="pl-PL" dirty="0" smtClean="0"/>
+                <a:t> </a:t>
+              </a:r>
+              <a:r>
+                <a:rPr lang="pl-PL" dirty="0" err="1" smtClean="0"/>
+                <a:t>transaction</a:t>
+              </a:r>
+              <a:r>
+                <a:rPr lang="pl-PL" dirty="0" smtClean="0"/>
+                <a:t> </a:t>
+              </a:r>
+              <a:r>
+                <a:rPr lang="pl-PL" b="1" dirty="0" smtClean="0"/>
+                <a:t>in</a:t>
+              </a:r>
+              <a:r>
+                <a:rPr lang="pl-PL" dirty="0" smtClean="0"/>
+                <a:t> </a:t>
+              </a:r>
+              <a:r>
+                <a:rPr lang="pl-PL" dirty="0" err="1" smtClean="0"/>
+                <a:t>transactionSet</a:t>
+              </a:r>
+              <a:r>
+                <a:rPr lang="pl-PL" dirty="0" smtClean="0"/>
+                <a:t> </a:t>
+              </a:r>
+              <a:r>
+                <a:rPr lang="pl-PL" b="1" dirty="0" smtClean="0"/>
+                <a:t>:</a:t>
+              </a:r>
+            </a:p>
+            <a:p>
+              <a:r>
+                <a:rPr lang="pl-PL" dirty="0"/>
+                <a:t>	</a:t>
+              </a:r>
+              <a:r>
+                <a:rPr lang="pl-PL" dirty="0" smtClean="0"/>
+                <a:t>	</a:t>
+              </a:r>
+              <a:r>
+                <a:rPr lang="pl-PL" b="1" dirty="0" err="1" smtClean="0"/>
+                <a:t>if</a:t>
+              </a:r>
+              <a:r>
+                <a:rPr lang="pl-PL" b="1" dirty="0" smtClean="0"/>
+                <a:t> </a:t>
+              </a:r>
+              <a:r>
+                <a:rPr lang="pl-PL" dirty="0" smtClean="0"/>
+                <a:t>(</a:t>
+              </a:r>
+              <a:r>
+                <a:rPr lang="pl-PL" dirty="0" err="1" smtClean="0"/>
+                <a:t>candidate</a:t>
+              </a:r>
+              <a:r>
+                <a:rPr lang="pl-PL" dirty="0"/>
+                <a:t> </a:t>
+              </a:r>
+              <a:r>
+                <a:rPr lang="pl-PL" dirty="0" err="1" smtClean="0"/>
+                <a:t>complies</a:t>
+              </a:r>
+              <a:r>
+                <a:rPr lang="pl-PL" dirty="0" smtClean="0"/>
+                <a:t> with </a:t>
+              </a:r>
+              <a:r>
+                <a:rPr lang="pl-PL" dirty="0" err="1" smtClean="0"/>
+                <a:t>transaction</a:t>
+              </a:r>
+              <a:r>
+                <a:rPr lang="pl-PL" dirty="0" smtClean="0"/>
+                <a:t>)</a:t>
+              </a:r>
+              <a:br>
+                <a:rPr lang="pl-PL" dirty="0" smtClean="0"/>
+              </a:br>
+              <a:r>
+                <a:rPr lang="pl-PL" dirty="0" smtClean="0"/>
+                <a:t>			</a:t>
+              </a:r>
+              <a:r>
+                <a:rPr lang="pl-PL" dirty="0" err="1" smtClean="0"/>
+                <a:t>support</a:t>
+              </a:r>
+              <a:r>
+                <a:rPr lang="pl-PL" dirty="0" smtClean="0"/>
+                <a:t>[</a:t>
+              </a:r>
+              <a:r>
+                <a:rPr lang="pl-PL" dirty="0" err="1" smtClean="0"/>
+                <a:t>candidate</a:t>
+              </a:r>
+              <a:r>
+                <a:rPr lang="pl-PL" dirty="0" smtClean="0"/>
+                <a:t>]++;</a:t>
+              </a:r>
+              <a:endParaRPr lang="pl-PL" dirty="0"/>
+            </a:p>
+          </p:txBody>
+        </p:sp>
+      </p:grpSp>
     </p:spTree>
     <p:extLst>
       <p:ext uri="{BB962C8B-B14F-4D97-AF65-F5344CB8AC3E}">
@@ -7179,7 +7429,83 @@
   <p:timing>
     <p:tnLst>
       <p:par>
-        <p:cTn id="1" dur="indefinite" restart="never" nodeType="tmRoot"/>
+        <p:cTn id="1" dur="indefinite" restart="never" nodeType="tmRoot">
+          <p:childTnLst>
+            <p:seq concurrent="1" nextAc="seek">
+              <p:cTn id="2" dur="indefinite" nodeType="mainSeq">
+                <p:childTnLst>
+                  <p:par>
+                    <p:cTn id="3" fill="hold">
+                      <p:stCondLst>
+                        <p:cond delay="indefinite"/>
+                      </p:stCondLst>
+                      <p:childTnLst>
+                        <p:par>
+                          <p:cTn id="4" fill="hold">
+                            <p:stCondLst>
+                              <p:cond delay="0"/>
+                            </p:stCondLst>
+                            <p:childTnLst>
+                              <p:par>
+                                <p:cTn id="5" presetID="10" presetClass="entr" presetSubtype="0" fill="hold" nodeType="clickEffect">
+                                  <p:stCondLst>
+                                    <p:cond delay="0"/>
+                                  </p:stCondLst>
+                                  <p:childTnLst>
+                                    <p:set>
+                                      <p:cBhvr>
+                                        <p:cTn id="6" dur="1" fill="hold">
+                                          <p:stCondLst>
+                                            <p:cond delay="0"/>
+                                          </p:stCondLst>
+                                        </p:cTn>
+                                        <p:tgtEl>
+                                          <p:spTgt spid="7"/>
+                                        </p:tgtEl>
+                                        <p:attrNameLst>
+                                          <p:attrName>style.visibility</p:attrName>
+                                        </p:attrNameLst>
+                                      </p:cBhvr>
+                                      <p:to>
+                                        <p:strVal val="visible"/>
+                                      </p:to>
+                                    </p:set>
+                                    <p:animEffect transition="in" filter="fade">
+                                      <p:cBhvr>
+                                        <p:cTn id="7" dur="500"/>
+                                        <p:tgtEl>
+                                          <p:spTgt spid="7"/>
+                                        </p:tgtEl>
+                                      </p:cBhvr>
+                                    </p:animEffect>
+                                  </p:childTnLst>
+                                </p:cTn>
+                              </p:par>
+                            </p:childTnLst>
+                          </p:cTn>
+                        </p:par>
+                      </p:childTnLst>
+                    </p:cTn>
+                  </p:par>
+                </p:childTnLst>
+              </p:cTn>
+              <p:prevCondLst>
+                <p:cond evt="onPrev" delay="0">
+                  <p:tgtEl>
+                    <p:sldTgt/>
+                  </p:tgtEl>
+                </p:cond>
+              </p:prevCondLst>
+              <p:nextCondLst>
+                <p:cond evt="onNext" delay="0">
+                  <p:tgtEl>
+                    <p:sldTgt/>
+                  </p:tgtEl>
+                </p:cond>
+              </p:nextCondLst>
+            </p:seq>
+          </p:childTnLst>
+        </p:cTn>
       </p:par>
     </p:tnLst>
   </p:timing>
@@ -7263,6 +7589,491 @@
           </a:xfrm>
         </p:spPr>
       </p:pic>
+      <p:grpSp>
+        <p:nvGrpSpPr>
+          <p:cNvPr id="10" name="Grupa 9"/>
+          <p:cNvGrpSpPr/>
+          <p:nvPr/>
+        </p:nvGrpSpPr>
+        <p:grpSpPr>
+          <a:xfrm>
+            <a:off x="2411760" y="1844824"/>
+            <a:ext cx="6048672" cy="2088232"/>
+            <a:chOff x="2411760" y="1844824"/>
+            <a:chExt cx="6048672" cy="2088232"/>
+          </a:xfrm>
+        </p:grpSpPr>
+        <p:sp>
+          <p:nvSpPr>
+            <p:cNvPr id="7" name="Objaśnienie prostokątne 6"/>
+            <p:cNvSpPr/>
+            <p:nvPr/>
+          </p:nvSpPr>
+          <p:spPr>
+            <a:xfrm>
+              <a:off x="2411760" y="1844824"/>
+              <a:ext cx="6048672" cy="2088232"/>
+            </a:xfrm>
+            <a:prstGeom prst="wedgeRectCallout">
+              <a:avLst>
+                <a:gd name="adj1" fmla="val -36662"/>
+                <a:gd name="adj2" fmla="val 20739"/>
+              </a:avLst>
+            </a:prstGeom>
+            <a:effectLst>
+              <a:outerShdw blurRad="50800" dist="38100" dir="2700000" algn="tl" rotWithShape="0">
+                <a:prstClr val="black">
+                  <a:alpha val="40000"/>
+                </a:prstClr>
+              </a:outerShdw>
+            </a:effectLst>
+          </p:spPr>
+          <p:style>
+            <a:lnRef idx="2">
+              <a:schemeClr val="accent5">
+                <a:shade val="50000"/>
+              </a:schemeClr>
+            </a:lnRef>
+            <a:fillRef idx="1">
+              <a:schemeClr val="accent5"/>
+            </a:fillRef>
+            <a:effectRef idx="0">
+              <a:schemeClr val="accent5"/>
+            </a:effectRef>
+            <a:fontRef idx="minor">
+              <a:schemeClr val="lt1"/>
+            </a:fontRef>
+          </p:style>
+          <p:txBody>
+            <a:bodyPr rtlCol="0" anchor="ctr"/>
+            <a:lstStyle/>
+            <a:p>
+              <a:pPr algn="ctr"/>
+              <a:endParaRPr lang="pl-PL"/>
+            </a:p>
+          </p:txBody>
+        </p:sp>
+        <p:sp>
+          <p:nvSpPr>
+            <p:cNvPr id="8" name="pole tekstowe 7"/>
+            <p:cNvSpPr txBox="1"/>
+            <p:nvPr/>
+          </p:nvSpPr>
+          <p:spPr>
+            <a:xfrm>
+              <a:off x="2555776" y="1988840"/>
+              <a:ext cx="5832648" cy="1754326"/>
+            </a:xfrm>
+            <a:prstGeom prst="rect">
+              <a:avLst/>
+            </a:prstGeom>
+            <a:noFill/>
+          </p:spPr>
+          <p:txBody>
+            <a:bodyPr wrap="square" rtlCol="0">
+              <a:spAutoFit/>
+            </a:bodyPr>
+            <a:lstStyle/>
+            <a:p>
+              <a:r>
+                <a:rPr lang="pl-PL" i="1" dirty="0" smtClean="0"/>
+                <a:t># </a:t>
+              </a:r>
+              <a:r>
+                <a:rPr lang="pl-PL" i="1" dirty="0" err="1" smtClean="0"/>
+                <a:t>parallel</a:t>
+              </a:r>
+              <a:r>
+                <a:rPr lang="pl-PL" i="1" dirty="0" smtClean="0"/>
+                <a:t> for</a:t>
+              </a:r>
+            </a:p>
+            <a:p>
+              <a:r>
+                <a:rPr lang="pl-PL" b="1" dirty="0" smtClean="0"/>
+                <a:t>For </a:t>
+              </a:r>
+              <a:r>
+                <a:rPr lang="pl-PL" b="1" dirty="0" err="1" smtClean="0"/>
+                <a:t>each</a:t>
+              </a:r>
+              <a:r>
+                <a:rPr lang="pl-PL" b="1" dirty="0" smtClean="0"/>
+                <a:t> </a:t>
+              </a:r>
+              <a:r>
+                <a:rPr lang="pl-PL" dirty="0" err="1" smtClean="0"/>
+                <a:t>candidate</a:t>
+              </a:r>
+              <a:r>
+                <a:rPr lang="pl-PL" dirty="0" smtClean="0"/>
+                <a:t> </a:t>
+              </a:r>
+              <a:r>
+                <a:rPr lang="pl-PL" b="1" dirty="0" smtClean="0"/>
+                <a:t>in</a:t>
+              </a:r>
+              <a:r>
+                <a:rPr lang="pl-PL" dirty="0" smtClean="0"/>
+                <a:t> </a:t>
+              </a:r>
+              <a:r>
+                <a:rPr lang="pl-PL" dirty="0" err="1" smtClean="0"/>
+                <a:t>candidateSet</a:t>
+              </a:r>
+              <a:r>
+                <a:rPr lang="pl-PL" dirty="0" smtClean="0"/>
+                <a:t> </a:t>
+              </a:r>
+              <a:r>
+                <a:rPr lang="pl-PL" b="1" dirty="0" smtClean="0"/>
+                <a:t>:</a:t>
+              </a:r>
+            </a:p>
+            <a:p>
+              <a:r>
+                <a:rPr lang="pl-PL" b="1" dirty="0"/>
+                <a:t>	</a:t>
+              </a:r>
+              <a:r>
+                <a:rPr lang="pl-PL" i="1" dirty="0" smtClean="0"/>
+                <a:t># </a:t>
+              </a:r>
+              <a:r>
+                <a:rPr lang="pl-PL" i="1" dirty="0" err="1" smtClean="0"/>
+                <a:t>parallel</a:t>
+              </a:r>
+              <a:r>
+                <a:rPr lang="pl-PL" i="1" dirty="0" smtClean="0"/>
+                <a:t> for</a:t>
+              </a:r>
+              <a:endParaRPr lang="pl-PL" b="1" dirty="0" smtClean="0"/>
+            </a:p>
+            <a:p>
+              <a:r>
+                <a:rPr lang="pl-PL" dirty="0"/>
+                <a:t>	</a:t>
+              </a:r>
+              <a:r>
+                <a:rPr lang="pl-PL" b="1" dirty="0"/>
+                <a:t>F</a:t>
+              </a:r>
+              <a:r>
+                <a:rPr lang="pl-PL" b="1" dirty="0" smtClean="0"/>
+                <a:t>or </a:t>
+              </a:r>
+              <a:r>
+                <a:rPr lang="pl-PL" b="1" dirty="0" err="1" smtClean="0"/>
+                <a:t>each</a:t>
+              </a:r>
+              <a:r>
+                <a:rPr lang="pl-PL" dirty="0" smtClean="0"/>
+                <a:t> </a:t>
+              </a:r>
+              <a:r>
+                <a:rPr lang="pl-PL" dirty="0" err="1" smtClean="0"/>
+                <a:t>transaction</a:t>
+              </a:r>
+              <a:r>
+                <a:rPr lang="pl-PL" dirty="0" smtClean="0"/>
+                <a:t> </a:t>
+              </a:r>
+              <a:r>
+                <a:rPr lang="pl-PL" b="1" dirty="0" smtClean="0"/>
+                <a:t>in</a:t>
+              </a:r>
+              <a:r>
+                <a:rPr lang="pl-PL" dirty="0" smtClean="0"/>
+                <a:t> </a:t>
+              </a:r>
+              <a:r>
+                <a:rPr lang="pl-PL" dirty="0" err="1" smtClean="0"/>
+                <a:t>transactionSet</a:t>
+              </a:r>
+              <a:r>
+                <a:rPr lang="pl-PL" dirty="0" smtClean="0"/>
+                <a:t> </a:t>
+              </a:r>
+              <a:r>
+                <a:rPr lang="pl-PL" b="1" dirty="0" smtClean="0"/>
+                <a:t>:</a:t>
+              </a:r>
+            </a:p>
+            <a:p>
+              <a:r>
+                <a:rPr lang="pl-PL" dirty="0"/>
+                <a:t>	</a:t>
+              </a:r>
+              <a:r>
+                <a:rPr lang="pl-PL" dirty="0" smtClean="0"/>
+                <a:t>	</a:t>
+              </a:r>
+              <a:r>
+                <a:rPr lang="pl-PL" b="1" dirty="0" err="1" smtClean="0"/>
+                <a:t>if</a:t>
+              </a:r>
+              <a:r>
+                <a:rPr lang="pl-PL" b="1" dirty="0" smtClean="0"/>
+                <a:t> </a:t>
+              </a:r>
+              <a:r>
+                <a:rPr lang="pl-PL" dirty="0" smtClean="0"/>
+                <a:t>(</a:t>
+              </a:r>
+              <a:r>
+                <a:rPr lang="pl-PL" dirty="0" err="1" smtClean="0"/>
+                <a:t>candidate</a:t>
+              </a:r>
+              <a:r>
+                <a:rPr lang="pl-PL" dirty="0"/>
+                <a:t> </a:t>
+              </a:r>
+              <a:r>
+                <a:rPr lang="pl-PL" dirty="0" err="1" smtClean="0"/>
+                <a:t>complies</a:t>
+              </a:r>
+              <a:r>
+                <a:rPr lang="pl-PL" dirty="0" smtClean="0"/>
+                <a:t> with </a:t>
+              </a:r>
+              <a:r>
+                <a:rPr lang="pl-PL" dirty="0" err="1" smtClean="0"/>
+                <a:t>transaction</a:t>
+              </a:r>
+              <a:r>
+                <a:rPr lang="pl-PL" dirty="0" smtClean="0"/>
+                <a:t>)</a:t>
+              </a:r>
+              <a:br>
+                <a:rPr lang="pl-PL" dirty="0" smtClean="0"/>
+              </a:br>
+              <a:r>
+                <a:rPr lang="pl-PL" dirty="0" smtClean="0"/>
+                <a:t>			</a:t>
+              </a:r>
+              <a:r>
+                <a:rPr lang="pl-PL" dirty="0" err="1" smtClean="0"/>
+                <a:t>support</a:t>
+              </a:r>
+              <a:r>
+                <a:rPr lang="pl-PL" dirty="0" smtClean="0"/>
+                <a:t>[</a:t>
+              </a:r>
+              <a:r>
+                <a:rPr lang="pl-PL" dirty="0" err="1" smtClean="0"/>
+                <a:t>candidate</a:t>
+              </a:r>
+              <a:r>
+                <a:rPr lang="pl-PL" dirty="0" smtClean="0"/>
+                <a:t>]++;</a:t>
+              </a:r>
+              <a:endParaRPr lang="pl-PL" dirty="0"/>
+            </a:p>
+          </p:txBody>
+        </p:sp>
+      </p:grpSp>
+      <p:grpSp>
+        <p:nvGrpSpPr>
+          <p:cNvPr id="11" name="Grupa 10"/>
+          <p:cNvGrpSpPr/>
+          <p:nvPr/>
+        </p:nvGrpSpPr>
+        <p:grpSpPr>
+          <a:xfrm>
+            <a:off x="2051720" y="5085184"/>
+            <a:ext cx="6120680" cy="1512168"/>
+            <a:chOff x="2051720" y="5085184"/>
+            <a:chExt cx="6120680" cy="1512168"/>
+          </a:xfrm>
+        </p:grpSpPr>
+        <p:sp>
+          <p:nvSpPr>
+            <p:cNvPr id="4" name="Objaśnienie prostokątne 3"/>
+            <p:cNvSpPr/>
+            <p:nvPr/>
+          </p:nvSpPr>
+          <p:spPr>
+            <a:xfrm>
+              <a:off x="2051720" y="5085184"/>
+              <a:ext cx="6120680" cy="1512168"/>
+            </a:xfrm>
+            <a:prstGeom prst="wedgeRectCallout">
+              <a:avLst>
+                <a:gd name="adj1" fmla="val -26809"/>
+                <a:gd name="adj2" fmla="val -68399"/>
+              </a:avLst>
+            </a:prstGeom>
+          </p:spPr>
+          <p:style>
+            <a:lnRef idx="2">
+              <a:schemeClr val="accent5">
+                <a:shade val="50000"/>
+              </a:schemeClr>
+            </a:lnRef>
+            <a:fillRef idx="1">
+              <a:schemeClr val="accent5"/>
+            </a:fillRef>
+            <a:effectRef idx="0">
+              <a:schemeClr val="accent5"/>
+            </a:effectRef>
+            <a:fontRef idx="minor">
+              <a:schemeClr val="lt1"/>
+            </a:fontRef>
+          </p:style>
+          <p:txBody>
+            <a:bodyPr rtlCol="0" anchor="ctr"/>
+            <a:lstStyle/>
+            <a:p>
+              <a:pPr algn="ctr"/>
+              <a:endParaRPr lang="pl-PL"/>
+            </a:p>
+          </p:txBody>
+        </p:sp>
+        <p:sp>
+          <p:nvSpPr>
+            <p:cNvPr id="9" name="pole tekstowe 8"/>
+            <p:cNvSpPr txBox="1"/>
+            <p:nvPr/>
+          </p:nvSpPr>
+          <p:spPr>
+            <a:xfrm>
+              <a:off x="2195736" y="5229200"/>
+              <a:ext cx="5832648" cy="1200329"/>
+            </a:xfrm>
+            <a:prstGeom prst="rect">
+              <a:avLst/>
+            </a:prstGeom>
+            <a:noFill/>
+          </p:spPr>
+          <p:txBody>
+            <a:bodyPr wrap="square" rtlCol="0">
+              <a:spAutoFit/>
+            </a:bodyPr>
+            <a:lstStyle/>
+            <a:p>
+              <a:r>
+                <a:rPr lang="pl-PL" b="1" dirty="0" smtClean="0"/>
+                <a:t>For </a:t>
+              </a:r>
+              <a:r>
+                <a:rPr lang="pl-PL" b="1" dirty="0" err="1" smtClean="0"/>
+                <a:t>each</a:t>
+              </a:r>
+              <a:r>
+                <a:rPr lang="pl-PL" dirty="0" smtClean="0"/>
+                <a:t> </a:t>
+              </a:r>
+              <a:r>
+                <a:rPr lang="pl-PL" dirty="0" err="1" smtClean="0"/>
+                <a:t>item</a:t>
+              </a:r>
+              <a:r>
+                <a:rPr lang="pl-PL" dirty="0" smtClean="0"/>
+                <a:t> </a:t>
+              </a:r>
+              <a:r>
+                <a:rPr lang="pl-PL" b="1" dirty="0" smtClean="0"/>
+                <a:t>in</a:t>
+              </a:r>
+              <a:r>
+                <a:rPr lang="pl-PL" dirty="0" smtClean="0"/>
+                <a:t> </a:t>
+              </a:r>
+              <a:r>
+                <a:rPr lang="pl-PL" dirty="0" err="1" smtClean="0"/>
+                <a:t>lastLevelItemSet</a:t>
+              </a:r>
+              <a:r>
+                <a:rPr lang="pl-PL" b="1" dirty="0" smtClean="0"/>
+                <a:t>:</a:t>
+              </a:r>
+            </a:p>
+            <a:p>
+              <a:r>
+                <a:rPr lang="pl-PL" b="1" dirty="0" smtClean="0"/>
+                <a:t>	</a:t>
+              </a:r>
+              <a:r>
+                <a:rPr lang="pl-PL" i="1" dirty="0" smtClean="0"/>
+                <a:t># </a:t>
+              </a:r>
+              <a:r>
+                <a:rPr lang="pl-PL" i="1" dirty="0" err="1" smtClean="0"/>
+                <a:t>parallel</a:t>
+              </a:r>
+              <a:r>
+                <a:rPr lang="pl-PL" i="1" dirty="0" smtClean="0"/>
+                <a:t> for </a:t>
+              </a:r>
+              <a:endParaRPr lang="pl-PL" dirty="0" smtClean="0"/>
+            </a:p>
+            <a:p>
+              <a:r>
+                <a:rPr lang="pl-PL" b="1" dirty="0"/>
+                <a:t>	</a:t>
+              </a:r>
+              <a:r>
+                <a:rPr lang="pl-PL" b="1" dirty="0" smtClean="0"/>
+                <a:t>For </a:t>
+              </a:r>
+              <a:r>
+                <a:rPr lang="pl-PL" b="1" dirty="0" err="1" smtClean="0"/>
+                <a:t>each</a:t>
+              </a:r>
+              <a:r>
+                <a:rPr lang="pl-PL" b="1" dirty="0" smtClean="0"/>
+                <a:t> </a:t>
+              </a:r>
+              <a:r>
+                <a:rPr lang="pl-PL" dirty="0" smtClean="0"/>
+                <a:t>o </a:t>
+              </a:r>
+              <a:r>
+                <a:rPr lang="pl-PL" b="1" dirty="0" smtClean="0"/>
+                <a:t>in</a:t>
+              </a:r>
+              <a:r>
+                <a:rPr lang="pl-PL" dirty="0" smtClean="0"/>
+                <a:t> </a:t>
+              </a:r>
+              <a:r>
+                <a:rPr lang="pl-PL" dirty="0" err="1" smtClean="0"/>
+                <a:t>singleElementFrequentSets</a:t>
+              </a:r>
+              <a:r>
+                <a:rPr lang="pl-PL" b="1" dirty="0" smtClean="0"/>
+                <a:t>:</a:t>
+              </a:r>
+            </a:p>
+            <a:p>
+              <a:r>
+                <a:rPr lang="pl-PL" dirty="0"/>
+                <a:t>	</a:t>
+              </a:r>
+              <a:r>
+                <a:rPr lang="pl-PL" dirty="0" smtClean="0"/>
+                <a:t>	</a:t>
+              </a:r>
+              <a:r>
+                <a:rPr lang="pl-PL" dirty="0" err="1" smtClean="0"/>
+                <a:t>extend_set</a:t>
+              </a:r>
+              <a:r>
+                <a:rPr lang="pl-PL" dirty="0" smtClean="0"/>
+                <a:t>(</a:t>
+              </a:r>
+              <a:r>
+                <a:rPr lang="pl-PL" dirty="0" err="1" smtClean="0"/>
+                <a:t>item,o</a:t>
+              </a:r>
+              <a:r>
+                <a:rPr lang="pl-PL" dirty="0" smtClean="0"/>
+                <a:t>);</a:t>
+              </a:r>
+            </a:p>
+          </p:txBody>
+        </p:sp>
+      </p:grpSp>
     </p:spTree>
     <p:extLst>
       <p:ext uri="{BB962C8B-B14F-4D97-AF65-F5344CB8AC3E}">
@@ -7276,7 +8087,136 @@
   <p:timing>
     <p:tnLst>
       <p:par>
-        <p:cTn id="1" dur="indefinite" restart="never" nodeType="tmRoot"/>
+        <p:cTn id="1" dur="indefinite" restart="never" nodeType="tmRoot">
+          <p:childTnLst>
+            <p:seq concurrent="1" nextAc="seek">
+              <p:cTn id="2" dur="indefinite" nodeType="mainSeq">
+                <p:childTnLst>
+                  <p:par>
+                    <p:cTn id="3" fill="hold">
+                      <p:stCondLst>
+                        <p:cond delay="indefinite"/>
+                      </p:stCondLst>
+                      <p:childTnLst>
+                        <p:par>
+                          <p:cTn id="4" fill="hold">
+                            <p:stCondLst>
+                              <p:cond delay="0"/>
+                            </p:stCondLst>
+                            <p:childTnLst>
+                              <p:par>
+                                <p:cTn id="5" presetID="10" presetClass="entr" presetSubtype="0" fill="hold" nodeType="clickEffect">
+                                  <p:stCondLst>
+                                    <p:cond delay="0"/>
+                                  </p:stCondLst>
+                                  <p:childTnLst>
+                                    <p:set>
+                                      <p:cBhvr>
+                                        <p:cTn id="6" dur="1" fill="hold">
+                                          <p:stCondLst>
+                                            <p:cond delay="0"/>
+                                          </p:stCondLst>
+                                        </p:cTn>
+                                        <p:tgtEl>
+                                          <p:spTgt spid="10"/>
+                                        </p:tgtEl>
+                                        <p:attrNameLst>
+                                          <p:attrName>style.visibility</p:attrName>
+                                        </p:attrNameLst>
+                                      </p:cBhvr>
+                                      <p:to>
+                                        <p:strVal val="visible"/>
+                                      </p:to>
+                                    </p:set>
+                                    <p:animEffect transition="in" filter="fade">
+                                      <p:cBhvr>
+                                        <p:cTn id="7" dur="500"/>
+                                        <p:tgtEl>
+                                          <p:spTgt spid="10"/>
+                                        </p:tgtEl>
+                                      </p:cBhvr>
+                                    </p:animEffect>
+                                  </p:childTnLst>
+                                </p:cTn>
+                              </p:par>
+                            </p:childTnLst>
+                          </p:cTn>
+                        </p:par>
+                      </p:childTnLst>
+                    </p:cTn>
+                  </p:par>
+                  <p:par>
+                    <p:cTn id="8" fill="hold">
+                      <p:stCondLst>
+                        <p:cond delay="indefinite"/>
+                      </p:stCondLst>
+                      <p:childTnLst>
+                        <p:par>
+                          <p:cTn id="9" fill="hold">
+                            <p:stCondLst>
+                              <p:cond delay="0"/>
+                            </p:stCondLst>
+                            <p:childTnLst>
+                              <p:par>
+                                <p:cTn id="10" presetID="10" presetClass="entr" presetSubtype="0" fill="hold" nodeType="clickEffect">
+                                  <p:stCondLst>
+                                    <p:cond delay="0"/>
+                                  </p:stCondLst>
+                                  <p:childTnLst>
+                                    <p:set>
+                                      <p:cBhvr>
+                                        <p:cTn id="11" dur="1" fill="hold">
+                                          <p:stCondLst>
+                                            <p:cond delay="0"/>
+                                          </p:stCondLst>
+                                        </p:cTn>
+                                        <p:tgtEl>
+                                          <p:spTgt spid="11"/>
+                                        </p:tgtEl>
+                                        <p:attrNameLst>
+                                          <p:attrName>style.visibility</p:attrName>
+                                        </p:attrNameLst>
+                                      </p:cBhvr>
+                                      <p:to>
+                                        <p:strVal val="visible"/>
+                                      </p:to>
+                                    </p:set>
+                                    <p:animEffect transition="in" filter="fade">
+                                      <p:cBhvr>
+                                        <p:cTn id="12" dur="500"/>
+                                        <p:tgtEl>
+                                          <p:spTgt spid="11"/>
+                                        </p:tgtEl>
+                                      </p:cBhvr>
+                                    </p:animEffect>
+                                  </p:childTnLst>
+                                </p:cTn>
+                              </p:par>
+                            </p:childTnLst>
+                          </p:cTn>
+                        </p:par>
+                      </p:childTnLst>
+                    </p:cTn>
+                  </p:par>
+                </p:childTnLst>
+              </p:cTn>
+              <p:prevCondLst>
+                <p:cond evt="onPrev" delay="0">
+                  <p:tgtEl>
+                    <p:sldTgt/>
+                  </p:tgtEl>
+                </p:cond>
+              </p:prevCondLst>
+              <p:nextCondLst>
+                <p:cond evt="onNext" delay="0">
+                  <p:tgtEl>
+                    <p:sldTgt/>
+                  </p:tgtEl>
+                </p:cond>
+              </p:nextCondLst>
+            </p:seq>
+          </p:childTnLst>
+        </p:cTn>
       </p:par>
     </p:tnLst>
   </p:timing>

</xml_diff>